<commit_message>
Update final proj presentation.pptx
</commit_message>
<xml_diff>
--- a/final_proj/final proj presentation.pptx
+++ b/final_proj/final proj presentation.pptx
@@ -5,7 +5,7 @@
     <p:sldMasterId id="2147483672" r:id="rId1"/>
   </p:sldMasterIdLst>
   <p:notesMasterIdLst>
-    <p:notesMasterId r:id="rId24"/>
+    <p:notesMasterId r:id="rId23"/>
   </p:notesMasterIdLst>
   <p:sldIdLst>
     <p:sldId id="256" r:id="rId2"/>
@@ -15,21 +15,20 @@
     <p:sldId id="269" r:id="rId6"/>
     <p:sldId id="260" r:id="rId7"/>
     <p:sldId id="268" r:id="rId8"/>
-    <p:sldId id="264" r:id="rId9"/>
-    <p:sldId id="277" r:id="rId10"/>
-    <p:sldId id="278" r:id="rId11"/>
-    <p:sldId id="279" r:id="rId12"/>
-    <p:sldId id="281" r:id="rId13"/>
-    <p:sldId id="280" r:id="rId14"/>
-    <p:sldId id="265" r:id="rId15"/>
-    <p:sldId id="266" r:id="rId16"/>
-    <p:sldId id="270" r:id="rId17"/>
-    <p:sldId id="271" r:id="rId18"/>
-    <p:sldId id="272" r:id="rId19"/>
-    <p:sldId id="273" r:id="rId20"/>
-    <p:sldId id="274" r:id="rId21"/>
-    <p:sldId id="275" r:id="rId22"/>
-    <p:sldId id="276" r:id="rId23"/>
+    <p:sldId id="277" r:id="rId9"/>
+    <p:sldId id="278" r:id="rId10"/>
+    <p:sldId id="279" r:id="rId11"/>
+    <p:sldId id="281" r:id="rId12"/>
+    <p:sldId id="280" r:id="rId13"/>
+    <p:sldId id="265" r:id="rId14"/>
+    <p:sldId id="266" r:id="rId15"/>
+    <p:sldId id="270" r:id="rId16"/>
+    <p:sldId id="271" r:id="rId17"/>
+    <p:sldId id="272" r:id="rId18"/>
+    <p:sldId id="273" r:id="rId19"/>
+    <p:sldId id="274" r:id="rId20"/>
+    <p:sldId id="275" r:id="rId21"/>
+    <p:sldId id="276" r:id="rId22"/>
   </p:sldIdLst>
   <p:sldSz cx="12192000" cy="6858000"/>
   <p:notesSz cx="6858000" cy="9144000"/>
@@ -551,7 +550,7 @@
           <a:p>
             <a:fld id="{0EA644EC-E2D4-A543-A2F0-8F38000DF59C}" type="slidenum">
               <a:rPr lang="en-IL" smtClean="0"/>
-              <a:t>9</a:t>
+              <a:t>8</a:t>
             </a:fld>
             <a:endParaRPr lang="en-IL"/>
           </a:p>
@@ -599,8 +598,8 @@
         </p:nvSpPr>
         <p:spPr/>
       </p:sp>
-      <mc:AlternateContent xmlns:mc="http://schemas.openxmlformats.org/markup-compatibility/2006">
-        <mc:Choice xmlns:a14="http://schemas.microsoft.com/office/drawing/2010/main" Requires="a14">
+      <mc:AlternateContent xmlns:mc="http://schemas.openxmlformats.org/markup-compatibility/2006" xmlns:a14="http://schemas.microsoft.com/office/drawing/2010/main">
+        <mc:Choice Requires="a14">
           <p:sp>
             <p:nvSpPr>
               <p:cNvPr id="3" name="Notes Placeholder 2"/>
@@ -682,7 +681,7 @@
             </p:txBody>
           </p:sp>
         </mc:Choice>
-        <mc:Fallback>
+        <mc:Fallback xmlns="">
           <p:sp>
             <p:nvSpPr>
               <p:cNvPr id="3" name="Notes Placeholder 2"/>
@@ -759,7 +758,7 @@
           <a:p>
             <a:fld id="{0EA644EC-E2D4-A543-A2F0-8F38000DF59C}" type="slidenum">
               <a:rPr lang="en-IL" smtClean="0"/>
-              <a:t>10</a:t>
+              <a:t>9</a:t>
             </a:fld>
             <a:endParaRPr lang="en-IL"/>
           </a:p>
@@ -864,7 +863,7 @@
           <a:p>
             <a:fld id="{0EA644EC-E2D4-A543-A2F0-8F38000DF59C}" type="slidenum">
               <a:rPr lang="en-IL" smtClean="0"/>
-              <a:t>11</a:t>
+              <a:t>10</a:t>
             </a:fld>
             <a:endParaRPr lang="en-IL"/>
           </a:p>
@@ -969,7 +968,7 @@
           <a:p>
             <a:fld id="{0EA644EC-E2D4-A543-A2F0-8F38000DF59C}" type="slidenum">
               <a:rPr lang="en-IL" smtClean="0"/>
-              <a:t>12</a:t>
+              <a:t>11</a:t>
             </a:fld>
             <a:endParaRPr lang="en-IL"/>
           </a:p>
@@ -1074,7 +1073,7 @@
           <a:p>
             <a:fld id="{0EA644EC-E2D4-A543-A2F0-8F38000DF59C}" type="slidenum">
               <a:rPr lang="en-IL" smtClean="0"/>
-              <a:t>13</a:t>
+              <a:t>12</a:t>
             </a:fld>
             <a:endParaRPr lang="en-IL"/>
           </a:p>
@@ -6218,1133 +6217,8 @@
           </a:fontRef>
         </p:style>
       </p:sp>
-      <mc:AlternateContent xmlns:mc="http://schemas.openxmlformats.org/markup-compatibility/2006">
-        <mc:Choice xmlns:a14="http://schemas.microsoft.com/office/drawing/2010/main" Requires="a14">
-          <p:sp>
-            <p:nvSpPr>
-              <p:cNvPr id="3" name="Content Placeholder 2">
-                <a:extLst>
-                  <a:ext uri="{FF2B5EF4-FFF2-40B4-BE49-F238E27FC236}">
-                    <a16:creationId xmlns:a16="http://schemas.microsoft.com/office/drawing/2014/main" id="{ECC5CEA5-34A6-FB08-4686-EB905E2EE3C7}"/>
-                  </a:ext>
-                </a:extLst>
-              </p:cNvPr>
-              <p:cNvSpPr>
-                <a:spLocks noGrp="1"/>
-              </p:cNvSpPr>
-              <p:nvPr>
-                <p:ph idx="1"/>
-              </p:nvPr>
-            </p:nvSpPr>
-            <p:spPr>
-              <a:xfrm>
-                <a:off x="2302933" y="2641604"/>
-                <a:ext cx="7621606" cy="3874943"/>
-              </a:xfrm>
-            </p:spPr>
-            <p:txBody>
-              <a:bodyPr anchor="t">
-                <a:normAutofit/>
-              </a:bodyPr>
-              <a:lstStyle/>
-              <a:p>
-                <a:pPr marL="0" indent="0">
-                  <a:buNone/>
-                </a:pPr>
-                <a14:m>
-                  <m:oMathPara xmlns:m="http://schemas.openxmlformats.org/officeDocument/2006/math">
-                    <m:oMathParaPr>
-                      <m:jc m:val="left"/>
-                    </m:oMathParaPr>
-                    <m:oMath xmlns:m="http://schemas.openxmlformats.org/officeDocument/2006/math">
-                      <m:r>
-                        <m:rPr>
-                          <m:nor/>
-                        </m:rPr>
-                        <a:rPr lang="en-US" dirty="0" smtClean="0">
-                          <a:solidFill>
-                            <a:srgbClr val="1F2D29"/>
-                          </a:solidFill>
-                        </a:rPr>
-                        <m:t>Minimizing</m:t>
-                      </m:r>
-                      <m:r>
-                        <m:rPr>
-                          <m:nor/>
-                        </m:rPr>
-                        <a:rPr lang="en-US" dirty="0" smtClean="0">
-                          <a:solidFill>
-                            <a:srgbClr val="1F2D29"/>
-                          </a:solidFill>
-                        </a:rPr>
-                        <m:t> </m:t>
-                      </m:r>
-                      <m:r>
-                        <m:rPr>
-                          <m:nor/>
-                        </m:rPr>
-                        <a:rPr lang="en-US" dirty="0" smtClean="0">
-                          <a:solidFill>
-                            <a:srgbClr val="1F2D29"/>
-                          </a:solidFill>
-                        </a:rPr>
-                        <m:t>this</m:t>
-                      </m:r>
-                      <m:r>
-                        <m:rPr>
-                          <m:nor/>
-                        </m:rPr>
-                        <a:rPr lang="en-US" dirty="0" smtClean="0">
-                          <a:solidFill>
-                            <a:srgbClr val="1F2D29"/>
-                          </a:solidFill>
-                        </a:rPr>
-                        <m:t> </m:t>
-                      </m:r>
-                      <m:r>
-                        <m:rPr>
-                          <m:nor/>
-                        </m:rPr>
-                        <a:rPr lang="en-US" dirty="0" smtClean="0">
-                          <a:solidFill>
-                            <a:srgbClr val="1F2D29"/>
-                          </a:solidFill>
-                        </a:rPr>
-                        <m:t>model</m:t>
-                      </m:r>
-                      <m:r>
-                        <m:rPr>
-                          <m:nor/>
-                        </m:rPr>
-                        <a:rPr lang="en-US" dirty="0" smtClean="0">
-                          <a:solidFill>
-                            <a:srgbClr val="1F2D29"/>
-                          </a:solidFill>
-                        </a:rPr>
-                        <m:t> </m:t>
-                      </m:r>
-                      <m:r>
-                        <m:rPr>
-                          <m:nor/>
-                        </m:rPr>
-                        <a:rPr lang="en-US" dirty="0" smtClean="0">
-                          <a:solidFill>
-                            <a:srgbClr val="1F2D29"/>
-                          </a:solidFill>
-                        </a:rPr>
-                        <m:t>yields</m:t>
-                      </m:r>
-                      <m:r>
-                        <m:rPr>
-                          <m:nor/>
-                        </m:rPr>
-                        <a:rPr lang="en-US" dirty="0" smtClean="0">
-                          <a:solidFill>
-                            <a:srgbClr val="1F2D29"/>
-                          </a:solidFill>
-                        </a:rPr>
-                        <m:t>:</m:t>
-                      </m:r>
-                    </m:oMath>
-                  </m:oMathPara>
-                </a14:m>
-                <a:endParaRPr lang="en-US" dirty="0">
-                  <a:solidFill>
-                    <a:srgbClr val="1F2D29"/>
-                  </a:solidFill>
-                </a:endParaRPr>
-              </a:p>
-              <a:p>
-                <a:pPr marL="0" indent="0">
-                  <a:buNone/>
-                </a:pPr>
-                <a14:m>
-                  <m:oMathPara xmlns:m="http://schemas.openxmlformats.org/officeDocument/2006/math">
-                    <m:oMathParaPr>
-                      <m:jc m:val="left"/>
-                    </m:oMathParaPr>
-                    <m:oMath xmlns:m="http://schemas.openxmlformats.org/officeDocument/2006/math">
-                      <m:r>
-                        <m:rPr>
-                          <m:sty m:val="p"/>
-                        </m:rPr>
-                        <a:rPr lang="en-US">
-                          <a:solidFill>
-                            <a:srgbClr val="1F2D29"/>
-                          </a:solidFill>
-                          <a:latin typeface="Cambria Math" panose="02040503050406030204" pitchFamily="18" charset="0"/>
-                        </a:rPr>
-                        <m:t>∇</m:t>
-                      </m:r>
-                      <m:sSub>
-                        <m:sSubPr>
-                          <m:ctrlPr>
-                            <a:rPr lang="en-US" i="1">
-                              <a:solidFill>
-                                <a:srgbClr val="1F2D29"/>
-                              </a:solidFill>
-                              <a:latin typeface="Cambria Math" panose="02040503050406030204" pitchFamily="18" charset="0"/>
-                            </a:rPr>
-                          </m:ctrlPr>
-                        </m:sSubPr>
-                        <m:e>
-                          <m:r>
-                            <a:rPr lang="en-US" i="1">
-                              <a:solidFill>
-                                <a:srgbClr val="1F2D29"/>
-                              </a:solidFill>
-                              <a:latin typeface="Cambria Math" panose="02040503050406030204" pitchFamily="18" charset="0"/>
-                            </a:rPr>
-                            <m:t>𝑚</m:t>
-                          </m:r>
-                        </m:e>
-                        <m:sub>
-                          <m:r>
-                            <a:rPr lang="en-US" i="1">
-                              <a:solidFill>
-                                <a:srgbClr val="1F2D29"/>
-                              </a:solidFill>
-                              <a:latin typeface="Cambria Math" panose="02040503050406030204" pitchFamily="18" charset="0"/>
-                            </a:rPr>
-                            <m:t>𝑘</m:t>
-                          </m:r>
-                        </m:sub>
-                      </m:sSub>
-                      <m:r>
-                        <a:rPr lang="en-US" i="1">
-                          <a:solidFill>
-                            <a:srgbClr val="1F2D29"/>
-                          </a:solidFill>
-                          <a:latin typeface="Cambria Math" panose="02040503050406030204" pitchFamily="18" charset="0"/>
-                        </a:rPr>
-                        <m:t>=</m:t>
-                      </m:r>
-                      <m:r>
-                        <m:rPr>
-                          <m:sty m:val="p"/>
-                        </m:rPr>
-                        <a:rPr lang="en-US">
-                          <a:solidFill>
-                            <a:srgbClr val="1F2D29"/>
-                          </a:solidFill>
-                          <a:latin typeface="Cambria Math" panose="02040503050406030204" pitchFamily="18" charset="0"/>
-                        </a:rPr>
-                        <m:t>∇</m:t>
-                      </m:r>
-                      <m:r>
-                        <a:rPr lang="en-US" i="1">
-                          <a:solidFill>
-                            <a:srgbClr val="1F2D29"/>
-                          </a:solidFill>
-                          <a:latin typeface="Cambria Math" panose="02040503050406030204" pitchFamily="18" charset="0"/>
-                        </a:rPr>
-                        <m:t>𝑓</m:t>
-                      </m:r>
-                      <m:r>
-                        <m:rPr>
-                          <m:lit/>
-                        </m:rPr>
-                        <a:rPr lang="en-US" i="1">
-                          <a:solidFill>
-                            <a:srgbClr val="1F2D29"/>
-                          </a:solidFill>
-                          <a:latin typeface="Cambria Math" panose="02040503050406030204" pitchFamily="18" charset="0"/>
-                        </a:rPr>
-                        <m:t>(</m:t>
-                      </m:r>
-                      <m:sSub>
-                        <m:sSubPr>
-                          <m:ctrlPr>
-                            <a:rPr lang="en-US" i="1">
-                              <a:solidFill>
-                                <a:srgbClr val="1F2D29"/>
-                              </a:solidFill>
-                              <a:latin typeface="Cambria Math" panose="02040503050406030204" pitchFamily="18" charset="0"/>
-                            </a:rPr>
-                          </m:ctrlPr>
-                        </m:sSubPr>
-                        <m:e>
-                          <m:r>
-                            <a:rPr lang="en-US" i="1">
-                              <a:solidFill>
-                                <a:srgbClr val="1F2D29"/>
-                              </a:solidFill>
-                              <a:latin typeface="Cambria Math" panose="02040503050406030204" pitchFamily="18" charset="0"/>
-                            </a:rPr>
-                            <m:t>𝑥</m:t>
-                          </m:r>
-                        </m:e>
-                        <m:sub>
-                          <m:r>
-                            <a:rPr lang="en-US" i="1">
-                              <a:solidFill>
-                                <a:srgbClr val="1F2D29"/>
-                              </a:solidFill>
-                              <a:latin typeface="Cambria Math" panose="02040503050406030204" pitchFamily="18" charset="0"/>
-                            </a:rPr>
-                            <m:t>𝑘</m:t>
-                          </m:r>
-                        </m:sub>
-                      </m:sSub>
-                      <m:r>
-                        <m:rPr>
-                          <m:lit/>
-                        </m:rPr>
-                        <a:rPr lang="en-US" i="1">
-                          <a:solidFill>
-                            <a:srgbClr val="1F2D29"/>
-                          </a:solidFill>
-                          <a:latin typeface="Cambria Math" panose="02040503050406030204" pitchFamily="18" charset="0"/>
-                        </a:rPr>
-                        <m:t>)</m:t>
-                      </m:r>
-                      <m:r>
-                        <a:rPr lang="en-US" i="1">
-                          <a:solidFill>
-                            <a:srgbClr val="1F2D29"/>
-                          </a:solidFill>
-                          <a:latin typeface="Cambria Math" panose="02040503050406030204" pitchFamily="18" charset="0"/>
-                        </a:rPr>
-                        <m:t>+</m:t>
-                      </m:r>
-                      <m:sSub>
-                        <m:sSubPr>
-                          <m:ctrlPr>
-                            <a:rPr lang="en-US" i="1">
-                              <a:solidFill>
-                                <a:srgbClr val="1F2D29"/>
-                              </a:solidFill>
-                              <a:latin typeface="Cambria Math" panose="02040503050406030204" pitchFamily="18" charset="0"/>
-                            </a:rPr>
-                          </m:ctrlPr>
-                        </m:sSubPr>
-                        <m:e>
-                          <m:r>
-                            <a:rPr lang="en-US" i="1">
-                              <a:solidFill>
-                                <a:srgbClr val="1F2D29"/>
-                              </a:solidFill>
-                              <a:latin typeface="Cambria Math" panose="02040503050406030204" pitchFamily="18" charset="0"/>
-                            </a:rPr>
-                            <m:t>𝐵</m:t>
-                          </m:r>
-                        </m:e>
-                        <m:sub>
-                          <m:r>
-                            <a:rPr lang="en-US" i="1">
-                              <a:solidFill>
-                                <a:srgbClr val="1F2D29"/>
-                              </a:solidFill>
-                              <a:latin typeface="Cambria Math" panose="02040503050406030204" pitchFamily="18" charset="0"/>
-                            </a:rPr>
-                            <m:t>𝑘</m:t>
-                          </m:r>
-                        </m:sub>
-                      </m:sSub>
-                      <m:sSub>
-                        <m:sSubPr>
-                          <m:ctrlPr>
-                            <a:rPr lang="en-US" i="1">
-                              <a:solidFill>
-                                <a:srgbClr val="1F2D29"/>
-                              </a:solidFill>
-                              <a:latin typeface="Cambria Math" panose="02040503050406030204" pitchFamily="18" charset="0"/>
-                            </a:rPr>
-                          </m:ctrlPr>
-                        </m:sSubPr>
-                        <m:e>
-                          <m:r>
-                            <a:rPr lang="en-US" i="1">
-                              <a:solidFill>
-                                <a:srgbClr val="1F2D29"/>
-                              </a:solidFill>
-                              <a:latin typeface="Cambria Math" panose="02040503050406030204" pitchFamily="18" charset="0"/>
-                            </a:rPr>
-                            <m:t>𝑝</m:t>
-                          </m:r>
-                        </m:e>
-                        <m:sub>
-                          <m:r>
-                            <a:rPr lang="en-US" i="1">
-                              <a:solidFill>
-                                <a:srgbClr val="1F2D29"/>
-                              </a:solidFill>
-                              <a:latin typeface="Cambria Math" panose="02040503050406030204" pitchFamily="18" charset="0"/>
-                            </a:rPr>
-                            <m:t>𝑘</m:t>
-                          </m:r>
-                        </m:sub>
-                      </m:sSub>
-                      <m:r>
-                        <a:rPr lang="en-US" i="1">
-                          <a:solidFill>
-                            <a:srgbClr val="1F2D29"/>
-                          </a:solidFill>
-                          <a:latin typeface="Cambria Math" panose="02040503050406030204" pitchFamily="18" charset="0"/>
-                        </a:rPr>
-                        <m:t>=0⇒</m:t>
-                      </m:r>
-                      <m:sSub>
-                        <m:sSubPr>
-                          <m:ctrlPr>
-                            <a:rPr lang="en-US" i="1">
-                              <a:solidFill>
-                                <a:srgbClr val="1F2D29"/>
-                              </a:solidFill>
-                              <a:latin typeface="Cambria Math" panose="02040503050406030204" pitchFamily="18" charset="0"/>
-                            </a:rPr>
-                          </m:ctrlPr>
-                        </m:sSubPr>
-                        <m:e>
-                          <m:r>
-                            <a:rPr lang="en-US" i="1">
-                              <a:solidFill>
-                                <a:srgbClr val="1F2D29"/>
-                              </a:solidFill>
-                              <a:latin typeface="Cambria Math" panose="02040503050406030204" pitchFamily="18" charset="0"/>
-                            </a:rPr>
-                            <m:t>𝑝</m:t>
-                          </m:r>
-                        </m:e>
-                        <m:sub>
-                          <m:r>
-                            <a:rPr lang="en-US" i="1">
-                              <a:solidFill>
-                                <a:srgbClr val="1F2D29"/>
-                              </a:solidFill>
-                              <a:latin typeface="Cambria Math" panose="02040503050406030204" pitchFamily="18" charset="0"/>
-                            </a:rPr>
-                            <m:t>𝑘</m:t>
-                          </m:r>
-                        </m:sub>
-                      </m:sSub>
-                      <m:r>
-                        <a:rPr lang="en-US" i="1">
-                          <a:solidFill>
-                            <a:srgbClr val="1F2D29"/>
-                          </a:solidFill>
-                          <a:latin typeface="Cambria Math" panose="02040503050406030204" pitchFamily="18" charset="0"/>
-                        </a:rPr>
-                        <m:t>=−</m:t>
-                      </m:r>
-                      <m:sSubSup>
-                        <m:sSubSupPr>
-                          <m:ctrlPr>
-                            <a:rPr lang="en-US" i="1">
-                              <a:solidFill>
-                                <a:srgbClr val="1F2D29"/>
-                              </a:solidFill>
-                              <a:latin typeface="Cambria Math" panose="02040503050406030204" pitchFamily="18" charset="0"/>
-                            </a:rPr>
-                          </m:ctrlPr>
-                        </m:sSubSupPr>
-                        <m:e>
-                          <m:r>
-                            <a:rPr lang="en-US" i="1">
-                              <a:solidFill>
-                                <a:srgbClr val="1F2D29"/>
-                              </a:solidFill>
-                              <a:latin typeface="Cambria Math" panose="02040503050406030204" pitchFamily="18" charset="0"/>
-                            </a:rPr>
-                            <m:t>𝐵</m:t>
-                          </m:r>
-                        </m:e>
-                        <m:sub>
-                          <m:r>
-                            <a:rPr lang="en-US" i="1">
-                              <a:solidFill>
-                                <a:srgbClr val="1F2D29"/>
-                              </a:solidFill>
-                              <a:latin typeface="Cambria Math" panose="02040503050406030204" pitchFamily="18" charset="0"/>
-                            </a:rPr>
-                            <m:t>𝑘</m:t>
-                          </m:r>
-                        </m:sub>
-                        <m:sup>
-                          <m:r>
-                            <a:rPr lang="en-US" i="1">
-                              <a:solidFill>
-                                <a:srgbClr val="1F2D29"/>
-                              </a:solidFill>
-                              <a:latin typeface="Cambria Math" panose="02040503050406030204" pitchFamily="18" charset="0"/>
-                            </a:rPr>
-                            <m:t>−1</m:t>
-                          </m:r>
-                        </m:sup>
-                      </m:sSubSup>
-                      <m:r>
-                        <m:rPr>
-                          <m:sty m:val="p"/>
-                        </m:rPr>
-                        <a:rPr lang="en-US">
-                          <a:solidFill>
-                            <a:srgbClr val="1F2D29"/>
-                          </a:solidFill>
-                          <a:latin typeface="Cambria Math" panose="02040503050406030204" pitchFamily="18" charset="0"/>
-                        </a:rPr>
-                        <m:t>∇</m:t>
-                      </m:r>
-                      <m:r>
-                        <a:rPr lang="en-US" i="1">
-                          <a:solidFill>
-                            <a:srgbClr val="1F2D29"/>
-                          </a:solidFill>
-                          <a:latin typeface="Cambria Math" panose="02040503050406030204" pitchFamily="18" charset="0"/>
-                        </a:rPr>
-                        <m:t>𝑓</m:t>
-                      </m:r>
-                      <m:r>
-                        <m:rPr>
-                          <m:lit/>
-                        </m:rPr>
-                        <a:rPr lang="en-US" i="1">
-                          <a:solidFill>
-                            <a:srgbClr val="1F2D29"/>
-                          </a:solidFill>
-                          <a:latin typeface="Cambria Math" panose="02040503050406030204" pitchFamily="18" charset="0"/>
-                        </a:rPr>
-                        <m:t>(</m:t>
-                      </m:r>
-                      <m:sSub>
-                        <m:sSubPr>
-                          <m:ctrlPr>
-                            <a:rPr lang="en-US" i="1">
-                              <a:solidFill>
-                                <a:srgbClr val="1F2D29"/>
-                              </a:solidFill>
-                              <a:latin typeface="Cambria Math" panose="02040503050406030204" pitchFamily="18" charset="0"/>
-                            </a:rPr>
-                          </m:ctrlPr>
-                        </m:sSubPr>
-                        <m:e>
-                          <m:r>
-                            <a:rPr lang="en-US" i="1">
-                              <a:solidFill>
-                                <a:srgbClr val="1F2D29"/>
-                              </a:solidFill>
-                              <a:latin typeface="Cambria Math" panose="02040503050406030204" pitchFamily="18" charset="0"/>
-                            </a:rPr>
-                            <m:t>𝑥</m:t>
-                          </m:r>
-                        </m:e>
-                        <m:sub>
-                          <m:r>
-                            <a:rPr lang="en-US" i="1">
-                              <a:solidFill>
-                                <a:srgbClr val="1F2D29"/>
-                              </a:solidFill>
-                              <a:latin typeface="Cambria Math" panose="02040503050406030204" pitchFamily="18" charset="0"/>
-                            </a:rPr>
-                            <m:t>𝑘</m:t>
-                          </m:r>
-                        </m:sub>
-                      </m:sSub>
-                      <m:r>
-                        <m:rPr>
-                          <m:lit/>
-                        </m:rPr>
-                        <a:rPr lang="en-US" i="1">
-                          <a:solidFill>
-                            <a:srgbClr val="1F2D29"/>
-                          </a:solidFill>
-                          <a:latin typeface="Cambria Math" panose="02040503050406030204" pitchFamily="18" charset="0"/>
-                        </a:rPr>
-                        <m:t>)</m:t>
-                      </m:r>
-                      <m:r>
-                        <a:rPr lang="en-US" i="1">
-                          <a:solidFill>
-                            <a:srgbClr val="1F2D29"/>
-                          </a:solidFill>
-                          <a:latin typeface="Cambria Math" panose="02040503050406030204" pitchFamily="18" charset="0"/>
-                        </a:rPr>
-                        <m:t> </m:t>
-                      </m:r>
-                    </m:oMath>
-                  </m:oMathPara>
-                </a14:m>
-                <a:endParaRPr lang="en-US" dirty="0">
-                  <a:solidFill>
-                    <a:srgbClr val="1F2D29"/>
-                  </a:solidFill>
-                </a:endParaRPr>
-              </a:p>
-              <a:p>
-                <a:pPr marL="0" indent="0">
-                  <a:buNone/>
-                </a:pPr>
-                <a:r>
-                  <a:rPr lang="en-US" dirty="0"/>
-                  <a:t>This minimizer, </a:t>
-                </a:r>
-                <a14:m>
-                  <m:oMath xmlns:m="http://schemas.openxmlformats.org/officeDocument/2006/math">
-                    <m:sSub>
-                      <m:sSubPr>
-                        <m:ctrlPr>
-                          <a:rPr lang="en-US" b="0" i="1" smtClean="0">
-                            <a:latin typeface="Cambria Math" panose="02040503050406030204" pitchFamily="18" charset="0"/>
-                          </a:rPr>
-                        </m:ctrlPr>
-                      </m:sSubPr>
-                      <m:e>
-                        <m:r>
-                          <a:rPr lang="en-US" b="0" i="1" smtClean="0">
-                            <a:latin typeface="Cambria Math" panose="02040503050406030204" pitchFamily="18" charset="0"/>
-                          </a:rPr>
-                          <m:t>𝑝</m:t>
-                        </m:r>
-                      </m:e>
-                      <m:sub>
-                        <m:r>
-                          <a:rPr lang="en-US" b="0" i="1" smtClean="0">
-                            <a:latin typeface="Cambria Math" panose="02040503050406030204" pitchFamily="18" charset="0"/>
-                          </a:rPr>
-                          <m:t>𝑘</m:t>
-                        </m:r>
-                      </m:sub>
-                    </m:sSub>
-                  </m:oMath>
-                </a14:m>
-                <a:r>
-                  <a:rPr lang="en-US" dirty="0"/>
-                  <a:t>  is used as the new search direction.</a:t>
-                </a:r>
-              </a:p>
-              <a:p>
-                <a:pPr marL="0" indent="0">
-                  <a:buNone/>
-                </a:pPr>
-                <a:r>
-                  <a:rPr lang="en-US" dirty="0"/>
-                  <a:t>The new iterate is </a:t>
-                </a:r>
-                <a14:m>
-                  <m:oMath xmlns:m="http://schemas.openxmlformats.org/officeDocument/2006/math">
-                    <m:sSub>
-                      <m:sSubPr>
-                        <m:ctrlPr>
-                          <a:rPr lang="en-US" b="0" i="1" dirty="0" smtClean="0">
-                            <a:latin typeface="Cambria Math" panose="02040503050406030204" pitchFamily="18" charset="0"/>
-                          </a:rPr>
-                        </m:ctrlPr>
-                      </m:sSubPr>
-                      <m:e>
-                        <m:r>
-                          <a:rPr lang="en-US" i="1" dirty="0" smtClean="0">
-                            <a:latin typeface="Cambria Math" panose="02040503050406030204" pitchFamily="18" charset="0"/>
-                          </a:rPr>
-                          <m:t>𝑥</m:t>
-                        </m:r>
-                      </m:e>
-                      <m:sub>
-                        <m:r>
-                          <a:rPr lang="en-US" b="0" i="1" dirty="0" smtClean="0">
-                            <a:latin typeface="Cambria Math" panose="02040503050406030204" pitchFamily="18" charset="0"/>
-                          </a:rPr>
-                          <m:t>𝑘</m:t>
-                        </m:r>
-                        <m:r>
-                          <a:rPr lang="en-US" b="0" i="1" dirty="0" smtClean="0">
-                            <a:latin typeface="Cambria Math" panose="02040503050406030204" pitchFamily="18" charset="0"/>
-                          </a:rPr>
-                          <m:t>+1</m:t>
-                        </m:r>
-                      </m:sub>
-                    </m:sSub>
-                    <m:r>
-                      <a:rPr lang="en-US" i="1" dirty="0" smtClean="0">
-                        <a:latin typeface="Cambria Math" panose="02040503050406030204" pitchFamily="18" charset="0"/>
-                      </a:rPr>
-                      <m:t> = </m:t>
-                    </m:r>
-                    <m:sSub>
-                      <m:sSubPr>
-                        <m:ctrlPr>
-                          <a:rPr lang="en-US" b="0" i="1" dirty="0" smtClean="0">
-                            <a:latin typeface="Cambria Math" panose="02040503050406030204" pitchFamily="18" charset="0"/>
-                          </a:rPr>
-                        </m:ctrlPr>
-                      </m:sSubPr>
-                      <m:e>
-                        <m:r>
-                          <a:rPr lang="en-US" b="0" i="1" dirty="0" smtClean="0">
-                            <a:latin typeface="Cambria Math" panose="02040503050406030204" pitchFamily="18" charset="0"/>
-                          </a:rPr>
-                          <m:t>𝑥</m:t>
-                        </m:r>
-                      </m:e>
-                      <m:sub>
-                        <m:r>
-                          <a:rPr lang="en-US" b="0" i="1" dirty="0" smtClean="0">
-                            <a:latin typeface="Cambria Math" panose="02040503050406030204" pitchFamily="18" charset="0"/>
-                          </a:rPr>
-                          <m:t>𝑘</m:t>
-                        </m:r>
-                      </m:sub>
-                    </m:sSub>
-                    <m:r>
-                      <a:rPr lang="en-US" i="1" dirty="0">
-                        <a:latin typeface="Cambria Math" panose="02040503050406030204" pitchFamily="18" charset="0"/>
-                      </a:rPr>
-                      <m:t> +</m:t>
-                    </m:r>
-                    <m:sSub>
-                      <m:sSubPr>
-                        <m:ctrlPr>
-                          <a:rPr lang="en-US" b="0" i="1" dirty="0" smtClean="0">
-                            <a:latin typeface="Cambria Math" panose="02040503050406030204" pitchFamily="18" charset="0"/>
-                          </a:rPr>
-                        </m:ctrlPr>
-                      </m:sSubPr>
-                      <m:e>
-                        <m:r>
-                          <a:rPr lang="en-US" b="0" i="1" dirty="0" smtClean="0">
-                            <a:latin typeface="Cambria Math" panose="02040503050406030204" pitchFamily="18" charset="0"/>
-                          </a:rPr>
-                          <m:t>𝛼</m:t>
-                        </m:r>
-                      </m:e>
-                      <m:sub>
-                        <m:r>
-                          <a:rPr lang="en-US" b="0" i="1" dirty="0" smtClean="0">
-                            <a:latin typeface="Cambria Math" panose="02040503050406030204" pitchFamily="18" charset="0"/>
-                          </a:rPr>
-                          <m:t>𝑘</m:t>
-                        </m:r>
-                      </m:sub>
-                    </m:sSub>
-                    <m:sSub>
-                      <m:sSubPr>
-                        <m:ctrlPr>
-                          <a:rPr lang="en-US" b="0" i="1" dirty="0" smtClean="0">
-                            <a:latin typeface="Cambria Math" panose="02040503050406030204" pitchFamily="18" charset="0"/>
-                          </a:rPr>
-                        </m:ctrlPr>
-                      </m:sSubPr>
-                      <m:e>
-                        <m:r>
-                          <a:rPr lang="en-US" i="1" dirty="0">
-                            <a:latin typeface="Cambria Math" panose="02040503050406030204" pitchFamily="18" charset="0"/>
-                          </a:rPr>
-                          <m:t>𝑝</m:t>
-                        </m:r>
-                      </m:e>
-                      <m:sub>
-                        <m:r>
-                          <a:rPr lang="en-US" b="0" i="1" dirty="0" smtClean="0">
-                            <a:latin typeface="Cambria Math" panose="02040503050406030204" pitchFamily="18" charset="0"/>
-                          </a:rPr>
-                          <m:t>𝑘</m:t>
-                        </m:r>
-                      </m:sub>
-                    </m:sSub>
-                  </m:oMath>
-                </a14:m>
-                <a:r>
-                  <a:rPr lang="en-US" dirty="0"/>
-                  <a:t>, where the step length </a:t>
-                </a:r>
-                <a14:m>
-                  <m:oMath xmlns:m="http://schemas.openxmlformats.org/officeDocument/2006/math">
-                    <m:sSub>
-                      <m:sSubPr>
-                        <m:ctrlPr>
-                          <a:rPr lang="en-US" b="0" i="1" smtClean="0">
-                            <a:latin typeface="Cambria Math" panose="02040503050406030204" pitchFamily="18" charset="0"/>
-                          </a:rPr>
-                        </m:ctrlPr>
-                      </m:sSubPr>
-                      <m:e>
-                        <m:r>
-                          <a:rPr lang="en-US" b="0" i="1" smtClean="0">
-                            <a:latin typeface="Cambria Math" panose="02040503050406030204" pitchFamily="18" charset="0"/>
-                          </a:rPr>
-                          <m:t>𝛼</m:t>
-                        </m:r>
-                      </m:e>
-                      <m:sub>
-                        <m:r>
-                          <a:rPr lang="en-US" b="0" i="1" smtClean="0">
-                            <a:latin typeface="Cambria Math" panose="02040503050406030204" pitchFamily="18" charset="0"/>
-                          </a:rPr>
-                          <m:t>𝑘</m:t>
-                        </m:r>
-                      </m:sub>
-                    </m:sSub>
-                  </m:oMath>
-                </a14:m>
-                <a:r>
-                  <a:rPr lang="en-US" dirty="0"/>
-                  <a:t> is chosen to satisfy the Wolfe conditions. </a:t>
-                </a:r>
-              </a:p>
-              <a:p>
-                <a:pPr marL="0" indent="0">
-                  <a:buNone/>
-                </a:pPr>
-                <a:endParaRPr lang="en-US" b="0" dirty="0">
-                  <a:solidFill>
-                    <a:srgbClr val="1F2D29"/>
-                  </a:solidFill>
-                </a:endParaRPr>
-              </a:p>
-            </p:txBody>
-          </p:sp>
-        </mc:Choice>
-        <mc:Fallback>
-          <p:sp>
-            <p:nvSpPr>
-              <p:cNvPr id="3" name="Content Placeholder 2">
-                <a:extLst>
-                  <a:ext uri="{FF2B5EF4-FFF2-40B4-BE49-F238E27FC236}">
-                    <a16:creationId xmlns:a16="http://schemas.microsoft.com/office/drawing/2014/main" id="{ECC5CEA5-34A6-FB08-4686-EB905E2EE3C7}"/>
-                  </a:ext>
-                </a:extLst>
-              </p:cNvPr>
-              <p:cNvSpPr>
-                <a:spLocks noGrp="1" noRot="1" noChangeAspect="1" noMove="1" noResize="1" noEditPoints="1" noAdjustHandles="1" noChangeArrowheads="1" noChangeShapeType="1" noTextEdit="1"/>
-              </p:cNvSpPr>
-              <p:nvPr>
-                <p:ph idx="1"/>
-              </p:nvPr>
-            </p:nvSpPr>
-            <p:spPr>
-              <a:xfrm>
-                <a:off x="2302933" y="2641604"/>
-                <a:ext cx="7621606" cy="3874943"/>
-              </a:xfrm>
-              <a:blipFill>
-                <a:blip r:embed="rId4"/>
-                <a:stretch>
-                  <a:fillRect l="-832" r="-666"/>
-                </a:stretch>
-              </a:blipFill>
-            </p:spPr>
-            <p:txBody>
-              <a:bodyPr/>
-              <a:lstStyle/>
-              <a:p>
-                <a:r>
-                  <a:rPr lang="en-IL">
-                    <a:noFill/>
-                  </a:rPr>
-                  <a:t> </a:t>
-                </a:r>
-              </a:p>
-            </p:txBody>
-          </p:sp>
-        </mc:Fallback>
-      </mc:AlternateContent>
-    </p:spTree>
-    <p:extLst>
-      <p:ext uri="{BB962C8B-B14F-4D97-AF65-F5344CB8AC3E}">
-        <p14:creationId xmlns:p14="http://schemas.microsoft.com/office/powerpoint/2010/main" val="4232583844"/>
-      </p:ext>
-    </p:extLst>
-  </p:cSld>
-  <p:clrMapOvr>
-    <a:overrideClrMapping bg1="lt1" tx1="dk1" bg2="lt2" tx2="dk2" accent1="accent1" accent2="accent2" accent3="accent3" accent4="accent4" accent5="accent5" accent6="accent6" hlink="hlink" folHlink="folHlink"/>
-  </p:clrMapOvr>
-</p:sld>
-</file>
-
-<file path=ppt/slides/slide11.xml><?xml version="1.0" encoding="utf-8"?>
-<p:sld xmlns:a="http://schemas.openxmlformats.org/drawingml/2006/main" xmlns:r="http://schemas.openxmlformats.org/officeDocument/2006/relationships" xmlns:p="http://schemas.openxmlformats.org/presentationml/2006/main">
-  <p:cSld>
-    <p:bg>
-      <p:bgPr>
-        <a:solidFill>
-          <a:schemeClr val="bg1"/>
-        </a:solidFill>
-        <a:effectLst/>
-      </p:bgPr>
-    </p:bg>
-    <p:spTree>
-      <p:nvGrpSpPr>
-        <p:cNvPr id="1" name=""/>
-        <p:cNvGrpSpPr/>
-        <p:nvPr/>
-      </p:nvGrpSpPr>
-      <p:grpSpPr>
-        <a:xfrm>
-          <a:off x="0" y="0"/>
-          <a:ext cx="0" cy="0"/>
-          <a:chOff x="0" y="0"/>
-          <a:chExt cx="0" cy="0"/>
-        </a:xfrm>
-      </p:grpSpPr>
-      <p:sp>
-        <p:nvSpPr>
-          <p:cNvPr id="8" name="Rectangle 7">
-            <a:extLst>
-              <a:ext uri="{FF2B5EF4-FFF2-40B4-BE49-F238E27FC236}">
-                <a16:creationId xmlns:a16="http://schemas.microsoft.com/office/drawing/2014/main" id="{D0BE3D13-5BE5-4B05-AFCF-2A2E059D29F8}"/>
-              </a:ext>
-              <a:ext uri="{C183D7F6-B498-43B3-948B-1728B52AA6E4}">
-                <adec:decorative xmlns:adec="http://schemas.microsoft.com/office/drawing/2017/decorative" val="1"/>
-              </a:ext>
-            </a:extLst>
-          </p:cNvPr>
-          <p:cNvSpPr>
-            <a:spLocks noGrp="1" noRot="1" noChangeAspect="1" noMove="1" noResize="1" noEditPoints="1" noAdjustHandles="1" noChangeArrowheads="1" noChangeShapeType="1" noTextEdit="1"/>
-          </p:cNvSpPr>
-          <p:nvPr>
-            <p:extLst>
-              <p:ext uri="{386F3935-93C4-4BCD-93E2-E3B085C9AB24}">
-                <p16:designElem xmlns:p16="http://schemas.microsoft.com/office/powerpoint/2015/main" val="1"/>
-              </p:ext>
-            </p:extLst>
-          </p:nvPr>
-        </p:nvSpPr>
-        <p:spPr>
-          <a:xfrm>
-            <a:off x="0" y="-1"/>
-            <a:ext cx="12192000" cy="6858001"/>
-          </a:xfrm>
-          <a:prstGeom prst="rect">
-            <a:avLst/>
-          </a:prstGeom>
-          <a:solidFill>
-            <a:srgbClr val="FFFFFF"/>
-          </a:solidFill>
-          <a:ln>
-            <a:noFill/>
-          </a:ln>
-        </p:spPr>
-        <p:style>
-          <a:lnRef idx="2">
-            <a:schemeClr val="accent1">
-              <a:shade val="50000"/>
-            </a:schemeClr>
-          </a:lnRef>
-          <a:fillRef idx="1">
-            <a:schemeClr val="accent1"/>
-          </a:fillRef>
-          <a:effectRef idx="0">
-            <a:schemeClr val="accent1"/>
-          </a:effectRef>
-          <a:fontRef idx="minor">
-            <a:schemeClr val="lt1"/>
-          </a:fontRef>
-        </p:style>
-        <p:txBody>
-          <a:bodyPr rtlCol="0" anchor="ctr"/>
-          <a:lstStyle/>
-          <a:p>
-            <a:pPr algn="ctr"/>
-            <a:endParaRPr lang="en-US"/>
-          </a:p>
-        </p:txBody>
-      </p:sp>
-      <p:sp>
-        <p:nvSpPr>
-          <p:cNvPr id="10" name="Oval 9">
-            <a:extLst>
-              <a:ext uri="{FF2B5EF4-FFF2-40B4-BE49-F238E27FC236}">
-                <a16:creationId xmlns:a16="http://schemas.microsoft.com/office/drawing/2014/main" id="{1AC85C80-0175-4214-A13D-03C224658C16}"/>
-              </a:ext>
-              <a:ext uri="{C183D7F6-B498-43B3-948B-1728B52AA6E4}">
-                <adec:decorative xmlns:adec="http://schemas.microsoft.com/office/drawing/2017/decorative" val="1"/>
-              </a:ext>
-            </a:extLst>
-          </p:cNvPr>
-          <p:cNvSpPr>
-            <a:spLocks noGrp="1" noRot="1" noChangeAspect="1" noMove="1" noResize="1" noEditPoints="1" noAdjustHandles="1" noChangeArrowheads="1" noChangeShapeType="1" noTextEdit="1"/>
-          </p:cNvSpPr>
-          <p:nvPr>
-            <p:extLst>
-              <p:ext uri="{386F3935-93C4-4BCD-93E2-E3B085C9AB24}">
-                <p16:designElem xmlns:p16="http://schemas.microsoft.com/office/powerpoint/2015/main" val="1"/>
-              </p:ext>
-            </p:extLst>
-          </p:nvPr>
-        </p:nvSpPr>
-        <p:spPr>
-          <a:xfrm>
-            <a:off x="1770108" y="985292"/>
-            <a:ext cx="1345319" cy="1345319"/>
-          </a:xfrm>
-          <a:prstGeom prst="ellipse">
-            <a:avLst/>
-          </a:prstGeom>
-          <a:solidFill>
-            <a:schemeClr val="accent1">
-              <a:lumMod val="40000"/>
-              <a:lumOff val="60000"/>
-            </a:schemeClr>
-          </a:solidFill>
-          <a:ln>
-            <a:noFill/>
-          </a:ln>
-        </p:spPr>
-        <p:style>
-          <a:lnRef idx="2">
-            <a:schemeClr val="accent1">
-              <a:shade val="50000"/>
-            </a:schemeClr>
-          </a:lnRef>
-          <a:fillRef idx="1">
-            <a:schemeClr val="accent1"/>
-          </a:fillRef>
-          <a:effectRef idx="0">
-            <a:schemeClr val="accent1"/>
-          </a:effectRef>
-          <a:fontRef idx="minor">
-            <a:schemeClr val="lt1"/>
-          </a:fontRef>
-        </p:style>
-        <p:txBody>
-          <a:bodyPr rtlCol="0" anchor="ctr"/>
-          <a:lstStyle/>
-          <a:p>
-            <a:pPr algn="ctr"/>
-            <a:endParaRPr lang="en-US"/>
-          </a:p>
-        </p:txBody>
-      </p:sp>
-      <p:pic>
-        <p:nvPicPr>
-          <p:cNvPr id="12" name="Picture 11">
-            <a:extLst>
-              <a:ext uri="{FF2B5EF4-FFF2-40B4-BE49-F238E27FC236}">
-                <a16:creationId xmlns:a16="http://schemas.microsoft.com/office/drawing/2014/main" id="{15ADB788-8569-409E-862D-665AD53C9904}"/>
-              </a:ext>
-              <a:ext uri="{C183D7F6-B498-43B3-948B-1728B52AA6E4}">
-                <adec:decorative xmlns:adec="http://schemas.microsoft.com/office/drawing/2017/decorative" val="1"/>
-              </a:ext>
-            </a:extLst>
-          </p:cNvPr>
-          <p:cNvPicPr>
-            <a:picLocks noGrp="1" noRot="1" noChangeAspect="1" noMove="1" noResize="1" noEditPoints="1" noAdjustHandles="1" noChangeArrowheads="1" noChangeShapeType="1" noCrop="1"/>
-          </p:cNvPicPr>
-          <p:nvPr>
-            <p:extLst>
-              <p:ext uri="{386F3935-93C4-4BCD-93E2-E3B085C9AB24}">
-                <p16:designElem xmlns:p16="http://schemas.microsoft.com/office/powerpoint/2015/main" val="1"/>
-              </p:ext>
-            </p:extLst>
-          </p:nvPr>
-        </p:nvPicPr>
-        <p:blipFill>
-          <a:blip r:embed="rId3">
-            <a:extLst>
-              <a:ext uri="{28A0092B-C50C-407E-A947-70E740481C1C}">
-                <a14:useLocalDpi xmlns:a14="http://schemas.microsoft.com/office/drawing/2010/main" val="0"/>
-              </a:ext>
-            </a:extLst>
-          </a:blip>
-          <a:stretch>
-            <a:fillRect/>
-          </a:stretch>
-        </p:blipFill>
-        <p:spPr>
-          <a:xfrm>
-            <a:off x="0" y="0"/>
-            <a:ext cx="12189867" cy="6858000"/>
-          </a:xfrm>
-          <a:prstGeom prst="rect">
-            <a:avLst/>
-          </a:prstGeom>
-        </p:spPr>
-      </p:pic>
-      <p:sp>
-        <p:nvSpPr>
-          <p:cNvPr id="2" name="Title 1">
-            <a:extLst>
-              <a:ext uri="{FF2B5EF4-FFF2-40B4-BE49-F238E27FC236}">
-                <a16:creationId xmlns:a16="http://schemas.microsoft.com/office/drawing/2014/main" id="{A7B4661C-FED8-5AC1-EB65-9274A85B981F}"/>
-              </a:ext>
-            </a:extLst>
-          </p:cNvPr>
-          <p:cNvSpPr>
-            <a:spLocks noGrp="1"/>
-          </p:cNvSpPr>
-          <p:nvPr>
-            <p:ph type="title"/>
-          </p:nvPr>
-        </p:nvSpPr>
-        <p:spPr>
-          <a:xfrm>
-            <a:off x="2611808" y="1022548"/>
-            <a:ext cx="7958331" cy="1308063"/>
-          </a:xfrm>
-        </p:spPr>
-        <p:txBody>
-          <a:bodyPr anchor="b">
-            <a:normAutofit/>
-          </a:bodyPr>
-          <a:lstStyle/>
-          <a:p>
-            <a:pPr algn="l"/>
-            <a:r>
-              <a:rPr lang="en-IL" sz="4400">
-                <a:solidFill>
-                  <a:srgbClr val="1F2D29"/>
-                </a:solidFill>
-              </a:rPr>
-              <a:t>Quasi-Newton methods</a:t>
-            </a:r>
-          </a:p>
-        </p:txBody>
-      </p:sp>
-      <p:sp>
-        <p:nvSpPr>
-          <p:cNvPr id="14" name="Rectangle 13">
-            <a:extLst>
-              <a:ext uri="{FF2B5EF4-FFF2-40B4-BE49-F238E27FC236}">
-                <a16:creationId xmlns:a16="http://schemas.microsoft.com/office/drawing/2014/main" id="{76562092-3AA7-4EF0-9007-C44F879A1308}"/>
-              </a:ext>
-              <a:ext uri="{C183D7F6-B498-43B3-948B-1728B52AA6E4}">
-                <adec:decorative xmlns:adec="http://schemas.microsoft.com/office/drawing/2017/decorative" val="1"/>
-              </a:ext>
-            </a:extLst>
-          </p:cNvPr>
-          <p:cNvSpPr>
-            <a:spLocks noGrp="1" noRot="1" noChangeAspect="1" noMove="1" noResize="1" noEditPoints="1" noAdjustHandles="1" noChangeArrowheads="1" noChangeShapeType="1" noTextEdit="1"/>
-          </p:cNvSpPr>
-          <p:nvPr>
-            <p:extLst>
-              <p:ext uri="{386F3935-93C4-4BCD-93E2-E3B085C9AB24}">
-                <p16:designElem xmlns:p16="http://schemas.microsoft.com/office/powerpoint/2015/main" val="1"/>
-              </p:ext>
-            </p:extLst>
-          </p:nvPr>
-        </p:nvSpPr>
-        <p:spPr>
-          <a:xfrm>
-            <a:off x="0" y="0"/>
-            <a:ext cx="964174" cy="6858000"/>
-          </a:xfrm>
-          <a:prstGeom prst="rect">
-            <a:avLst/>
-          </a:prstGeom>
-          <a:solidFill>
-            <a:srgbClr val="314740"/>
-          </a:solidFill>
-          <a:ln>
-            <a:noFill/>
-          </a:ln>
-        </p:spPr>
-        <p:style>
-          <a:lnRef idx="2">
-            <a:schemeClr val="accent1">
-              <a:shade val="50000"/>
-            </a:schemeClr>
-          </a:lnRef>
-          <a:fillRef idx="1">
-            <a:schemeClr val="accent1"/>
-          </a:fillRef>
-          <a:effectRef idx="0">
-            <a:schemeClr val="accent1"/>
-          </a:effectRef>
-          <a:fontRef idx="minor">
-            <a:schemeClr val="lt1"/>
-          </a:fontRef>
-        </p:style>
-      </p:sp>
-      <mc:AlternateContent xmlns:mc="http://schemas.openxmlformats.org/markup-compatibility/2006">
-        <mc:Choice xmlns:a14="http://schemas.microsoft.com/office/drawing/2010/main" Requires="a14">
+      <mc:AlternateContent xmlns:mc="http://schemas.openxmlformats.org/markup-compatibility/2006" xmlns:a14="http://schemas.microsoft.com/office/drawing/2010/main">
+        <mc:Choice Requires="a14">
           <p:sp>
             <p:nvSpPr>
               <p:cNvPr id="3" name="Content Placeholder 2">
@@ -8305,7 +7179,7 @@
             </p:txBody>
           </p:sp>
         </mc:Choice>
-        <mc:Fallback>
+        <mc:Fallback xmlns="">
           <p:sp>
             <p:nvSpPr>
               <p:cNvPr id="3" name="Content Placeholder 2">
@@ -8362,7 +7236,7 @@
 </p:sld>
 </file>
 
-<file path=ppt/slides/slide12.xml><?xml version="1.0" encoding="utf-8"?>
+<file path=ppt/slides/slide11.xml><?xml version="1.0" encoding="utf-8"?>
 <p:sld xmlns:a="http://schemas.openxmlformats.org/drawingml/2006/main" xmlns:r="http://schemas.openxmlformats.org/officeDocument/2006/relationships" xmlns:p="http://schemas.openxmlformats.org/presentationml/2006/main">
   <p:cSld>
     <p:bg>
@@ -8656,8 +7530,8 @@
           </a:fontRef>
         </p:style>
       </p:sp>
-      <mc:AlternateContent xmlns:mc="http://schemas.openxmlformats.org/markup-compatibility/2006">
-        <mc:Choice xmlns:a14="http://schemas.microsoft.com/office/drawing/2010/main" Requires="a14">
+      <mc:AlternateContent xmlns:mc="http://schemas.openxmlformats.org/markup-compatibility/2006" xmlns:a14="http://schemas.microsoft.com/office/drawing/2010/main">
+        <mc:Choice Requires="a14">
           <p:sp>
             <p:nvSpPr>
               <p:cNvPr id="3" name="Content Placeholder 2">
@@ -10187,16 +9061,7 @@
                         </a:solidFill>
                         <a:latin typeface="Cambria Math" panose="02040503050406030204" pitchFamily="18" charset="0"/>
                       </a:rPr>
-                      <m:t>)</m:t>
-                    </m:r>
-                    <m:r>
-                      <a:rPr lang="en-US" i="1">
-                        <a:solidFill>
-                          <a:srgbClr val="1F2D29"/>
-                        </a:solidFill>
-                        <a:latin typeface="Cambria Math" panose="02040503050406030204" pitchFamily="18" charset="0"/>
-                      </a:rPr>
-                      <m:t> −</m:t>
+                      <m:t>) −</m:t>
                     </m:r>
                     <m:r>
                       <m:rPr>
@@ -10305,7 +9170,7 @@
             </p:txBody>
           </p:sp>
         </mc:Choice>
-        <mc:Fallback>
+        <mc:Fallback xmlns="">
           <p:sp>
             <p:nvSpPr>
               <p:cNvPr id="3" name="Content Placeholder 2">
@@ -10362,7 +9227,7 @@
 </p:sld>
 </file>
 
-<file path=ppt/slides/slide13.xml><?xml version="1.0" encoding="utf-8"?>
+<file path=ppt/slides/slide12.xml><?xml version="1.0" encoding="utf-8"?>
 <p:sld xmlns:a="http://schemas.openxmlformats.org/drawingml/2006/main" xmlns:r="http://schemas.openxmlformats.org/officeDocument/2006/relationships" xmlns:p="http://schemas.openxmlformats.org/presentationml/2006/main">
   <p:cSld>
     <p:bg>
@@ -10656,8 +9521,8 @@
           </a:fontRef>
         </p:style>
       </p:sp>
-      <mc:AlternateContent xmlns:mc="http://schemas.openxmlformats.org/markup-compatibility/2006">
-        <mc:Choice xmlns:a14="http://schemas.microsoft.com/office/drawing/2010/main" Requires="a14">
+      <mc:AlternateContent xmlns:mc="http://schemas.openxmlformats.org/markup-compatibility/2006" xmlns:a14="http://schemas.microsoft.com/office/drawing/2010/main">
+        <mc:Choice Requires="a14">
           <p:sp>
             <p:nvSpPr>
               <p:cNvPr id="3" name="Content Placeholder 2">
@@ -10867,7 +9732,7 @@
             </p:txBody>
           </p:sp>
         </mc:Choice>
-        <mc:Fallback>
+        <mc:Fallback xmlns="">
           <p:sp>
             <p:nvSpPr>
               <p:cNvPr id="3" name="Content Placeholder 2">
@@ -10924,7 +9789,7 @@
 </p:sld>
 </file>
 
-<file path=ppt/slides/slide14.xml><?xml version="1.0" encoding="utf-8"?>
+<file path=ppt/slides/slide13.xml><?xml version="1.0" encoding="utf-8"?>
 <p:sld xmlns:a="http://schemas.openxmlformats.org/drawingml/2006/main" xmlns:r="http://schemas.openxmlformats.org/officeDocument/2006/relationships" xmlns:p="http://schemas.openxmlformats.org/presentationml/2006/main">
   <p:cSld>
     <p:bg>
@@ -11406,7 +10271,7 @@
 </p:sld>
 </file>
 
-<file path=ppt/slides/slide15.xml><?xml version="1.0" encoding="utf-8"?>
+<file path=ppt/slides/slide14.xml><?xml version="1.0" encoding="utf-8"?>
 <p:sld xmlns:a="http://schemas.openxmlformats.org/drawingml/2006/main" xmlns:r="http://schemas.openxmlformats.org/officeDocument/2006/relationships" xmlns:p="http://schemas.openxmlformats.org/presentationml/2006/main">
   <p:cSld>
     <p:bg>
@@ -11700,8 +10565,8 @@
           </a:fontRef>
         </p:style>
       </p:sp>
-      <mc:AlternateContent xmlns:mc="http://schemas.openxmlformats.org/markup-compatibility/2006">
-        <mc:Choice xmlns:a14="http://schemas.microsoft.com/office/drawing/2010/main" Requires="a14">
+      <mc:AlternateContent xmlns:mc="http://schemas.openxmlformats.org/markup-compatibility/2006" xmlns:a14="http://schemas.microsoft.com/office/drawing/2010/main">
+        <mc:Choice Requires="a14">
           <p:sp>
             <p:nvSpPr>
               <p:cNvPr id="3" name="Content Placeholder 2">
@@ -11922,7 +10787,7 @@
             </p:txBody>
           </p:sp>
         </mc:Choice>
-        <mc:Fallback>
+        <mc:Fallback xmlns="">
           <p:sp>
             <p:nvSpPr>
               <p:cNvPr id="3" name="Content Placeholder 2">
@@ -11979,7 +10844,7 @@
 </p:sld>
 </file>
 
-<file path=ppt/slides/slide16.xml><?xml version="1.0" encoding="utf-8"?>
+<file path=ppt/slides/slide15.xml><?xml version="1.0" encoding="utf-8"?>
 <p:sld xmlns:a="http://schemas.openxmlformats.org/drawingml/2006/main" xmlns:r="http://schemas.openxmlformats.org/officeDocument/2006/relationships" xmlns:p="http://schemas.openxmlformats.org/presentationml/2006/main">
   <p:cSld>
     <p:bg>
@@ -12975,7 +11840,7 @@
 </p:sld>
 </file>
 
-<file path=ppt/slides/slide17.xml><?xml version="1.0" encoding="utf-8"?>
+<file path=ppt/slides/slide16.xml><?xml version="1.0" encoding="utf-8"?>
 <p:sld xmlns:a="http://schemas.openxmlformats.org/drawingml/2006/main" xmlns:r="http://schemas.openxmlformats.org/officeDocument/2006/relationships" xmlns:p="http://schemas.openxmlformats.org/presentationml/2006/main">
   <p:cSld>
     <p:bg>
@@ -14104,7 +12969,7 @@
 </p:sld>
 </file>
 
-<file path=ppt/slides/slide18.xml><?xml version="1.0" encoding="utf-8"?>
+<file path=ppt/slides/slide17.xml><?xml version="1.0" encoding="utf-8"?>
 <p:sld xmlns:a="http://schemas.openxmlformats.org/drawingml/2006/main" xmlns:r="http://schemas.openxmlformats.org/officeDocument/2006/relationships" xmlns:p="http://schemas.openxmlformats.org/presentationml/2006/main">
   <p:cSld>
     <p:bg>
@@ -15882,7 +14747,7 @@
 </p:sld>
 </file>
 
-<file path=ppt/slides/slide19.xml><?xml version="1.0" encoding="utf-8"?>
+<file path=ppt/slides/slide18.xml><?xml version="1.0" encoding="utf-8"?>
 <p:sld xmlns:a="http://schemas.openxmlformats.org/drawingml/2006/main" xmlns:r="http://schemas.openxmlformats.org/officeDocument/2006/relationships" xmlns:p="http://schemas.openxmlformats.org/presentationml/2006/main">
   <p:cSld>
     <p:bg>
@@ -16948,395 +15813,7 @@
 </p:sld>
 </file>
 
-<file path=ppt/slides/slide2.xml><?xml version="1.0" encoding="utf-8"?>
-<p:sld xmlns:a="http://schemas.openxmlformats.org/drawingml/2006/main" xmlns:r="http://schemas.openxmlformats.org/officeDocument/2006/relationships" xmlns:p="http://schemas.openxmlformats.org/presentationml/2006/main">
-  <p:cSld>
-    <p:bg>
-      <p:bgPr>
-        <a:solidFill>
-          <a:schemeClr val="bg1"/>
-        </a:solidFill>
-        <a:effectLst/>
-      </p:bgPr>
-    </p:bg>
-    <p:spTree>
-      <p:nvGrpSpPr>
-        <p:cNvPr id="1" name=""/>
-        <p:cNvGrpSpPr/>
-        <p:nvPr/>
-      </p:nvGrpSpPr>
-      <p:grpSpPr>
-        <a:xfrm>
-          <a:off x="0" y="0"/>
-          <a:ext cx="0" cy="0"/>
-          <a:chOff x="0" y="0"/>
-          <a:chExt cx="0" cy="0"/>
-        </a:xfrm>
-      </p:grpSpPr>
-      <p:sp>
-        <p:nvSpPr>
-          <p:cNvPr id="8" name="Rectangle 7">
-            <a:extLst>
-              <a:ext uri="{FF2B5EF4-FFF2-40B4-BE49-F238E27FC236}">
-                <a16:creationId xmlns:a16="http://schemas.microsoft.com/office/drawing/2014/main" id="{D0BE3D13-5BE5-4B05-AFCF-2A2E059D29F8}"/>
-              </a:ext>
-              <a:ext uri="{C183D7F6-B498-43B3-948B-1728B52AA6E4}">
-                <adec:decorative xmlns:adec="http://schemas.microsoft.com/office/drawing/2017/decorative" val="1"/>
-              </a:ext>
-            </a:extLst>
-          </p:cNvPr>
-          <p:cNvSpPr>
-            <a:spLocks noGrp="1" noRot="1" noChangeAspect="1" noMove="1" noResize="1" noEditPoints="1" noAdjustHandles="1" noChangeArrowheads="1" noChangeShapeType="1" noTextEdit="1"/>
-          </p:cNvSpPr>
-          <p:nvPr>
-            <p:extLst>
-              <p:ext uri="{386F3935-93C4-4BCD-93E2-E3B085C9AB24}">
-                <p16:designElem xmlns:p16="http://schemas.microsoft.com/office/powerpoint/2015/main" val="1"/>
-              </p:ext>
-            </p:extLst>
-          </p:nvPr>
-        </p:nvSpPr>
-        <p:spPr>
-          <a:xfrm>
-            <a:off x="0" y="-1"/>
-            <a:ext cx="12192000" cy="6858001"/>
-          </a:xfrm>
-          <a:prstGeom prst="rect">
-            <a:avLst/>
-          </a:prstGeom>
-          <a:solidFill>
-            <a:srgbClr val="FFFFFF"/>
-          </a:solidFill>
-          <a:ln>
-            <a:noFill/>
-          </a:ln>
-        </p:spPr>
-        <p:style>
-          <a:lnRef idx="2">
-            <a:schemeClr val="accent1">
-              <a:shade val="50000"/>
-            </a:schemeClr>
-          </a:lnRef>
-          <a:fillRef idx="1">
-            <a:schemeClr val="accent1"/>
-          </a:fillRef>
-          <a:effectRef idx="0">
-            <a:schemeClr val="accent1"/>
-          </a:effectRef>
-          <a:fontRef idx="minor">
-            <a:schemeClr val="lt1"/>
-          </a:fontRef>
-        </p:style>
-        <p:txBody>
-          <a:bodyPr rtlCol="0" anchor="ctr"/>
-          <a:lstStyle/>
-          <a:p>
-            <a:pPr algn="ctr"/>
-            <a:endParaRPr lang="en-US"/>
-          </a:p>
-        </p:txBody>
-      </p:sp>
-      <p:sp>
-        <p:nvSpPr>
-          <p:cNvPr id="10" name="Oval 9">
-            <a:extLst>
-              <a:ext uri="{FF2B5EF4-FFF2-40B4-BE49-F238E27FC236}">
-                <a16:creationId xmlns:a16="http://schemas.microsoft.com/office/drawing/2014/main" id="{1AC85C80-0175-4214-A13D-03C224658C16}"/>
-              </a:ext>
-              <a:ext uri="{C183D7F6-B498-43B3-948B-1728B52AA6E4}">
-                <adec:decorative xmlns:adec="http://schemas.microsoft.com/office/drawing/2017/decorative" val="1"/>
-              </a:ext>
-            </a:extLst>
-          </p:cNvPr>
-          <p:cNvSpPr>
-            <a:spLocks noGrp="1" noRot="1" noChangeAspect="1" noMove="1" noResize="1" noEditPoints="1" noAdjustHandles="1" noChangeArrowheads="1" noChangeShapeType="1" noTextEdit="1"/>
-          </p:cNvSpPr>
-          <p:nvPr>
-            <p:extLst>
-              <p:ext uri="{386F3935-93C4-4BCD-93E2-E3B085C9AB24}">
-                <p16:designElem xmlns:p16="http://schemas.microsoft.com/office/powerpoint/2015/main" val="1"/>
-              </p:ext>
-            </p:extLst>
-          </p:nvPr>
-        </p:nvSpPr>
-        <p:spPr>
-          <a:xfrm>
-            <a:off x="1770108" y="985292"/>
-            <a:ext cx="1345319" cy="1345319"/>
-          </a:xfrm>
-          <a:prstGeom prst="ellipse">
-            <a:avLst/>
-          </a:prstGeom>
-          <a:solidFill>
-            <a:schemeClr val="accent1">
-              <a:lumMod val="40000"/>
-              <a:lumOff val="60000"/>
-            </a:schemeClr>
-          </a:solidFill>
-          <a:ln>
-            <a:noFill/>
-          </a:ln>
-        </p:spPr>
-        <p:style>
-          <a:lnRef idx="2">
-            <a:schemeClr val="accent1">
-              <a:shade val="50000"/>
-            </a:schemeClr>
-          </a:lnRef>
-          <a:fillRef idx="1">
-            <a:schemeClr val="accent1"/>
-          </a:fillRef>
-          <a:effectRef idx="0">
-            <a:schemeClr val="accent1"/>
-          </a:effectRef>
-          <a:fontRef idx="minor">
-            <a:schemeClr val="lt1"/>
-          </a:fontRef>
-        </p:style>
-        <p:txBody>
-          <a:bodyPr rtlCol="0" anchor="ctr"/>
-          <a:lstStyle/>
-          <a:p>
-            <a:pPr algn="ctr"/>
-            <a:endParaRPr lang="en-US"/>
-          </a:p>
-        </p:txBody>
-      </p:sp>
-      <p:pic>
-        <p:nvPicPr>
-          <p:cNvPr id="12" name="Picture 11">
-            <a:extLst>
-              <a:ext uri="{FF2B5EF4-FFF2-40B4-BE49-F238E27FC236}">
-                <a16:creationId xmlns:a16="http://schemas.microsoft.com/office/drawing/2014/main" id="{15ADB788-8569-409E-862D-665AD53C9904}"/>
-              </a:ext>
-              <a:ext uri="{C183D7F6-B498-43B3-948B-1728B52AA6E4}">
-                <adec:decorative xmlns:adec="http://schemas.microsoft.com/office/drawing/2017/decorative" val="1"/>
-              </a:ext>
-            </a:extLst>
-          </p:cNvPr>
-          <p:cNvPicPr>
-            <a:picLocks noGrp="1" noRot="1" noChangeAspect="1" noMove="1" noResize="1" noEditPoints="1" noAdjustHandles="1" noChangeArrowheads="1" noChangeShapeType="1" noCrop="1"/>
-          </p:cNvPicPr>
-          <p:nvPr>
-            <p:extLst>
-              <p:ext uri="{386F3935-93C4-4BCD-93E2-E3B085C9AB24}">
-                <p16:designElem xmlns:p16="http://schemas.microsoft.com/office/powerpoint/2015/main" val="1"/>
-              </p:ext>
-            </p:extLst>
-          </p:nvPr>
-        </p:nvPicPr>
-        <p:blipFill>
-          <a:blip r:embed="rId2">
-            <a:extLst>
-              <a:ext uri="{28A0092B-C50C-407E-A947-70E740481C1C}">
-                <a14:useLocalDpi xmlns:a14="http://schemas.microsoft.com/office/drawing/2010/main" val="0"/>
-              </a:ext>
-            </a:extLst>
-          </a:blip>
-          <a:stretch>
-            <a:fillRect/>
-          </a:stretch>
-        </p:blipFill>
-        <p:spPr>
-          <a:xfrm>
-            <a:off x="0" y="0"/>
-            <a:ext cx="12189867" cy="6858000"/>
-          </a:xfrm>
-          <a:prstGeom prst="rect">
-            <a:avLst/>
-          </a:prstGeom>
-        </p:spPr>
-      </p:pic>
-      <p:sp>
-        <p:nvSpPr>
-          <p:cNvPr id="2" name="Title 1">
-            <a:extLst>
-              <a:ext uri="{FF2B5EF4-FFF2-40B4-BE49-F238E27FC236}">
-                <a16:creationId xmlns:a16="http://schemas.microsoft.com/office/drawing/2014/main" id="{A7B4661C-FED8-5AC1-EB65-9274A85B981F}"/>
-              </a:ext>
-            </a:extLst>
-          </p:cNvPr>
-          <p:cNvSpPr>
-            <a:spLocks noGrp="1"/>
-          </p:cNvSpPr>
-          <p:nvPr>
-            <p:ph type="title"/>
-          </p:nvPr>
-        </p:nvSpPr>
-        <p:spPr>
-          <a:xfrm>
-            <a:off x="2611808" y="1022548"/>
-            <a:ext cx="7958331" cy="1308063"/>
-          </a:xfrm>
-        </p:spPr>
-        <p:txBody>
-          <a:bodyPr anchor="b">
-            <a:normAutofit/>
-          </a:bodyPr>
-          <a:lstStyle/>
-          <a:p>
-            <a:pPr algn="l"/>
-            <a:r>
-              <a:rPr lang="en-IL" sz="4400">
-                <a:solidFill>
-                  <a:srgbClr val="1F2D29"/>
-                </a:solidFill>
-              </a:rPr>
-              <a:t>Matrix decomposition</a:t>
-            </a:r>
-          </a:p>
-        </p:txBody>
-      </p:sp>
-      <p:sp>
-        <p:nvSpPr>
-          <p:cNvPr id="14" name="Rectangle 13">
-            <a:extLst>
-              <a:ext uri="{FF2B5EF4-FFF2-40B4-BE49-F238E27FC236}">
-                <a16:creationId xmlns:a16="http://schemas.microsoft.com/office/drawing/2014/main" id="{76562092-3AA7-4EF0-9007-C44F879A1308}"/>
-              </a:ext>
-              <a:ext uri="{C183D7F6-B498-43B3-948B-1728B52AA6E4}">
-                <adec:decorative xmlns:adec="http://schemas.microsoft.com/office/drawing/2017/decorative" val="1"/>
-              </a:ext>
-            </a:extLst>
-          </p:cNvPr>
-          <p:cNvSpPr>
-            <a:spLocks noGrp="1" noRot="1" noChangeAspect="1" noMove="1" noResize="1" noEditPoints="1" noAdjustHandles="1" noChangeArrowheads="1" noChangeShapeType="1" noTextEdit="1"/>
-          </p:cNvSpPr>
-          <p:nvPr>
-            <p:extLst>
-              <p:ext uri="{386F3935-93C4-4BCD-93E2-E3B085C9AB24}">
-                <p16:designElem xmlns:p16="http://schemas.microsoft.com/office/powerpoint/2015/main" val="1"/>
-              </p:ext>
-            </p:extLst>
-          </p:nvPr>
-        </p:nvSpPr>
-        <p:spPr>
-          <a:xfrm>
-            <a:off x="0" y="0"/>
-            <a:ext cx="964174" cy="6858000"/>
-          </a:xfrm>
-          <a:prstGeom prst="rect">
-            <a:avLst/>
-          </a:prstGeom>
-          <a:solidFill>
-            <a:srgbClr val="314740"/>
-          </a:solidFill>
-          <a:ln>
-            <a:noFill/>
-          </a:ln>
-        </p:spPr>
-        <p:style>
-          <a:lnRef idx="2">
-            <a:schemeClr val="accent1">
-              <a:shade val="50000"/>
-            </a:schemeClr>
-          </a:lnRef>
-          <a:fillRef idx="1">
-            <a:schemeClr val="accent1"/>
-          </a:fillRef>
-          <a:effectRef idx="0">
-            <a:schemeClr val="accent1"/>
-          </a:effectRef>
-          <a:fontRef idx="minor">
-            <a:schemeClr val="lt1"/>
-          </a:fontRef>
-        </p:style>
-      </p:sp>
-      <p:sp>
-        <p:nvSpPr>
-          <p:cNvPr id="3" name="Content Placeholder 2">
-            <a:extLst>
-              <a:ext uri="{FF2B5EF4-FFF2-40B4-BE49-F238E27FC236}">
-                <a16:creationId xmlns:a16="http://schemas.microsoft.com/office/drawing/2014/main" id="{ECC5CEA5-34A6-FB08-4686-EB905E2EE3C7}"/>
-              </a:ext>
-            </a:extLst>
-          </p:cNvPr>
-          <p:cNvSpPr>
-            <a:spLocks noGrp="1"/>
-          </p:cNvSpPr>
-          <p:nvPr>
-            <p:ph idx="1"/>
-          </p:nvPr>
-        </p:nvSpPr>
-        <p:spPr>
-          <a:xfrm>
-            <a:off x="2302933" y="2641604"/>
-            <a:ext cx="7621606" cy="3443107"/>
-          </a:xfrm>
-        </p:spPr>
-        <p:txBody>
-          <a:bodyPr anchor="t">
-            <a:normAutofit/>
-          </a:bodyPr>
-          <a:lstStyle/>
-          <a:p>
-            <a:r>
-              <a:rPr lang="en-IL" dirty="0">
-                <a:solidFill>
-                  <a:srgbClr val="1F2D29"/>
-                </a:solidFill>
-              </a:rPr>
-              <a:t>In mathematics, </a:t>
-            </a:r>
-            <a:r>
-              <a:rPr lang="en-IL" b="1" dirty="0">
-                <a:solidFill>
-                  <a:srgbClr val="1F2D29"/>
-                </a:solidFill>
-              </a:rPr>
-              <a:t>factorization</a:t>
-            </a:r>
-            <a:r>
-              <a:rPr lang="en-IL" dirty="0">
-                <a:solidFill>
-                  <a:srgbClr val="1F2D29"/>
-                </a:solidFill>
-              </a:rPr>
-              <a:t>, or </a:t>
-            </a:r>
-            <a:r>
-              <a:rPr lang="en-IL" b="1" dirty="0">
-                <a:solidFill>
-                  <a:srgbClr val="1F2D29"/>
-                </a:solidFill>
-              </a:rPr>
-              <a:t>factoring</a:t>
-            </a:r>
-            <a:r>
-              <a:rPr lang="en-IL" dirty="0">
-                <a:solidFill>
-                  <a:srgbClr val="1F2D29"/>
-                </a:solidFill>
-              </a:rPr>
-              <a:t> is writing a number or another mathematical object as product of several factor usually of the same kind</a:t>
-            </a:r>
-          </a:p>
-          <a:p>
-            <a:r>
-              <a:rPr lang="en-IL" dirty="0">
-                <a:solidFill>
-                  <a:srgbClr val="1F2D29"/>
-                </a:solidFill>
-              </a:rPr>
-              <a:t>Matrix decomposition, also named matrix factorization is writing a matrix as a product of metrices</a:t>
-            </a:r>
-          </a:p>
-        </p:txBody>
-      </p:sp>
-    </p:spTree>
-    <p:extLst>
-      <p:ext uri="{BB962C8B-B14F-4D97-AF65-F5344CB8AC3E}">
-        <p14:creationId xmlns:p14="http://schemas.microsoft.com/office/powerpoint/2010/main" val="1144333540"/>
-      </p:ext>
-    </p:extLst>
-  </p:cSld>
-  <p:clrMapOvr>
-    <a:overrideClrMapping bg1="lt1" tx1="dk1" bg2="lt2" tx2="dk2" accent1="accent1" accent2="accent2" accent3="accent3" accent4="accent4" accent5="accent5" accent6="accent6" hlink="hlink" folHlink="folHlink"/>
-  </p:clrMapOvr>
-</p:sld>
-</file>
-
-<file path=ppt/slides/slide20.xml><?xml version="1.0" encoding="utf-8"?>
+<file path=ppt/slides/slide19.xml><?xml version="1.0" encoding="utf-8"?>
 <p:sld xmlns:a="http://schemas.openxmlformats.org/drawingml/2006/main" xmlns:r="http://schemas.openxmlformats.org/officeDocument/2006/relationships" xmlns:p="http://schemas.openxmlformats.org/presentationml/2006/main">
   <p:cSld>
     <p:bg>
@@ -18339,7 +16816,395 @@
 </p:sld>
 </file>
 
-<file path=ppt/slides/slide21.xml><?xml version="1.0" encoding="utf-8"?>
+<file path=ppt/slides/slide2.xml><?xml version="1.0" encoding="utf-8"?>
+<p:sld xmlns:a="http://schemas.openxmlformats.org/drawingml/2006/main" xmlns:r="http://schemas.openxmlformats.org/officeDocument/2006/relationships" xmlns:p="http://schemas.openxmlformats.org/presentationml/2006/main">
+  <p:cSld>
+    <p:bg>
+      <p:bgPr>
+        <a:solidFill>
+          <a:schemeClr val="bg1"/>
+        </a:solidFill>
+        <a:effectLst/>
+      </p:bgPr>
+    </p:bg>
+    <p:spTree>
+      <p:nvGrpSpPr>
+        <p:cNvPr id="1" name=""/>
+        <p:cNvGrpSpPr/>
+        <p:nvPr/>
+      </p:nvGrpSpPr>
+      <p:grpSpPr>
+        <a:xfrm>
+          <a:off x="0" y="0"/>
+          <a:ext cx="0" cy="0"/>
+          <a:chOff x="0" y="0"/>
+          <a:chExt cx="0" cy="0"/>
+        </a:xfrm>
+      </p:grpSpPr>
+      <p:sp>
+        <p:nvSpPr>
+          <p:cNvPr id="8" name="Rectangle 7">
+            <a:extLst>
+              <a:ext uri="{FF2B5EF4-FFF2-40B4-BE49-F238E27FC236}">
+                <a16:creationId xmlns:a16="http://schemas.microsoft.com/office/drawing/2014/main" id="{D0BE3D13-5BE5-4B05-AFCF-2A2E059D29F8}"/>
+              </a:ext>
+              <a:ext uri="{C183D7F6-B498-43B3-948B-1728B52AA6E4}">
+                <adec:decorative xmlns:adec="http://schemas.microsoft.com/office/drawing/2017/decorative" val="1"/>
+              </a:ext>
+            </a:extLst>
+          </p:cNvPr>
+          <p:cNvSpPr>
+            <a:spLocks noGrp="1" noRot="1" noChangeAspect="1" noMove="1" noResize="1" noEditPoints="1" noAdjustHandles="1" noChangeArrowheads="1" noChangeShapeType="1" noTextEdit="1"/>
+          </p:cNvSpPr>
+          <p:nvPr>
+            <p:extLst>
+              <p:ext uri="{386F3935-93C4-4BCD-93E2-E3B085C9AB24}">
+                <p16:designElem xmlns:p16="http://schemas.microsoft.com/office/powerpoint/2015/main" val="1"/>
+              </p:ext>
+            </p:extLst>
+          </p:nvPr>
+        </p:nvSpPr>
+        <p:spPr>
+          <a:xfrm>
+            <a:off x="0" y="-1"/>
+            <a:ext cx="12192000" cy="6858001"/>
+          </a:xfrm>
+          <a:prstGeom prst="rect">
+            <a:avLst/>
+          </a:prstGeom>
+          <a:solidFill>
+            <a:srgbClr val="FFFFFF"/>
+          </a:solidFill>
+          <a:ln>
+            <a:noFill/>
+          </a:ln>
+        </p:spPr>
+        <p:style>
+          <a:lnRef idx="2">
+            <a:schemeClr val="accent1">
+              <a:shade val="50000"/>
+            </a:schemeClr>
+          </a:lnRef>
+          <a:fillRef idx="1">
+            <a:schemeClr val="accent1"/>
+          </a:fillRef>
+          <a:effectRef idx="0">
+            <a:schemeClr val="accent1"/>
+          </a:effectRef>
+          <a:fontRef idx="minor">
+            <a:schemeClr val="lt1"/>
+          </a:fontRef>
+        </p:style>
+        <p:txBody>
+          <a:bodyPr rtlCol="0" anchor="ctr"/>
+          <a:lstStyle/>
+          <a:p>
+            <a:pPr algn="ctr"/>
+            <a:endParaRPr lang="en-US"/>
+          </a:p>
+        </p:txBody>
+      </p:sp>
+      <p:sp>
+        <p:nvSpPr>
+          <p:cNvPr id="10" name="Oval 9">
+            <a:extLst>
+              <a:ext uri="{FF2B5EF4-FFF2-40B4-BE49-F238E27FC236}">
+                <a16:creationId xmlns:a16="http://schemas.microsoft.com/office/drawing/2014/main" id="{1AC85C80-0175-4214-A13D-03C224658C16}"/>
+              </a:ext>
+              <a:ext uri="{C183D7F6-B498-43B3-948B-1728B52AA6E4}">
+                <adec:decorative xmlns:adec="http://schemas.microsoft.com/office/drawing/2017/decorative" val="1"/>
+              </a:ext>
+            </a:extLst>
+          </p:cNvPr>
+          <p:cNvSpPr>
+            <a:spLocks noGrp="1" noRot="1" noChangeAspect="1" noMove="1" noResize="1" noEditPoints="1" noAdjustHandles="1" noChangeArrowheads="1" noChangeShapeType="1" noTextEdit="1"/>
+          </p:cNvSpPr>
+          <p:nvPr>
+            <p:extLst>
+              <p:ext uri="{386F3935-93C4-4BCD-93E2-E3B085C9AB24}">
+                <p16:designElem xmlns:p16="http://schemas.microsoft.com/office/powerpoint/2015/main" val="1"/>
+              </p:ext>
+            </p:extLst>
+          </p:nvPr>
+        </p:nvSpPr>
+        <p:spPr>
+          <a:xfrm>
+            <a:off x="1770108" y="985292"/>
+            <a:ext cx="1345319" cy="1345319"/>
+          </a:xfrm>
+          <a:prstGeom prst="ellipse">
+            <a:avLst/>
+          </a:prstGeom>
+          <a:solidFill>
+            <a:schemeClr val="accent1">
+              <a:lumMod val="40000"/>
+              <a:lumOff val="60000"/>
+            </a:schemeClr>
+          </a:solidFill>
+          <a:ln>
+            <a:noFill/>
+          </a:ln>
+        </p:spPr>
+        <p:style>
+          <a:lnRef idx="2">
+            <a:schemeClr val="accent1">
+              <a:shade val="50000"/>
+            </a:schemeClr>
+          </a:lnRef>
+          <a:fillRef idx="1">
+            <a:schemeClr val="accent1"/>
+          </a:fillRef>
+          <a:effectRef idx="0">
+            <a:schemeClr val="accent1"/>
+          </a:effectRef>
+          <a:fontRef idx="minor">
+            <a:schemeClr val="lt1"/>
+          </a:fontRef>
+        </p:style>
+        <p:txBody>
+          <a:bodyPr rtlCol="0" anchor="ctr"/>
+          <a:lstStyle/>
+          <a:p>
+            <a:pPr algn="ctr"/>
+            <a:endParaRPr lang="en-US"/>
+          </a:p>
+        </p:txBody>
+      </p:sp>
+      <p:pic>
+        <p:nvPicPr>
+          <p:cNvPr id="12" name="Picture 11">
+            <a:extLst>
+              <a:ext uri="{FF2B5EF4-FFF2-40B4-BE49-F238E27FC236}">
+                <a16:creationId xmlns:a16="http://schemas.microsoft.com/office/drawing/2014/main" id="{15ADB788-8569-409E-862D-665AD53C9904}"/>
+              </a:ext>
+              <a:ext uri="{C183D7F6-B498-43B3-948B-1728B52AA6E4}">
+                <adec:decorative xmlns:adec="http://schemas.microsoft.com/office/drawing/2017/decorative" val="1"/>
+              </a:ext>
+            </a:extLst>
+          </p:cNvPr>
+          <p:cNvPicPr>
+            <a:picLocks noGrp="1" noRot="1" noChangeAspect="1" noMove="1" noResize="1" noEditPoints="1" noAdjustHandles="1" noChangeArrowheads="1" noChangeShapeType="1" noCrop="1"/>
+          </p:cNvPicPr>
+          <p:nvPr>
+            <p:extLst>
+              <p:ext uri="{386F3935-93C4-4BCD-93E2-E3B085C9AB24}">
+                <p16:designElem xmlns:p16="http://schemas.microsoft.com/office/powerpoint/2015/main" val="1"/>
+              </p:ext>
+            </p:extLst>
+          </p:nvPr>
+        </p:nvPicPr>
+        <p:blipFill>
+          <a:blip r:embed="rId2">
+            <a:extLst>
+              <a:ext uri="{28A0092B-C50C-407E-A947-70E740481C1C}">
+                <a14:useLocalDpi xmlns:a14="http://schemas.microsoft.com/office/drawing/2010/main" val="0"/>
+              </a:ext>
+            </a:extLst>
+          </a:blip>
+          <a:stretch>
+            <a:fillRect/>
+          </a:stretch>
+        </p:blipFill>
+        <p:spPr>
+          <a:xfrm>
+            <a:off x="0" y="0"/>
+            <a:ext cx="12189867" cy="6858000"/>
+          </a:xfrm>
+          <a:prstGeom prst="rect">
+            <a:avLst/>
+          </a:prstGeom>
+        </p:spPr>
+      </p:pic>
+      <p:sp>
+        <p:nvSpPr>
+          <p:cNvPr id="2" name="Title 1">
+            <a:extLst>
+              <a:ext uri="{FF2B5EF4-FFF2-40B4-BE49-F238E27FC236}">
+                <a16:creationId xmlns:a16="http://schemas.microsoft.com/office/drawing/2014/main" id="{A7B4661C-FED8-5AC1-EB65-9274A85B981F}"/>
+              </a:ext>
+            </a:extLst>
+          </p:cNvPr>
+          <p:cNvSpPr>
+            <a:spLocks noGrp="1"/>
+          </p:cNvSpPr>
+          <p:nvPr>
+            <p:ph type="title"/>
+          </p:nvPr>
+        </p:nvSpPr>
+        <p:spPr>
+          <a:xfrm>
+            <a:off x="2611808" y="1022548"/>
+            <a:ext cx="7958331" cy="1308063"/>
+          </a:xfrm>
+        </p:spPr>
+        <p:txBody>
+          <a:bodyPr anchor="b">
+            <a:normAutofit/>
+          </a:bodyPr>
+          <a:lstStyle/>
+          <a:p>
+            <a:pPr algn="l"/>
+            <a:r>
+              <a:rPr lang="en-IL" sz="4400">
+                <a:solidFill>
+                  <a:srgbClr val="1F2D29"/>
+                </a:solidFill>
+              </a:rPr>
+              <a:t>Matrix decomposition</a:t>
+            </a:r>
+          </a:p>
+        </p:txBody>
+      </p:sp>
+      <p:sp>
+        <p:nvSpPr>
+          <p:cNvPr id="14" name="Rectangle 13">
+            <a:extLst>
+              <a:ext uri="{FF2B5EF4-FFF2-40B4-BE49-F238E27FC236}">
+                <a16:creationId xmlns:a16="http://schemas.microsoft.com/office/drawing/2014/main" id="{76562092-3AA7-4EF0-9007-C44F879A1308}"/>
+              </a:ext>
+              <a:ext uri="{C183D7F6-B498-43B3-948B-1728B52AA6E4}">
+                <adec:decorative xmlns:adec="http://schemas.microsoft.com/office/drawing/2017/decorative" val="1"/>
+              </a:ext>
+            </a:extLst>
+          </p:cNvPr>
+          <p:cNvSpPr>
+            <a:spLocks noGrp="1" noRot="1" noChangeAspect="1" noMove="1" noResize="1" noEditPoints="1" noAdjustHandles="1" noChangeArrowheads="1" noChangeShapeType="1" noTextEdit="1"/>
+          </p:cNvSpPr>
+          <p:nvPr>
+            <p:extLst>
+              <p:ext uri="{386F3935-93C4-4BCD-93E2-E3B085C9AB24}">
+                <p16:designElem xmlns:p16="http://schemas.microsoft.com/office/powerpoint/2015/main" val="1"/>
+              </p:ext>
+            </p:extLst>
+          </p:nvPr>
+        </p:nvSpPr>
+        <p:spPr>
+          <a:xfrm>
+            <a:off x="0" y="0"/>
+            <a:ext cx="964174" cy="6858000"/>
+          </a:xfrm>
+          <a:prstGeom prst="rect">
+            <a:avLst/>
+          </a:prstGeom>
+          <a:solidFill>
+            <a:srgbClr val="314740"/>
+          </a:solidFill>
+          <a:ln>
+            <a:noFill/>
+          </a:ln>
+        </p:spPr>
+        <p:style>
+          <a:lnRef idx="2">
+            <a:schemeClr val="accent1">
+              <a:shade val="50000"/>
+            </a:schemeClr>
+          </a:lnRef>
+          <a:fillRef idx="1">
+            <a:schemeClr val="accent1"/>
+          </a:fillRef>
+          <a:effectRef idx="0">
+            <a:schemeClr val="accent1"/>
+          </a:effectRef>
+          <a:fontRef idx="minor">
+            <a:schemeClr val="lt1"/>
+          </a:fontRef>
+        </p:style>
+      </p:sp>
+      <p:sp>
+        <p:nvSpPr>
+          <p:cNvPr id="3" name="Content Placeholder 2">
+            <a:extLst>
+              <a:ext uri="{FF2B5EF4-FFF2-40B4-BE49-F238E27FC236}">
+                <a16:creationId xmlns:a16="http://schemas.microsoft.com/office/drawing/2014/main" id="{ECC5CEA5-34A6-FB08-4686-EB905E2EE3C7}"/>
+              </a:ext>
+            </a:extLst>
+          </p:cNvPr>
+          <p:cNvSpPr>
+            <a:spLocks noGrp="1"/>
+          </p:cNvSpPr>
+          <p:nvPr>
+            <p:ph idx="1"/>
+          </p:nvPr>
+        </p:nvSpPr>
+        <p:spPr>
+          <a:xfrm>
+            <a:off x="2302933" y="2641604"/>
+            <a:ext cx="7621606" cy="3443107"/>
+          </a:xfrm>
+        </p:spPr>
+        <p:txBody>
+          <a:bodyPr anchor="t">
+            <a:normAutofit/>
+          </a:bodyPr>
+          <a:lstStyle/>
+          <a:p>
+            <a:r>
+              <a:rPr lang="en-IL" dirty="0">
+                <a:solidFill>
+                  <a:srgbClr val="1F2D29"/>
+                </a:solidFill>
+              </a:rPr>
+              <a:t>In mathematics, </a:t>
+            </a:r>
+            <a:r>
+              <a:rPr lang="en-IL" b="1" dirty="0">
+                <a:solidFill>
+                  <a:srgbClr val="1F2D29"/>
+                </a:solidFill>
+              </a:rPr>
+              <a:t>factorization</a:t>
+            </a:r>
+            <a:r>
+              <a:rPr lang="en-IL" dirty="0">
+                <a:solidFill>
+                  <a:srgbClr val="1F2D29"/>
+                </a:solidFill>
+              </a:rPr>
+              <a:t>, or </a:t>
+            </a:r>
+            <a:r>
+              <a:rPr lang="en-IL" b="1" dirty="0">
+                <a:solidFill>
+                  <a:srgbClr val="1F2D29"/>
+                </a:solidFill>
+              </a:rPr>
+              <a:t>factoring</a:t>
+            </a:r>
+            <a:r>
+              <a:rPr lang="en-IL" dirty="0">
+                <a:solidFill>
+                  <a:srgbClr val="1F2D29"/>
+                </a:solidFill>
+              </a:rPr>
+              <a:t> is writing a number or another mathematical object as product of several factor usually of the same kind</a:t>
+            </a:r>
+          </a:p>
+          <a:p>
+            <a:r>
+              <a:rPr lang="en-IL" dirty="0">
+                <a:solidFill>
+                  <a:srgbClr val="1F2D29"/>
+                </a:solidFill>
+              </a:rPr>
+              <a:t>Matrix decomposition, also named matrix factorization is writing a matrix as a product of metrices</a:t>
+            </a:r>
+          </a:p>
+        </p:txBody>
+      </p:sp>
+    </p:spTree>
+    <p:extLst>
+      <p:ext uri="{BB962C8B-B14F-4D97-AF65-F5344CB8AC3E}">
+        <p14:creationId xmlns:p14="http://schemas.microsoft.com/office/powerpoint/2010/main" val="1144333540"/>
+      </p:ext>
+    </p:extLst>
+  </p:cSld>
+  <p:clrMapOvr>
+    <a:overrideClrMapping bg1="lt1" tx1="dk1" bg2="lt2" tx2="dk2" accent1="accent1" accent2="accent2" accent3="accent3" accent4="accent4" accent5="accent5" accent6="accent6" hlink="hlink" folHlink="folHlink"/>
+  </p:clrMapOvr>
+</p:sld>
+</file>
+
+<file path=ppt/slides/slide20.xml><?xml version="1.0" encoding="utf-8"?>
 <p:sld xmlns:a="http://schemas.openxmlformats.org/drawingml/2006/main" xmlns:r="http://schemas.openxmlformats.org/officeDocument/2006/relationships" xmlns:p="http://schemas.openxmlformats.org/presentationml/2006/main">
   <p:cSld>
     <p:bg>
@@ -19271,7 +18136,7 @@
 </p:sld>
 </file>
 
-<file path=ppt/slides/slide22.xml><?xml version="1.0" encoding="utf-8"?>
+<file path=ppt/slides/slide21.xml><?xml version="1.0" encoding="utf-8"?>
 <p:sld xmlns:a="http://schemas.openxmlformats.org/drawingml/2006/main" xmlns:r="http://schemas.openxmlformats.org/officeDocument/2006/relationships" xmlns:p="http://schemas.openxmlformats.org/presentationml/2006/main">
   <p:cSld>
     <p:bg>
@@ -24984,8 +23849,8 @@
           </a:fontRef>
         </p:style>
       </p:sp>
-      <mc:AlternateContent xmlns:mc="http://schemas.openxmlformats.org/markup-compatibility/2006">
-        <mc:Choice xmlns:a14="http://schemas.microsoft.com/office/drawing/2010/main" Requires="a14">
+      <mc:AlternateContent xmlns:mc="http://schemas.openxmlformats.org/markup-compatibility/2006" xmlns:a14="http://schemas.microsoft.com/office/drawing/2010/main">
+        <mc:Choice Requires="a14">
           <p:sp>
             <p:nvSpPr>
               <p:cNvPr id="3" name="Content Placeholder 2">
@@ -25445,7 +24310,7 @@
             </p:txBody>
           </p:sp>
         </mc:Choice>
-        <mc:Fallback>
+        <mc:Fallback xmlns="">
           <p:sp>
             <p:nvSpPr>
               <p:cNvPr id="3" name="Content Placeholder 2">
@@ -25503,846 +24368,6 @@
 </file>
 
 <file path=ppt/slides/slide8.xml><?xml version="1.0" encoding="utf-8"?>
-<p:sld xmlns:a="http://schemas.openxmlformats.org/drawingml/2006/main" xmlns:r="http://schemas.openxmlformats.org/officeDocument/2006/relationships" xmlns:p="http://schemas.openxmlformats.org/presentationml/2006/main">
-  <p:cSld>
-    <p:bg>
-      <p:bgPr>
-        <a:solidFill>
-          <a:schemeClr val="bg1"/>
-        </a:solidFill>
-        <a:effectLst/>
-      </p:bgPr>
-    </p:bg>
-    <p:spTree>
-      <p:nvGrpSpPr>
-        <p:cNvPr id="1" name=""/>
-        <p:cNvGrpSpPr/>
-        <p:nvPr/>
-      </p:nvGrpSpPr>
-      <p:grpSpPr>
-        <a:xfrm>
-          <a:off x="0" y="0"/>
-          <a:ext cx="0" cy="0"/>
-          <a:chOff x="0" y="0"/>
-          <a:chExt cx="0" cy="0"/>
-        </a:xfrm>
-      </p:grpSpPr>
-      <p:sp>
-        <p:nvSpPr>
-          <p:cNvPr id="8" name="Rectangle 7">
-            <a:extLst>
-              <a:ext uri="{FF2B5EF4-FFF2-40B4-BE49-F238E27FC236}">
-                <a16:creationId xmlns:a16="http://schemas.microsoft.com/office/drawing/2014/main" id="{D0BE3D13-5BE5-4B05-AFCF-2A2E059D29F8}"/>
-              </a:ext>
-              <a:ext uri="{C183D7F6-B498-43B3-948B-1728B52AA6E4}">
-                <adec:decorative xmlns:adec="http://schemas.microsoft.com/office/drawing/2017/decorative" val="1"/>
-              </a:ext>
-            </a:extLst>
-          </p:cNvPr>
-          <p:cNvSpPr>
-            <a:spLocks noGrp="1" noRot="1" noChangeAspect="1" noMove="1" noResize="1" noEditPoints="1" noAdjustHandles="1" noChangeArrowheads="1" noChangeShapeType="1" noTextEdit="1"/>
-          </p:cNvSpPr>
-          <p:nvPr>
-            <p:extLst>
-              <p:ext uri="{386F3935-93C4-4BCD-93E2-E3B085C9AB24}">
-                <p16:designElem xmlns:p16="http://schemas.microsoft.com/office/powerpoint/2015/main" val="1"/>
-              </p:ext>
-            </p:extLst>
-          </p:nvPr>
-        </p:nvSpPr>
-        <p:spPr>
-          <a:xfrm>
-            <a:off x="0" y="-1"/>
-            <a:ext cx="12192000" cy="6858001"/>
-          </a:xfrm>
-          <a:prstGeom prst="rect">
-            <a:avLst/>
-          </a:prstGeom>
-          <a:solidFill>
-            <a:srgbClr val="FFFFFF"/>
-          </a:solidFill>
-          <a:ln>
-            <a:noFill/>
-          </a:ln>
-        </p:spPr>
-        <p:style>
-          <a:lnRef idx="2">
-            <a:schemeClr val="accent1">
-              <a:shade val="50000"/>
-            </a:schemeClr>
-          </a:lnRef>
-          <a:fillRef idx="1">
-            <a:schemeClr val="accent1"/>
-          </a:fillRef>
-          <a:effectRef idx="0">
-            <a:schemeClr val="accent1"/>
-          </a:effectRef>
-          <a:fontRef idx="minor">
-            <a:schemeClr val="lt1"/>
-          </a:fontRef>
-        </p:style>
-        <p:txBody>
-          <a:bodyPr rtlCol="0" anchor="ctr"/>
-          <a:lstStyle/>
-          <a:p>
-            <a:pPr algn="ctr"/>
-            <a:endParaRPr lang="en-US"/>
-          </a:p>
-        </p:txBody>
-      </p:sp>
-      <p:sp>
-        <p:nvSpPr>
-          <p:cNvPr id="10" name="Oval 9">
-            <a:extLst>
-              <a:ext uri="{FF2B5EF4-FFF2-40B4-BE49-F238E27FC236}">
-                <a16:creationId xmlns:a16="http://schemas.microsoft.com/office/drawing/2014/main" id="{1AC85C80-0175-4214-A13D-03C224658C16}"/>
-              </a:ext>
-              <a:ext uri="{C183D7F6-B498-43B3-948B-1728B52AA6E4}">
-                <adec:decorative xmlns:adec="http://schemas.microsoft.com/office/drawing/2017/decorative" val="1"/>
-              </a:ext>
-            </a:extLst>
-          </p:cNvPr>
-          <p:cNvSpPr>
-            <a:spLocks noGrp="1" noRot="1" noChangeAspect="1" noMove="1" noResize="1" noEditPoints="1" noAdjustHandles="1" noChangeArrowheads="1" noChangeShapeType="1" noTextEdit="1"/>
-          </p:cNvSpPr>
-          <p:nvPr>
-            <p:extLst>
-              <p:ext uri="{386F3935-93C4-4BCD-93E2-E3B085C9AB24}">
-                <p16:designElem xmlns:p16="http://schemas.microsoft.com/office/powerpoint/2015/main" val="1"/>
-              </p:ext>
-            </p:extLst>
-          </p:nvPr>
-        </p:nvSpPr>
-        <p:spPr>
-          <a:xfrm>
-            <a:off x="1770108" y="985292"/>
-            <a:ext cx="1345319" cy="1345319"/>
-          </a:xfrm>
-          <a:prstGeom prst="ellipse">
-            <a:avLst/>
-          </a:prstGeom>
-          <a:solidFill>
-            <a:schemeClr val="accent1">
-              <a:lumMod val="40000"/>
-              <a:lumOff val="60000"/>
-            </a:schemeClr>
-          </a:solidFill>
-          <a:ln>
-            <a:noFill/>
-          </a:ln>
-        </p:spPr>
-        <p:style>
-          <a:lnRef idx="2">
-            <a:schemeClr val="accent1">
-              <a:shade val="50000"/>
-            </a:schemeClr>
-          </a:lnRef>
-          <a:fillRef idx="1">
-            <a:schemeClr val="accent1"/>
-          </a:fillRef>
-          <a:effectRef idx="0">
-            <a:schemeClr val="accent1"/>
-          </a:effectRef>
-          <a:fontRef idx="minor">
-            <a:schemeClr val="lt1"/>
-          </a:fontRef>
-        </p:style>
-        <p:txBody>
-          <a:bodyPr rtlCol="0" anchor="ctr"/>
-          <a:lstStyle/>
-          <a:p>
-            <a:pPr algn="ctr"/>
-            <a:endParaRPr lang="en-US"/>
-          </a:p>
-        </p:txBody>
-      </p:sp>
-      <p:pic>
-        <p:nvPicPr>
-          <p:cNvPr id="12" name="Picture 11">
-            <a:extLst>
-              <a:ext uri="{FF2B5EF4-FFF2-40B4-BE49-F238E27FC236}">
-                <a16:creationId xmlns:a16="http://schemas.microsoft.com/office/drawing/2014/main" id="{15ADB788-8569-409E-862D-665AD53C9904}"/>
-              </a:ext>
-              <a:ext uri="{C183D7F6-B498-43B3-948B-1728B52AA6E4}">
-                <adec:decorative xmlns:adec="http://schemas.microsoft.com/office/drawing/2017/decorative" val="1"/>
-              </a:ext>
-            </a:extLst>
-          </p:cNvPr>
-          <p:cNvPicPr>
-            <a:picLocks noGrp="1" noRot="1" noChangeAspect="1" noMove="1" noResize="1" noEditPoints="1" noAdjustHandles="1" noChangeArrowheads="1" noChangeShapeType="1" noCrop="1"/>
-          </p:cNvPicPr>
-          <p:nvPr>
-            <p:extLst>
-              <p:ext uri="{386F3935-93C4-4BCD-93E2-E3B085C9AB24}">
-                <p16:designElem xmlns:p16="http://schemas.microsoft.com/office/powerpoint/2015/main" val="1"/>
-              </p:ext>
-            </p:extLst>
-          </p:nvPr>
-        </p:nvPicPr>
-        <p:blipFill>
-          <a:blip r:embed="rId2">
-            <a:extLst>
-              <a:ext uri="{28A0092B-C50C-407E-A947-70E740481C1C}">
-                <a14:useLocalDpi xmlns:a14="http://schemas.microsoft.com/office/drawing/2010/main" val="0"/>
-              </a:ext>
-            </a:extLst>
-          </a:blip>
-          <a:stretch>
-            <a:fillRect/>
-          </a:stretch>
-        </p:blipFill>
-        <p:spPr>
-          <a:xfrm>
-            <a:off x="0" y="0"/>
-            <a:ext cx="12189867" cy="6858000"/>
-          </a:xfrm>
-          <a:prstGeom prst="rect">
-            <a:avLst/>
-          </a:prstGeom>
-        </p:spPr>
-      </p:pic>
-      <p:sp>
-        <p:nvSpPr>
-          <p:cNvPr id="2" name="Title 1">
-            <a:extLst>
-              <a:ext uri="{FF2B5EF4-FFF2-40B4-BE49-F238E27FC236}">
-                <a16:creationId xmlns:a16="http://schemas.microsoft.com/office/drawing/2014/main" id="{A7B4661C-FED8-5AC1-EB65-9274A85B981F}"/>
-              </a:ext>
-            </a:extLst>
-          </p:cNvPr>
-          <p:cNvSpPr>
-            <a:spLocks noGrp="1"/>
-          </p:cNvSpPr>
-          <p:nvPr>
-            <p:ph type="title"/>
-          </p:nvPr>
-        </p:nvSpPr>
-        <p:spPr>
-          <a:xfrm>
-            <a:off x="2611808" y="1022548"/>
-            <a:ext cx="7958331" cy="1308063"/>
-          </a:xfrm>
-        </p:spPr>
-        <p:txBody>
-          <a:bodyPr anchor="b">
-            <a:normAutofit/>
-          </a:bodyPr>
-          <a:lstStyle/>
-          <a:p>
-            <a:pPr algn="l"/>
-            <a:r>
-              <a:rPr lang="en-IL" sz="4400">
-                <a:solidFill>
-                  <a:srgbClr val="1F2D29"/>
-                </a:solidFill>
-              </a:rPr>
-              <a:t>Quasi-Newton methods</a:t>
-            </a:r>
-          </a:p>
-        </p:txBody>
-      </p:sp>
-      <p:sp>
-        <p:nvSpPr>
-          <p:cNvPr id="14" name="Rectangle 13">
-            <a:extLst>
-              <a:ext uri="{FF2B5EF4-FFF2-40B4-BE49-F238E27FC236}">
-                <a16:creationId xmlns:a16="http://schemas.microsoft.com/office/drawing/2014/main" id="{76562092-3AA7-4EF0-9007-C44F879A1308}"/>
-              </a:ext>
-              <a:ext uri="{C183D7F6-B498-43B3-948B-1728B52AA6E4}">
-                <adec:decorative xmlns:adec="http://schemas.microsoft.com/office/drawing/2017/decorative" val="1"/>
-              </a:ext>
-            </a:extLst>
-          </p:cNvPr>
-          <p:cNvSpPr>
-            <a:spLocks noGrp="1" noRot="1" noChangeAspect="1" noMove="1" noResize="1" noEditPoints="1" noAdjustHandles="1" noChangeArrowheads="1" noChangeShapeType="1" noTextEdit="1"/>
-          </p:cNvSpPr>
-          <p:nvPr>
-            <p:extLst>
-              <p:ext uri="{386F3935-93C4-4BCD-93E2-E3B085C9AB24}">
-                <p16:designElem xmlns:p16="http://schemas.microsoft.com/office/powerpoint/2015/main" val="1"/>
-              </p:ext>
-            </p:extLst>
-          </p:nvPr>
-        </p:nvSpPr>
-        <p:spPr>
-          <a:xfrm>
-            <a:off x="0" y="0"/>
-            <a:ext cx="964174" cy="6858000"/>
-          </a:xfrm>
-          <a:prstGeom prst="rect">
-            <a:avLst/>
-          </a:prstGeom>
-          <a:solidFill>
-            <a:srgbClr val="314740"/>
-          </a:solidFill>
-          <a:ln>
-            <a:noFill/>
-          </a:ln>
-        </p:spPr>
-        <p:style>
-          <a:lnRef idx="2">
-            <a:schemeClr val="accent1">
-              <a:shade val="50000"/>
-            </a:schemeClr>
-          </a:lnRef>
-          <a:fillRef idx="1">
-            <a:schemeClr val="accent1"/>
-          </a:fillRef>
-          <a:effectRef idx="0">
-            <a:schemeClr val="accent1"/>
-          </a:effectRef>
-          <a:fontRef idx="minor">
-            <a:schemeClr val="lt1"/>
-          </a:fontRef>
-        </p:style>
-      </p:sp>
-      <mc:AlternateContent xmlns:mc="http://schemas.openxmlformats.org/markup-compatibility/2006" xmlns:a14="http://schemas.microsoft.com/office/drawing/2010/main">
-        <mc:Choice Requires="a14">
-          <p:sp>
-            <p:nvSpPr>
-              <p:cNvPr id="3" name="Content Placeholder 2">
-                <a:extLst>
-                  <a:ext uri="{FF2B5EF4-FFF2-40B4-BE49-F238E27FC236}">
-                    <a16:creationId xmlns:a16="http://schemas.microsoft.com/office/drawing/2014/main" id="{ECC5CEA5-34A6-FB08-4686-EB905E2EE3C7}"/>
-                  </a:ext>
-                </a:extLst>
-              </p:cNvPr>
-              <p:cNvSpPr>
-                <a:spLocks noGrp="1"/>
-              </p:cNvSpPr>
-              <p:nvPr>
-                <p:ph idx="1"/>
-              </p:nvPr>
-            </p:nvSpPr>
-            <p:spPr>
-              <a:xfrm>
-                <a:off x="2302933" y="2641604"/>
-                <a:ext cx="7621606" cy="3443107"/>
-              </a:xfrm>
-            </p:spPr>
-            <p:txBody>
-              <a:bodyPr anchor="t">
-                <a:normAutofit/>
-              </a:bodyPr>
-              <a:lstStyle/>
-              <a:p>
-                <a:pPr marL="0" indent="0">
-                  <a:buNone/>
-                </a:pPr>
-                <a:r>
-                  <a:rPr lang="en-IL" dirty="0">
-                    <a:solidFill>
-                      <a:srgbClr val="1F2D29"/>
-                    </a:solidFill>
-                  </a:rPr>
-                  <a:t>In Q</a:t>
-                </a:r>
-                <a:r>
-                  <a:rPr lang="en-US" dirty="0">
-                    <a:solidFill>
-                      <a:srgbClr val="1F2D29"/>
-                    </a:solidFill>
-                  </a:rPr>
-                  <a:t>u</a:t>
-                </a:r>
-                <a:r>
-                  <a:rPr lang="en-IL" dirty="0">
-                    <a:solidFill>
-                      <a:srgbClr val="1F2D29"/>
-                    </a:solidFill>
-                  </a:rPr>
-                  <a:t>asi-Newton methods, instead of computing the actual hessian, we approximate it, the approximation must satisfy the Quasi-Newton condition (Secant equation): </a:t>
-                </a:r>
-              </a:p>
-              <a:p>
-                <a:pPr marL="0" indent="0">
-                  <a:buNone/>
-                </a:pPr>
-                <a14:m>
-                  <m:oMathPara xmlns:m="http://schemas.openxmlformats.org/officeDocument/2006/math">
-                    <m:oMathParaPr>
-                      <m:jc m:val="left"/>
-                    </m:oMathParaPr>
-                    <m:oMath xmlns:m="http://schemas.openxmlformats.org/officeDocument/2006/math">
-                      <m:sSub>
-                        <m:sSubPr>
-                          <m:ctrlPr>
-                            <a:rPr lang="en-IL" i="1">
-                              <a:solidFill>
-                                <a:srgbClr val="1F2D29"/>
-                              </a:solidFill>
-                              <a:latin typeface="Cambria Math" panose="02040503050406030204" pitchFamily="18" charset="0"/>
-                            </a:rPr>
-                          </m:ctrlPr>
-                        </m:sSubPr>
-                        <m:e>
-                          <m:r>
-                            <a:rPr lang="en-US" i="1">
-                              <a:solidFill>
-                                <a:srgbClr val="1F2D29"/>
-                              </a:solidFill>
-                              <a:latin typeface="Cambria Math" panose="02040503050406030204" pitchFamily="18" charset="0"/>
-                            </a:rPr>
-                            <m:t>𝐵</m:t>
-                          </m:r>
-                        </m:e>
-                        <m:sub>
-                          <m:r>
-                            <a:rPr lang="en-US" i="1">
-                              <a:solidFill>
-                                <a:srgbClr val="1F2D29"/>
-                              </a:solidFill>
-                              <a:latin typeface="Cambria Math" panose="02040503050406030204" pitchFamily="18" charset="0"/>
-                            </a:rPr>
-                            <m:t>𝑘</m:t>
-                          </m:r>
-                          <m:r>
-                            <a:rPr lang="en-US" i="1">
-                              <a:solidFill>
-                                <a:srgbClr val="1F2D29"/>
-                              </a:solidFill>
-                              <a:latin typeface="Cambria Math" panose="02040503050406030204" pitchFamily="18" charset="0"/>
-                            </a:rPr>
-                            <m:t>+1</m:t>
-                          </m:r>
-                        </m:sub>
-                      </m:sSub>
-                      <m:r>
-                        <a:rPr lang="en-US" i="1">
-                          <a:solidFill>
-                            <a:srgbClr val="1F2D29"/>
-                          </a:solidFill>
-                          <a:latin typeface="Cambria Math" panose="02040503050406030204" pitchFamily="18" charset="0"/>
-                        </a:rPr>
-                        <m:t>⋅</m:t>
-                      </m:r>
-                      <m:d>
-                        <m:dPr>
-                          <m:begChr m:val="["/>
-                          <m:endChr m:val="]"/>
-                          <m:ctrlPr>
-                            <a:rPr lang="en-US" i="1">
-                              <a:solidFill>
-                                <a:srgbClr val="1F2D29"/>
-                              </a:solidFill>
-                              <a:latin typeface="Cambria Math" panose="02040503050406030204" pitchFamily="18" charset="0"/>
-                            </a:rPr>
-                          </m:ctrlPr>
-                        </m:dPr>
-                        <m:e>
-                          <m:sSub>
-                            <m:sSubPr>
-                              <m:ctrlPr>
-                                <a:rPr lang="en-US" i="1">
-                                  <a:solidFill>
-                                    <a:srgbClr val="1F2D29"/>
-                                  </a:solidFill>
-                                  <a:latin typeface="Cambria Math" panose="02040503050406030204" pitchFamily="18" charset="0"/>
-                                </a:rPr>
-                              </m:ctrlPr>
-                            </m:sSubPr>
-                            <m:e>
-                              <m:r>
-                                <a:rPr lang="en-US" i="1">
-                                  <a:solidFill>
-                                    <a:srgbClr val="1F2D29"/>
-                                  </a:solidFill>
-                                  <a:latin typeface="Cambria Math" panose="02040503050406030204" pitchFamily="18" charset="0"/>
-                                </a:rPr>
-                                <m:t>𝑥</m:t>
-                              </m:r>
-                            </m:e>
-                            <m:sub>
-                              <m:r>
-                                <a:rPr lang="en-US" i="1">
-                                  <a:solidFill>
-                                    <a:srgbClr val="1F2D29"/>
-                                  </a:solidFill>
-                                  <a:latin typeface="Cambria Math" panose="02040503050406030204" pitchFamily="18" charset="0"/>
-                                </a:rPr>
-                                <m:t>𝑘</m:t>
-                              </m:r>
-                              <m:r>
-                                <a:rPr lang="en-US" i="1">
-                                  <a:solidFill>
-                                    <a:srgbClr val="1F2D29"/>
-                                  </a:solidFill>
-                                  <a:latin typeface="Cambria Math" panose="02040503050406030204" pitchFamily="18" charset="0"/>
-                                </a:rPr>
-                                <m:t>+1</m:t>
-                              </m:r>
-                            </m:sub>
-                          </m:sSub>
-                          <m:r>
-                            <a:rPr lang="en-US" i="1">
-                              <a:solidFill>
-                                <a:srgbClr val="1F2D29"/>
-                              </a:solidFill>
-                              <a:latin typeface="Cambria Math" panose="02040503050406030204" pitchFamily="18" charset="0"/>
-                            </a:rPr>
-                            <m:t>−</m:t>
-                          </m:r>
-                          <m:sSub>
-                            <m:sSubPr>
-                              <m:ctrlPr>
-                                <a:rPr lang="en-US" i="1">
-                                  <a:solidFill>
-                                    <a:srgbClr val="1F2D29"/>
-                                  </a:solidFill>
-                                  <a:latin typeface="Cambria Math" panose="02040503050406030204" pitchFamily="18" charset="0"/>
-                                </a:rPr>
-                              </m:ctrlPr>
-                            </m:sSubPr>
-                            <m:e>
-                              <m:r>
-                                <a:rPr lang="en-US" i="1">
-                                  <a:solidFill>
-                                    <a:srgbClr val="1F2D29"/>
-                                  </a:solidFill>
-                                  <a:latin typeface="Cambria Math" panose="02040503050406030204" pitchFamily="18" charset="0"/>
-                                </a:rPr>
-                                <m:t>𝑥</m:t>
-                              </m:r>
-                            </m:e>
-                            <m:sub>
-                              <m:r>
-                                <a:rPr lang="en-US" i="1">
-                                  <a:solidFill>
-                                    <a:srgbClr val="1F2D29"/>
-                                  </a:solidFill>
-                                  <a:latin typeface="Cambria Math" panose="02040503050406030204" pitchFamily="18" charset="0"/>
-                                </a:rPr>
-                                <m:t>𝑘</m:t>
-                              </m:r>
-                            </m:sub>
-                          </m:sSub>
-                        </m:e>
-                      </m:d>
-                      <m:r>
-                        <a:rPr lang="en-US" i="1">
-                          <a:solidFill>
-                            <a:srgbClr val="1F2D29"/>
-                          </a:solidFill>
-                          <a:latin typeface="Cambria Math" panose="02040503050406030204" pitchFamily="18" charset="0"/>
-                        </a:rPr>
-                        <m:t>= </m:t>
-                      </m:r>
-                      <m:r>
-                        <m:rPr>
-                          <m:sty m:val="p"/>
-                        </m:rPr>
-                        <a:rPr lang="en-US" i="1">
-                          <a:solidFill>
-                            <a:srgbClr val="1F2D29"/>
-                          </a:solidFill>
-                          <a:latin typeface="Cambria Math" panose="02040503050406030204" pitchFamily="18" charset="0"/>
-                          <a:ea typeface="Cambria Math" panose="02040503050406030204" pitchFamily="18" charset="0"/>
-                        </a:rPr>
-                        <m:t>∇</m:t>
-                      </m:r>
-                      <m:r>
-                        <a:rPr lang="en-US" i="1">
-                          <a:solidFill>
-                            <a:srgbClr val="1F2D29"/>
-                          </a:solidFill>
-                          <a:latin typeface="Cambria Math" panose="02040503050406030204" pitchFamily="18" charset="0"/>
-                          <a:ea typeface="Cambria Math" panose="02040503050406030204" pitchFamily="18" charset="0"/>
-                        </a:rPr>
-                        <m:t>𝑓</m:t>
-                      </m:r>
-                      <m:d>
-                        <m:dPr>
-                          <m:ctrlPr>
-                            <a:rPr lang="en-US" i="1">
-                              <a:solidFill>
-                                <a:srgbClr val="1F2D29"/>
-                              </a:solidFill>
-                              <a:latin typeface="Cambria Math" panose="02040503050406030204" pitchFamily="18" charset="0"/>
-                              <a:ea typeface="Cambria Math" panose="02040503050406030204" pitchFamily="18" charset="0"/>
-                            </a:rPr>
-                          </m:ctrlPr>
-                        </m:dPr>
-                        <m:e>
-                          <m:sSub>
-                            <m:sSubPr>
-                              <m:ctrlPr>
-                                <a:rPr lang="en-US" i="1">
-                                  <a:solidFill>
-                                    <a:srgbClr val="1F2D29"/>
-                                  </a:solidFill>
-                                  <a:latin typeface="Cambria Math" panose="02040503050406030204" pitchFamily="18" charset="0"/>
-                                  <a:ea typeface="Cambria Math" panose="02040503050406030204" pitchFamily="18" charset="0"/>
-                                </a:rPr>
-                              </m:ctrlPr>
-                            </m:sSubPr>
-                            <m:e>
-                              <m:r>
-                                <a:rPr lang="en-US" i="1">
-                                  <a:solidFill>
-                                    <a:srgbClr val="1F2D29"/>
-                                  </a:solidFill>
-                                  <a:latin typeface="Cambria Math" panose="02040503050406030204" pitchFamily="18" charset="0"/>
-                                  <a:ea typeface="Cambria Math" panose="02040503050406030204" pitchFamily="18" charset="0"/>
-                                </a:rPr>
-                                <m:t>𝑥</m:t>
-                              </m:r>
-                            </m:e>
-                            <m:sub>
-                              <m:r>
-                                <a:rPr lang="en-US" i="1">
-                                  <a:solidFill>
-                                    <a:srgbClr val="1F2D29"/>
-                                  </a:solidFill>
-                                  <a:latin typeface="Cambria Math" panose="02040503050406030204" pitchFamily="18" charset="0"/>
-                                  <a:ea typeface="Cambria Math" panose="02040503050406030204" pitchFamily="18" charset="0"/>
-                                </a:rPr>
-                                <m:t>𝑘</m:t>
-                              </m:r>
-                              <m:r>
-                                <a:rPr lang="en-US" i="1">
-                                  <a:solidFill>
-                                    <a:srgbClr val="1F2D29"/>
-                                  </a:solidFill>
-                                  <a:latin typeface="Cambria Math" panose="02040503050406030204" pitchFamily="18" charset="0"/>
-                                  <a:ea typeface="Cambria Math" panose="02040503050406030204" pitchFamily="18" charset="0"/>
-                                </a:rPr>
-                                <m:t>+1</m:t>
-                              </m:r>
-                            </m:sub>
-                          </m:sSub>
-                        </m:e>
-                      </m:d>
-                      <m:r>
-                        <a:rPr lang="en-US" i="1">
-                          <a:solidFill>
-                            <a:srgbClr val="1F2D29"/>
-                          </a:solidFill>
-                          <a:latin typeface="Cambria Math" panose="02040503050406030204" pitchFamily="18" charset="0"/>
-                          <a:ea typeface="Cambria Math" panose="02040503050406030204" pitchFamily="18" charset="0"/>
-                        </a:rPr>
-                        <m:t>−</m:t>
-                      </m:r>
-                      <m:r>
-                        <m:rPr>
-                          <m:sty m:val="p"/>
-                        </m:rPr>
-                        <a:rPr lang="en-US" i="1">
-                          <a:solidFill>
-                            <a:srgbClr val="1F2D29"/>
-                          </a:solidFill>
-                          <a:latin typeface="Cambria Math" panose="02040503050406030204" pitchFamily="18" charset="0"/>
-                          <a:ea typeface="Cambria Math" panose="02040503050406030204" pitchFamily="18" charset="0"/>
-                        </a:rPr>
-                        <m:t>∇</m:t>
-                      </m:r>
-                      <m:r>
-                        <a:rPr lang="en-US" i="1">
-                          <a:solidFill>
-                            <a:srgbClr val="1F2D29"/>
-                          </a:solidFill>
-                          <a:latin typeface="Cambria Math" panose="02040503050406030204" pitchFamily="18" charset="0"/>
-                          <a:ea typeface="Cambria Math" panose="02040503050406030204" pitchFamily="18" charset="0"/>
-                        </a:rPr>
-                        <m:t>𝑓</m:t>
-                      </m:r>
-                      <m:d>
-                        <m:dPr>
-                          <m:ctrlPr>
-                            <a:rPr lang="en-US" i="1">
-                              <a:solidFill>
-                                <a:srgbClr val="1F2D29"/>
-                              </a:solidFill>
-                              <a:latin typeface="Cambria Math" panose="02040503050406030204" pitchFamily="18" charset="0"/>
-                              <a:ea typeface="Cambria Math" panose="02040503050406030204" pitchFamily="18" charset="0"/>
-                            </a:rPr>
-                          </m:ctrlPr>
-                        </m:dPr>
-                        <m:e>
-                          <m:sSub>
-                            <m:sSubPr>
-                              <m:ctrlPr>
-                                <a:rPr lang="en-US" i="1">
-                                  <a:solidFill>
-                                    <a:srgbClr val="1F2D29"/>
-                                  </a:solidFill>
-                                  <a:latin typeface="Cambria Math" panose="02040503050406030204" pitchFamily="18" charset="0"/>
-                                  <a:ea typeface="Cambria Math" panose="02040503050406030204" pitchFamily="18" charset="0"/>
-                                </a:rPr>
-                              </m:ctrlPr>
-                            </m:sSubPr>
-                            <m:e>
-                              <m:r>
-                                <a:rPr lang="en-US" i="1">
-                                  <a:solidFill>
-                                    <a:srgbClr val="1F2D29"/>
-                                  </a:solidFill>
-                                  <a:latin typeface="Cambria Math" panose="02040503050406030204" pitchFamily="18" charset="0"/>
-                                  <a:ea typeface="Cambria Math" panose="02040503050406030204" pitchFamily="18" charset="0"/>
-                                </a:rPr>
-                                <m:t>𝑥</m:t>
-                              </m:r>
-                            </m:e>
-                            <m:sub>
-                              <m:r>
-                                <a:rPr lang="en-US" i="1">
-                                  <a:solidFill>
-                                    <a:srgbClr val="1F2D29"/>
-                                  </a:solidFill>
-                                  <a:latin typeface="Cambria Math" panose="02040503050406030204" pitchFamily="18" charset="0"/>
-                                  <a:ea typeface="Cambria Math" panose="02040503050406030204" pitchFamily="18" charset="0"/>
-                                </a:rPr>
-                                <m:t>𝑘</m:t>
-                              </m:r>
-                            </m:sub>
-                          </m:sSub>
-                        </m:e>
-                      </m:d>
-                    </m:oMath>
-                  </m:oMathPara>
-                </a14:m>
-                <a:endParaRPr lang="en-IL" dirty="0">
-                  <a:solidFill>
-                    <a:srgbClr val="1F2D29"/>
-                  </a:solidFill>
-                </a:endParaRPr>
-              </a:p>
-              <a:p>
-                <a:pPr marL="0" indent="0">
-                  <a:buNone/>
-                </a:pPr>
-                <a:r>
-                  <a:rPr lang="en-US" dirty="0">
-                    <a:solidFill>
-                      <a:srgbClr val="1F2D29"/>
-                    </a:solidFill>
-                  </a:rPr>
-                  <a:t>W</a:t>
-                </a:r>
-                <a:r>
-                  <a:rPr lang="en-IL" dirty="0">
-                    <a:solidFill>
-                      <a:srgbClr val="1F2D29"/>
-                    </a:solidFill>
-                  </a:rPr>
-                  <a:t>here </a:t>
-                </a:r>
-                <a14:m>
-                  <m:oMath xmlns:m="http://schemas.openxmlformats.org/officeDocument/2006/math">
-                    <m:sSub>
-                      <m:sSubPr>
-                        <m:ctrlPr>
-                          <a:rPr lang="en-IL" i="1">
-                            <a:solidFill>
-                              <a:srgbClr val="1F2D29"/>
-                            </a:solidFill>
-                            <a:latin typeface="Cambria Math" panose="02040503050406030204" pitchFamily="18" charset="0"/>
-                          </a:rPr>
-                        </m:ctrlPr>
-                      </m:sSubPr>
-                      <m:e>
-                        <m:r>
-                          <a:rPr lang="en-US" i="1">
-                            <a:solidFill>
-                              <a:srgbClr val="1F2D29"/>
-                            </a:solidFill>
-                            <a:latin typeface="Cambria Math" panose="02040503050406030204" pitchFamily="18" charset="0"/>
-                          </a:rPr>
-                          <m:t>𝐵</m:t>
-                        </m:r>
-                      </m:e>
-                      <m:sub>
-                        <m:r>
-                          <a:rPr lang="en-US" i="1">
-                            <a:solidFill>
-                              <a:srgbClr val="1F2D29"/>
-                            </a:solidFill>
-                            <a:latin typeface="Cambria Math" panose="02040503050406030204" pitchFamily="18" charset="0"/>
-                          </a:rPr>
-                          <m:t>𝑘</m:t>
-                        </m:r>
-                        <m:r>
-                          <a:rPr lang="en-US" i="1">
-                            <a:solidFill>
-                              <a:srgbClr val="1F2D29"/>
-                            </a:solidFill>
-                            <a:latin typeface="Cambria Math" panose="02040503050406030204" pitchFamily="18" charset="0"/>
-                          </a:rPr>
-                          <m:t>+1</m:t>
-                        </m:r>
-                      </m:sub>
-                    </m:sSub>
-                  </m:oMath>
-                </a14:m>
-                <a:r>
-                  <a:rPr lang="en-IL" dirty="0">
-                    <a:solidFill>
-                      <a:srgbClr val="1F2D29"/>
-                    </a:solidFill>
-                  </a:rPr>
-                  <a:t> is the approximation of the hessian in step k+1</a:t>
-                </a:r>
-              </a:p>
-            </p:txBody>
-          </p:sp>
-        </mc:Choice>
-        <mc:Fallback xmlns="">
-          <p:sp>
-            <p:nvSpPr>
-              <p:cNvPr id="3" name="Content Placeholder 2">
-                <a:extLst>
-                  <a:ext uri="{FF2B5EF4-FFF2-40B4-BE49-F238E27FC236}">
-                    <a16:creationId xmlns:a16="http://schemas.microsoft.com/office/drawing/2014/main" id="{ECC5CEA5-34A6-FB08-4686-EB905E2EE3C7}"/>
-                  </a:ext>
-                </a:extLst>
-              </p:cNvPr>
-              <p:cNvSpPr>
-                <a:spLocks noGrp="1" noRot="1" noChangeAspect="1" noMove="1" noResize="1" noEditPoints="1" noAdjustHandles="1" noChangeArrowheads="1" noChangeShapeType="1" noTextEdit="1"/>
-              </p:cNvSpPr>
-              <p:nvPr>
-                <p:ph idx="1"/>
-              </p:nvPr>
-            </p:nvSpPr>
-            <p:spPr>
-              <a:xfrm>
-                <a:off x="2302933" y="2641604"/>
-                <a:ext cx="7621606" cy="3443107"/>
-              </a:xfrm>
-              <a:blipFill>
-                <a:blip r:embed="rId3"/>
-                <a:stretch>
-                  <a:fillRect l="-832"/>
-                </a:stretch>
-              </a:blipFill>
-            </p:spPr>
-            <p:txBody>
-              <a:bodyPr/>
-              <a:lstStyle/>
-              <a:p>
-                <a:r>
-                  <a:rPr lang="en-IL">
-                    <a:noFill/>
-                  </a:rPr>
-                  <a:t> </a:t>
-                </a:r>
-              </a:p>
-            </p:txBody>
-          </p:sp>
-        </mc:Fallback>
-      </mc:AlternateContent>
-    </p:spTree>
-    <p:extLst>
-      <p:ext uri="{BB962C8B-B14F-4D97-AF65-F5344CB8AC3E}">
-        <p14:creationId xmlns:p14="http://schemas.microsoft.com/office/powerpoint/2010/main" val="3662615432"/>
-      </p:ext>
-    </p:extLst>
-  </p:cSld>
-  <p:clrMapOvr>
-    <a:overrideClrMapping bg1="lt1" tx1="dk1" bg2="lt2" tx2="dk2" accent1="accent1" accent2="accent2" accent3="accent3" accent4="accent4" accent5="accent5" accent6="accent6" hlink="hlink" folHlink="folHlink"/>
-  </p:clrMapOvr>
-</p:sld>
-</file>
-
-<file path=ppt/slides/slide9.xml><?xml version="1.0" encoding="utf-8"?>
 <p:sld xmlns:a="http://schemas.openxmlformats.org/drawingml/2006/main" xmlns:r="http://schemas.openxmlformats.org/officeDocument/2006/relationships" xmlns:p="http://schemas.openxmlformats.org/presentationml/2006/main">
   <p:cSld>
     <p:bg>
@@ -26636,8 +24661,8 @@
           </a:fontRef>
         </p:style>
       </p:sp>
-      <mc:AlternateContent xmlns:mc="http://schemas.openxmlformats.org/markup-compatibility/2006">
-        <mc:Choice xmlns:a14="http://schemas.microsoft.com/office/drawing/2010/main" Requires="a14">
+      <mc:AlternateContent xmlns:mc="http://schemas.openxmlformats.org/markup-compatibility/2006" xmlns:a14="http://schemas.microsoft.com/office/drawing/2010/main">
+        <mc:Choice Requires="a14">
           <p:sp>
             <p:nvSpPr>
               <p:cNvPr id="3" name="Content Placeholder 2">
@@ -27529,7 +25554,7 @@
             </p:txBody>
           </p:sp>
         </mc:Choice>
-        <mc:Fallback>
+        <mc:Fallback xmlns="">
           <p:sp>
             <p:nvSpPr>
               <p:cNvPr id="3" name="Content Placeholder 2">
@@ -27577,6 +25602,1131 @@
     <p:extLst>
       <p:ext uri="{BB962C8B-B14F-4D97-AF65-F5344CB8AC3E}">
         <p14:creationId xmlns:p14="http://schemas.microsoft.com/office/powerpoint/2010/main" val="333337272"/>
+      </p:ext>
+    </p:extLst>
+  </p:cSld>
+  <p:clrMapOvr>
+    <a:overrideClrMapping bg1="lt1" tx1="dk1" bg2="lt2" tx2="dk2" accent1="accent1" accent2="accent2" accent3="accent3" accent4="accent4" accent5="accent5" accent6="accent6" hlink="hlink" folHlink="folHlink"/>
+  </p:clrMapOvr>
+</p:sld>
+</file>
+
+<file path=ppt/slides/slide9.xml><?xml version="1.0" encoding="utf-8"?>
+<p:sld xmlns:a="http://schemas.openxmlformats.org/drawingml/2006/main" xmlns:r="http://schemas.openxmlformats.org/officeDocument/2006/relationships" xmlns:p="http://schemas.openxmlformats.org/presentationml/2006/main">
+  <p:cSld>
+    <p:bg>
+      <p:bgPr>
+        <a:solidFill>
+          <a:schemeClr val="bg1"/>
+        </a:solidFill>
+        <a:effectLst/>
+      </p:bgPr>
+    </p:bg>
+    <p:spTree>
+      <p:nvGrpSpPr>
+        <p:cNvPr id="1" name=""/>
+        <p:cNvGrpSpPr/>
+        <p:nvPr/>
+      </p:nvGrpSpPr>
+      <p:grpSpPr>
+        <a:xfrm>
+          <a:off x="0" y="0"/>
+          <a:ext cx="0" cy="0"/>
+          <a:chOff x="0" y="0"/>
+          <a:chExt cx="0" cy="0"/>
+        </a:xfrm>
+      </p:grpSpPr>
+      <p:sp>
+        <p:nvSpPr>
+          <p:cNvPr id="8" name="Rectangle 7">
+            <a:extLst>
+              <a:ext uri="{FF2B5EF4-FFF2-40B4-BE49-F238E27FC236}">
+                <a16:creationId xmlns:a16="http://schemas.microsoft.com/office/drawing/2014/main" id="{D0BE3D13-5BE5-4B05-AFCF-2A2E059D29F8}"/>
+              </a:ext>
+              <a:ext uri="{C183D7F6-B498-43B3-948B-1728B52AA6E4}">
+                <adec:decorative xmlns:adec="http://schemas.microsoft.com/office/drawing/2017/decorative" val="1"/>
+              </a:ext>
+            </a:extLst>
+          </p:cNvPr>
+          <p:cNvSpPr>
+            <a:spLocks noGrp="1" noRot="1" noChangeAspect="1" noMove="1" noResize="1" noEditPoints="1" noAdjustHandles="1" noChangeArrowheads="1" noChangeShapeType="1" noTextEdit="1"/>
+          </p:cNvSpPr>
+          <p:nvPr>
+            <p:extLst>
+              <p:ext uri="{386F3935-93C4-4BCD-93E2-E3B085C9AB24}">
+                <p16:designElem xmlns:p16="http://schemas.microsoft.com/office/powerpoint/2015/main" val="1"/>
+              </p:ext>
+            </p:extLst>
+          </p:nvPr>
+        </p:nvSpPr>
+        <p:spPr>
+          <a:xfrm>
+            <a:off x="0" y="-1"/>
+            <a:ext cx="12192000" cy="6858001"/>
+          </a:xfrm>
+          <a:prstGeom prst="rect">
+            <a:avLst/>
+          </a:prstGeom>
+          <a:solidFill>
+            <a:srgbClr val="FFFFFF"/>
+          </a:solidFill>
+          <a:ln>
+            <a:noFill/>
+          </a:ln>
+        </p:spPr>
+        <p:style>
+          <a:lnRef idx="2">
+            <a:schemeClr val="accent1">
+              <a:shade val="50000"/>
+            </a:schemeClr>
+          </a:lnRef>
+          <a:fillRef idx="1">
+            <a:schemeClr val="accent1"/>
+          </a:fillRef>
+          <a:effectRef idx="0">
+            <a:schemeClr val="accent1"/>
+          </a:effectRef>
+          <a:fontRef idx="minor">
+            <a:schemeClr val="lt1"/>
+          </a:fontRef>
+        </p:style>
+        <p:txBody>
+          <a:bodyPr rtlCol="0" anchor="ctr"/>
+          <a:lstStyle/>
+          <a:p>
+            <a:pPr algn="ctr"/>
+            <a:endParaRPr lang="en-US"/>
+          </a:p>
+        </p:txBody>
+      </p:sp>
+      <p:sp>
+        <p:nvSpPr>
+          <p:cNvPr id="10" name="Oval 9">
+            <a:extLst>
+              <a:ext uri="{FF2B5EF4-FFF2-40B4-BE49-F238E27FC236}">
+                <a16:creationId xmlns:a16="http://schemas.microsoft.com/office/drawing/2014/main" id="{1AC85C80-0175-4214-A13D-03C224658C16}"/>
+              </a:ext>
+              <a:ext uri="{C183D7F6-B498-43B3-948B-1728B52AA6E4}">
+                <adec:decorative xmlns:adec="http://schemas.microsoft.com/office/drawing/2017/decorative" val="1"/>
+              </a:ext>
+            </a:extLst>
+          </p:cNvPr>
+          <p:cNvSpPr>
+            <a:spLocks noGrp="1" noRot="1" noChangeAspect="1" noMove="1" noResize="1" noEditPoints="1" noAdjustHandles="1" noChangeArrowheads="1" noChangeShapeType="1" noTextEdit="1"/>
+          </p:cNvSpPr>
+          <p:nvPr>
+            <p:extLst>
+              <p:ext uri="{386F3935-93C4-4BCD-93E2-E3B085C9AB24}">
+                <p16:designElem xmlns:p16="http://schemas.microsoft.com/office/powerpoint/2015/main" val="1"/>
+              </p:ext>
+            </p:extLst>
+          </p:nvPr>
+        </p:nvSpPr>
+        <p:spPr>
+          <a:xfrm>
+            <a:off x="1770108" y="985292"/>
+            <a:ext cx="1345319" cy="1345319"/>
+          </a:xfrm>
+          <a:prstGeom prst="ellipse">
+            <a:avLst/>
+          </a:prstGeom>
+          <a:solidFill>
+            <a:schemeClr val="accent1">
+              <a:lumMod val="40000"/>
+              <a:lumOff val="60000"/>
+            </a:schemeClr>
+          </a:solidFill>
+          <a:ln>
+            <a:noFill/>
+          </a:ln>
+        </p:spPr>
+        <p:style>
+          <a:lnRef idx="2">
+            <a:schemeClr val="accent1">
+              <a:shade val="50000"/>
+            </a:schemeClr>
+          </a:lnRef>
+          <a:fillRef idx="1">
+            <a:schemeClr val="accent1"/>
+          </a:fillRef>
+          <a:effectRef idx="0">
+            <a:schemeClr val="accent1"/>
+          </a:effectRef>
+          <a:fontRef idx="minor">
+            <a:schemeClr val="lt1"/>
+          </a:fontRef>
+        </p:style>
+        <p:txBody>
+          <a:bodyPr rtlCol="0" anchor="ctr"/>
+          <a:lstStyle/>
+          <a:p>
+            <a:pPr algn="ctr"/>
+            <a:endParaRPr lang="en-US"/>
+          </a:p>
+        </p:txBody>
+      </p:sp>
+      <p:pic>
+        <p:nvPicPr>
+          <p:cNvPr id="12" name="Picture 11">
+            <a:extLst>
+              <a:ext uri="{FF2B5EF4-FFF2-40B4-BE49-F238E27FC236}">
+                <a16:creationId xmlns:a16="http://schemas.microsoft.com/office/drawing/2014/main" id="{15ADB788-8569-409E-862D-665AD53C9904}"/>
+              </a:ext>
+              <a:ext uri="{C183D7F6-B498-43B3-948B-1728B52AA6E4}">
+                <adec:decorative xmlns:adec="http://schemas.microsoft.com/office/drawing/2017/decorative" val="1"/>
+              </a:ext>
+            </a:extLst>
+          </p:cNvPr>
+          <p:cNvPicPr>
+            <a:picLocks noGrp="1" noRot="1" noChangeAspect="1" noMove="1" noResize="1" noEditPoints="1" noAdjustHandles="1" noChangeArrowheads="1" noChangeShapeType="1" noCrop="1"/>
+          </p:cNvPicPr>
+          <p:nvPr>
+            <p:extLst>
+              <p:ext uri="{386F3935-93C4-4BCD-93E2-E3B085C9AB24}">
+                <p16:designElem xmlns:p16="http://schemas.microsoft.com/office/powerpoint/2015/main" val="1"/>
+              </p:ext>
+            </p:extLst>
+          </p:nvPr>
+        </p:nvPicPr>
+        <p:blipFill>
+          <a:blip r:embed="rId3">
+            <a:extLst>
+              <a:ext uri="{28A0092B-C50C-407E-A947-70E740481C1C}">
+                <a14:useLocalDpi xmlns:a14="http://schemas.microsoft.com/office/drawing/2010/main" val="0"/>
+              </a:ext>
+            </a:extLst>
+          </a:blip>
+          <a:stretch>
+            <a:fillRect/>
+          </a:stretch>
+        </p:blipFill>
+        <p:spPr>
+          <a:xfrm>
+            <a:off x="0" y="0"/>
+            <a:ext cx="12189867" cy="6858000"/>
+          </a:xfrm>
+          <a:prstGeom prst="rect">
+            <a:avLst/>
+          </a:prstGeom>
+        </p:spPr>
+      </p:pic>
+      <p:sp>
+        <p:nvSpPr>
+          <p:cNvPr id="2" name="Title 1">
+            <a:extLst>
+              <a:ext uri="{FF2B5EF4-FFF2-40B4-BE49-F238E27FC236}">
+                <a16:creationId xmlns:a16="http://schemas.microsoft.com/office/drawing/2014/main" id="{A7B4661C-FED8-5AC1-EB65-9274A85B981F}"/>
+              </a:ext>
+            </a:extLst>
+          </p:cNvPr>
+          <p:cNvSpPr>
+            <a:spLocks noGrp="1"/>
+          </p:cNvSpPr>
+          <p:nvPr>
+            <p:ph type="title"/>
+          </p:nvPr>
+        </p:nvSpPr>
+        <p:spPr>
+          <a:xfrm>
+            <a:off x="2611808" y="1022548"/>
+            <a:ext cx="7958331" cy="1308063"/>
+          </a:xfrm>
+        </p:spPr>
+        <p:txBody>
+          <a:bodyPr anchor="b">
+            <a:normAutofit/>
+          </a:bodyPr>
+          <a:lstStyle/>
+          <a:p>
+            <a:pPr algn="l"/>
+            <a:r>
+              <a:rPr lang="en-IL" sz="4400">
+                <a:solidFill>
+                  <a:srgbClr val="1F2D29"/>
+                </a:solidFill>
+              </a:rPr>
+              <a:t>Quasi-Newton methods</a:t>
+            </a:r>
+          </a:p>
+        </p:txBody>
+      </p:sp>
+      <p:sp>
+        <p:nvSpPr>
+          <p:cNvPr id="14" name="Rectangle 13">
+            <a:extLst>
+              <a:ext uri="{FF2B5EF4-FFF2-40B4-BE49-F238E27FC236}">
+                <a16:creationId xmlns:a16="http://schemas.microsoft.com/office/drawing/2014/main" id="{76562092-3AA7-4EF0-9007-C44F879A1308}"/>
+              </a:ext>
+              <a:ext uri="{C183D7F6-B498-43B3-948B-1728B52AA6E4}">
+                <adec:decorative xmlns:adec="http://schemas.microsoft.com/office/drawing/2017/decorative" val="1"/>
+              </a:ext>
+            </a:extLst>
+          </p:cNvPr>
+          <p:cNvSpPr>
+            <a:spLocks noGrp="1" noRot="1" noChangeAspect="1" noMove="1" noResize="1" noEditPoints="1" noAdjustHandles="1" noChangeArrowheads="1" noChangeShapeType="1" noTextEdit="1"/>
+          </p:cNvSpPr>
+          <p:nvPr>
+            <p:extLst>
+              <p:ext uri="{386F3935-93C4-4BCD-93E2-E3B085C9AB24}">
+                <p16:designElem xmlns:p16="http://schemas.microsoft.com/office/powerpoint/2015/main" val="1"/>
+              </p:ext>
+            </p:extLst>
+          </p:nvPr>
+        </p:nvSpPr>
+        <p:spPr>
+          <a:xfrm>
+            <a:off x="0" y="0"/>
+            <a:ext cx="964174" cy="6858000"/>
+          </a:xfrm>
+          <a:prstGeom prst="rect">
+            <a:avLst/>
+          </a:prstGeom>
+          <a:solidFill>
+            <a:srgbClr val="314740"/>
+          </a:solidFill>
+          <a:ln>
+            <a:noFill/>
+          </a:ln>
+        </p:spPr>
+        <p:style>
+          <a:lnRef idx="2">
+            <a:schemeClr val="accent1">
+              <a:shade val="50000"/>
+            </a:schemeClr>
+          </a:lnRef>
+          <a:fillRef idx="1">
+            <a:schemeClr val="accent1"/>
+          </a:fillRef>
+          <a:effectRef idx="0">
+            <a:schemeClr val="accent1"/>
+          </a:effectRef>
+          <a:fontRef idx="minor">
+            <a:schemeClr val="lt1"/>
+          </a:fontRef>
+        </p:style>
+      </p:sp>
+      <mc:AlternateContent xmlns:mc="http://schemas.openxmlformats.org/markup-compatibility/2006" xmlns:a14="http://schemas.microsoft.com/office/drawing/2010/main">
+        <mc:Choice Requires="a14">
+          <p:sp>
+            <p:nvSpPr>
+              <p:cNvPr id="3" name="Content Placeholder 2">
+                <a:extLst>
+                  <a:ext uri="{FF2B5EF4-FFF2-40B4-BE49-F238E27FC236}">
+                    <a16:creationId xmlns:a16="http://schemas.microsoft.com/office/drawing/2014/main" id="{ECC5CEA5-34A6-FB08-4686-EB905E2EE3C7}"/>
+                  </a:ext>
+                </a:extLst>
+              </p:cNvPr>
+              <p:cNvSpPr>
+                <a:spLocks noGrp="1"/>
+              </p:cNvSpPr>
+              <p:nvPr>
+                <p:ph idx="1"/>
+              </p:nvPr>
+            </p:nvSpPr>
+            <p:spPr>
+              <a:xfrm>
+                <a:off x="2302933" y="2641604"/>
+                <a:ext cx="7621606" cy="3874943"/>
+              </a:xfrm>
+            </p:spPr>
+            <p:txBody>
+              <a:bodyPr anchor="t">
+                <a:normAutofit/>
+              </a:bodyPr>
+              <a:lstStyle/>
+              <a:p>
+                <a:pPr marL="0" indent="0">
+                  <a:buNone/>
+                </a:pPr>
+                <a14:m>
+                  <m:oMathPara xmlns:m="http://schemas.openxmlformats.org/officeDocument/2006/math">
+                    <m:oMathParaPr>
+                      <m:jc m:val="left"/>
+                    </m:oMathParaPr>
+                    <m:oMath xmlns:m="http://schemas.openxmlformats.org/officeDocument/2006/math">
+                      <m:r>
+                        <m:rPr>
+                          <m:nor/>
+                        </m:rPr>
+                        <a:rPr lang="en-US" dirty="0" smtClean="0">
+                          <a:solidFill>
+                            <a:srgbClr val="1F2D29"/>
+                          </a:solidFill>
+                        </a:rPr>
+                        <m:t>Minimizing</m:t>
+                      </m:r>
+                      <m:r>
+                        <m:rPr>
+                          <m:nor/>
+                        </m:rPr>
+                        <a:rPr lang="en-US" dirty="0" smtClean="0">
+                          <a:solidFill>
+                            <a:srgbClr val="1F2D29"/>
+                          </a:solidFill>
+                        </a:rPr>
+                        <m:t> </m:t>
+                      </m:r>
+                      <m:r>
+                        <m:rPr>
+                          <m:nor/>
+                        </m:rPr>
+                        <a:rPr lang="en-US" dirty="0" smtClean="0">
+                          <a:solidFill>
+                            <a:srgbClr val="1F2D29"/>
+                          </a:solidFill>
+                        </a:rPr>
+                        <m:t>this</m:t>
+                      </m:r>
+                      <m:r>
+                        <m:rPr>
+                          <m:nor/>
+                        </m:rPr>
+                        <a:rPr lang="en-US" dirty="0" smtClean="0">
+                          <a:solidFill>
+                            <a:srgbClr val="1F2D29"/>
+                          </a:solidFill>
+                        </a:rPr>
+                        <m:t> </m:t>
+                      </m:r>
+                      <m:r>
+                        <m:rPr>
+                          <m:nor/>
+                        </m:rPr>
+                        <a:rPr lang="en-US" dirty="0" smtClean="0">
+                          <a:solidFill>
+                            <a:srgbClr val="1F2D29"/>
+                          </a:solidFill>
+                        </a:rPr>
+                        <m:t>model</m:t>
+                      </m:r>
+                      <m:r>
+                        <m:rPr>
+                          <m:nor/>
+                        </m:rPr>
+                        <a:rPr lang="en-US" dirty="0" smtClean="0">
+                          <a:solidFill>
+                            <a:srgbClr val="1F2D29"/>
+                          </a:solidFill>
+                        </a:rPr>
+                        <m:t> </m:t>
+                      </m:r>
+                      <m:r>
+                        <m:rPr>
+                          <m:nor/>
+                        </m:rPr>
+                        <a:rPr lang="en-US" dirty="0" smtClean="0">
+                          <a:solidFill>
+                            <a:srgbClr val="1F2D29"/>
+                          </a:solidFill>
+                        </a:rPr>
+                        <m:t>yields</m:t>
+                      </m:r>
+                      <m:r>
+                        <m:rPr>
+                          <m:nor/>
+                        </m:rPr>
+                        <a:rPr lang="en-US" dirty="0" smtClean="0">
+                          <a:solidFill>
+                            <a:srgbClr val="1F2D29"/>
+                          </a:solidFill>
+                        </a:rPr>
+                        <m:t>:</m:t>
+                      </m:r>
+                    </m:oMath>
+                  </m:oMathPara>
+                </a14:m>
+                <a:endParaRPr lang="en-US" dirty="0">
+                  <a:solidFill>
+                    <a:srgbClr val="1F2D29"/>
+                  </a:solidFill>
+                </a:endParaRPr>
+              </a:p>
+              <a:p>
+                <a:pPr marL="0" indent="0">
+                  <a:buNone/>
+                </a:pPr>
+                <a14:m>
+                  <m:oMathPara xmlns:m="http://schemas.openxmlformats.org/officeDocument/2006/math">
+                    <m:oMathParaPr>
+                      <m:jc m:val="left"/>
+                    </m:oMathParaPr>
+                    <m:oMath xmlns:m="http://schemas.openxmlformats.org/officeDocument/2006/math">
+                      <m:r>
+                        <m:rPr>
+                          <m:sty m:val="p"/>
+                        </m:rPr>
+                        <a:rPr lang="en-US">
+                          <a:solidFill>
+                            <a:srgbClr val="1F2D29"/>
+                          </a:solidFill>
+                          <a:latin typeface="Cambria Math" panose="02040503050406030204" pitchFamily="18" charset="0"/>
+                        </a:rPr>
+                        <m:t>∇</m:t>
+                      </m:r>
+                      <m:sSub>
+                        <m:sSubPr>
+                          <m:ctrlPr>
+                            <a:rPr lang="en-US" i="1">
+                              <a:solidFill>
+                                <a:srgbClr val="1F2D29"/>
+                              </a:solidFill>
+                              <a:latin typeface="Cambria Math" panose="02040503050406030204" pitchFamily="18" charset="0"/>
+                            </a:rPr>
+                          </m:ctrlPr>
+                        </m:sSubPr>
+                        <m:e>
+                          <m:r>
+                            <a:rPr lang="en-US" i="1">
+                              <a:solidFill>
+                                <a:srgbClr val="1F2D29"/>
+                              </a:solidFill>
+                              <a:latin typeface="Cambria Math" panose="02040503050406030204" pitchFamily="18" charset="0"/>
+                            </a:rPr>
+                            <m:t>𝑚</m:t>
+                          </m:r>
+                        </m:e>
+                        <m:sub>
+                          <m:r>
+                            <a:rPr lang="en-US" i="1">
+                              <a:solidFill>
+                                <a:srgbClr val="1F2D29"/>
+                              </a:solidFill>
+                              <a:latin typeface="Cambria Math" panose="02040503050406030204" pitchFamily="18" charset="0"/>
+                            </a:rPr>
+                            <m:t>𝑘</m:t>
+                          </m:r>
+                        </m:sub>
+                      </m:sSub>
+                      <m:r>
+                        <a:rPr lang="en-US" i="1">
+                          <a:solidFill>
+                            <a:srgbClr val="1F2D29"/>
+                          </a:solidFill>
+                          <a:latin typeface="Cambria Math" panose="02040503050406030204" pitchFamily="18" charset="0"/>
+                        </a:rPr>
+                        <m:t>=</m:t>
+                      </m:r>
+                      <m:r>
+                        <m:rPr>
+                          <m:sty m:val="p"/>
+                        </m:rPr>
+                        <a:rPr lang="en-US">
+                          <a:solidFill>
+                            <a:srgbClr val="1F2D29"/>
+                          </a:solidFill>
+                          <a:latin typeface="Cambria Math" panose="02040503050406030204" pitchFamily="18" charset="0"/>
+                        </a:rPr>
+                        <m:t>∇</m:t>
+                      </m:r>
+                      <m:r>
+                        <a:rPr lang="en-US" i="1">
+                          <a:solidFill>
+                            <a:srgbClr val="1F2D29"/>
+                          </a:solidFill>
+                          <a:latin typeface="Cambria Math" panose="02040503050406030204" pitchFamily="18" charset="0"/>
+                        </a:rPr>
+                        <m:t>𝑓</m:t>
+                      </m:r>
+                      <m:r>
+                        <m:rPr>
+                          <m:lit/>
+                        </m:rPr>
+                        <a:rPr lang="en-US" i="1">
+                          <a:solidFill>
+                            <a:srgbClr val="1F2D29"/>
+                          </a:solidFill>
+                          <a:latin typeface="Cambria Math" panose="02040503050406030204" pitchFamily="18" charset="0"/>
+                        </a:rPr>
+                        <m:t>(</m:t>
+                      </m:r>
+                      <m:sSub>
+                        <m:sSubPr>
+                          <m:ctrlPr>
+                            <a:rPr lang="en-US" i="1">
+                              <a:solidFill>
+                                <a:srgbClr val="1F2D29"/>
+                              </a:solidFill>
+                              <a:latin typeface="Cambria Math" panose="02040503050406030204" pitchFamily="18" charset="0"/>
+                            </a:rPr>
+                          </m:ctrlPr>
+                        </m:sSubPr>
+                        <m:e>
+                          <m:r>
+                            <a:rPr lang="en-US" i="1">
+                              <a:solidFill>
+                                <a:srgbClr val="1F2D29"/>
+                              </a:solidFill>
+                              <a:latin typeface="Cambria Math" panose="02040503050406030204" pitchFamily="18" charset="0"/>
+                            </a:rPr>
+                            <m:t>𝑥</m:t>
+                          </m:r>
+                        </m:e>
+                        <m:sub>
+                          <m:r>
+                            <a:rPr lang="en-US" i="1">
+                              <a:solidFill>
+                                <a:srgbClr val="1F2D29"/>
+                              </a:solidFill>
+                              <a:latin typeface="Cambria Math" panose="02040503050406030204" pitchFamily="18" charset="0"/>
+                            </a:rPr>
+                            <m:t>𝑘</m:t>
+                          </m:r>
+                        </m:sub>
+                      </m:sSub>
+                      <m:r>
+                        <m:rPr>
+                          <m:lit/>
+                        </m:rPr>
+                        <a:rPr lang="en-US" i="1">
+                          <a:solidFill>
+                            <a:srgbClr val="1F2D29"/>
+                          </a:solidFill>
+                          <a:latin typeface="Cambria Math" panose="02040503050406030204" pitchFamily="18" charset="0"/>
+                        </a:rPr>
+                        <m:t>)</m:t>
+                      </m:r>
+                      <m:r>
+                        <a:rPr lang="en-US" i="1">
+                          <a:solidFill>
+                            <a:srgbClr val="1F2D29"/>
+                          </a:solidFill>
+                          <a:latin typeface="Cambria Math" panose="02040503050406030204" pitchFamily="18" charset="0"/>
+                        </a:rPr>
+                        <m:t>+</m:t>
+                      </m:r>
+                      <m:sSub>
+                        <m:sSubPr>
+                          <m:ctrlPr>
+                            <a:rPr lang="en-US" i="1">
+                              <a:solidFill>
+                                <a:srgbClr val="1F2D29"/>
+                              </a:solidFill>
+                              <a:latin typeface="Cambria Math" panose="02040503050406030204" pitchFamily="18" charset="0"/>
+                            </a:rPr>
+                          </m:ctrlPr>
+                        </m:sSubPr>
+                        <m:e>
+                          <m:r>
+                            <a:rPr lang="en-US" i="1">
+                              <a:solidFill>
+                                <a:srgbClr val="1F2D29"/>
+                              </a:solidFill>
+                              <a:latin typeface="Cambria Math" panose="02040503050406030204" pitchFamily="18" charset="0"/>
+                            </a:rPr>
+                            <m:t>𝐵</m:t>
+                          </m:r>
+                        </m:e>
+                        <m:sub>
+                          <m:r>
+                            <a:rPr lang="en-US" i="1">
+                              <a:solidFill>
+                                <a:srgbClr val="1F2D29"/>
+                              </a:solidFill>
+                              <a:latin typeface="Cambria Math" panose="02040503050406030204" pitchFamily="18" charset="0"/>
+                            </a:rPr>
+                            <m:t>𝑘</m:t>
+                          </m:r>
+                        </m:sub>
+                      </m:sSub>
+                      <m:sSub>
+                        <m:sSubPr>
+                          <m:ctrlPr>
+                            <a:rPr lang="en-US" i="1">
+                              <a:solidFill>
+                                <a:srgbClr val="1F2D29"/>
+                              </a:solidFill>
+                              <a:latin typeface="Cambria Math" panose="02040503050406030204" pitchFamily="18" charset="0"/>
+                            </a:rPr>
+                          </m:ctrlPr>
+                        </m:sSubPr>
+                        <m:e>
+                          <m:r>
+                            <a:rPr lang="en-US" i="1">
+                              <a:solidFill>
+                                <a:srgbClr val="1F2D29"/>
+                              </a:solidFill>
+                              <a:latin typeface="Cambria Math" panose="02040503050406030204" pitchFamily="18" charset="0"/>
+                            </a:rPr>
+                            <m:t>𝑝</m:t>
+                          </m:r>
+                        </m:e>
+                        <m:sub>
+                          <m:r>
+                            <a:rPr lang="en-US" i="1">
+                              <a:solidFill>
+                                <a:srgbClr val="1F2D29"/>
+                              </a:solidFill>
+                              <a:latin typeface="Cambria Math" panose="02040503050406030204" pitchFamily="18" charset="0"/>
+                            </a:rPr>
+                            <m:t>𝑘</m:t>
+                          </m:r>
+                        </m:sub>
+                      </m:sSub>
+                      <m:r>
+                        <a:rPr lang="en-US" i="1">
+                          <a:solidFill>
+                            <a:srgbClr val="1F2D29"/>
+                          </a:solidFill>
+                          <a:latin typeface="Cambria Math" panose="02040503050406030204" pitchFamily="18" charset="0"/>
+                        </a:rPr>
+                        <m:t>=0⇒</m:t>
+                      </m:r>
+                      <m:sSub>
+                        <m:sSubPr>
+                          <m:ctrlPr>
+                            <a:rPr lang="en-US" i="1">
+                              <a:solidFill>
+                                <a:srgbClr val="1F2D29"/>
+                              </a:solidFill>
+                              <a:latin typeface="Cambria Math" panose="02040503050406030204" pitchFamily="18" charset="0"/>
+                            </a:rPr>
+                          </m:ctrlPr>
+                        </m:sSubPr>
+                        <m:e>
+                          <m:r>
+                            <a:rPr lang="en-US" i="1">
+                              <a:solidFill>
+                                <a:srgbClr val="1F2D29"/>
+                              </a:solidFill>
+                              <a:latin typeface="Cambria Math" panose="02040503050406030204" pitchFamily="18" charset="0"/>
+                            </a:rPr>
+                            <m:t>𝑝</m:t>
+                          </m:r>
+                        </m:e>
+                        <m:sub>
+                          <m:r>
+                            <a:rPr lang="en-US" i="1">
+                              <a:solidFill>
+                                <a:srgbClr val="1F2D29"/>
+                              </a:solidFill>
+                              <a:latin typeface="Cambria Math" panose="02040503050406030204" pitchFamily="18" charset="0"/>
+                            </a:rPr>
+                            <m:t>𝑘</m:t>
+                          </m:r>
+                        </m:sub>
+                      </m:sSub>
+                      <m:r>
+                        <a:rPr lang="en-US" i="1">
+                          <a:solidFill>
+                            <a:srgbClr val="1F2D29"/>
+                          </a:solidFill>
+                          <a:latin typeface="Cambria Math" panose="02040503050406030204" pitchFamily="18" charset="0"/>
+                        </a:rPr>
+                        <m:t>=−</m:t>
+                      </m:r>
+                      <m:sSubSup>
+                        <m:sSubSupPr>
+                          <m:ctrlPr>
+                            <a:rPr lang="en-US" i="1">
+                              <a:solidFill>
+                                <a:srgbClr val="1F2D29"/>
+                              </a:solidFill>
+                              <a:latin typeface="Cambria Math" panose="02040503050406030204" pitchFamily="18" charset="0"/>
+                            </a:rPr>
+                          </m:ctrlPr>
+                        </m:sSubSupPr>
+                        <m:e>
+                          <m:r>
+                            <a:rPr lang="en-US" i="1">
+                              <a:solidFill>
+                                <a:srgbClr val="1F2D29"/>
+                              </a:solidFill>
+                              <a:latin typeface="Cambria Math" panose="02040503050406030204" pitchFamily="18" charset="0"/>
+                            </a:rPr>
+                            <m:t>𝐵</m:t>
+                          </m:r>
+                        </m:e>
+                        <m:sub>
+                          <m:r>
+                            <a:rPr lang="en-US" i="1">
+                              <a:solidFill>
+                                <a:srgbClr val="1F2D29"/>
+                              </a:solidFill>
+                              <a:latin typeface="Cambria Math" panose="02040503050406030204" pitchFamily="18" charset="0"/>
+                            </a:rPr>
+                            <m:t>𝑘</m:t>
+                          </m:r>
+                        </m:sub>
+                        <m:sup>
+                          <m:r>
+                            <a:rPr lang="en-US" i="1">
+                              <a:solidFill>
+                                <a:srgbClr val="1F2D29"/>
+                              </a:solidFill>
+                              <a:latin typeface="Cambria Math" panose="02040503050406030204" pitchFamily="18" charset="0"/>
+                            </a:rPr>
+                            <m:t>−1</m:t>
+                          </m:r>
+                        </m:sup>
+                      </m:sSubSup>
+                      <m:r>
+                        <m:rPr>
+                          <m:sty m:val="p"/>
+                        </m:rPr>
+                        <a:rPr lang="en-US">
+                          <a:solidFill>
+                            <a:srgbClr val="1F2D29"/>
+                          </a:solidFill>
+                          <a:latin typeface="Cambria Math" panose="02040503050406030204" pitchFamily="18" charset="0"/>
+                        </a:rPr>
+                        <m:t>∇</m:t>
+                      </m:r>
+                      <m:r>
+                        <a:rPr lang="en-US" i="1">
+                          <a:solidFill>
+                            <a:srgbClr val="1F2D29"/>
+                          </a:solidFill>
+                          <a:latin typeface="Cambria Math" panose="02040503050406030204" pitchFamily="18" charset="0"/>
+                        </a:rPr>
+                        <m:t>𝑓</m:t>
+                      </m:r>
+                      <m:r>
+                        <m:rPr>
+                          <m:lit/>
+                        </m:rPr>
+                        <a:rPr lang="en-US" i="1">
+                          <a:solidFill>
+                            <a:srgbClr val="1F2D29"/>
+                          </a:solidFill>
+                          <a:latin typeface="Cambria Math" panose="02040503050406030204" pitchFamily="18" charset="0"/>
+                        </a:rPr>
+                        <m:t>(</m:t>
+                      </m:r>
+                      <m:sSub>
+                        <m:sSubPr>
+                          <m:ctrlPr>
+                            <a:rPr lang="en-US" i="1">
+                              <a:solidFill>
+                                <a:srgbClr val="1F2D29"/>
+                              </a:solidFill>
+                              <a:latin typeface="Cambria Math" panose="02040503050406030204" pitchFamily="18" charset="0"/>
+                            </a:rPr>
+                          </m:ctrlPr>
+                        </m:sSubPr>
+                        <m:e>
+                          <m:r>
+                            <a:rPr lang="en-US" i="1">
+                              <a:solidFill>
+                                <a:srgbClr val="1F2D29"/>
+                              </a:solidFill>
+                              <a:latin typeface="Cambria Math" panose="02040503050406030204" pitchFamily="18" charset="0"/>
+                            </a:rPr>
+                            <m:t>𝑥</m:t>
+                          </m:r>
+                        </m:e>
+                        <m:sub>
+                          <m:r>
+                            <a:rPr lang="en-US" i="1">
+                              <a:solidFill>
+                                <a:srgbClr val="1F2D29"/>
+                              </a:solidFill>
+                              <a:latin typeface="Cambria Math" panose="02040503050406030204" pitchFamily="18" charset="0"/>
+                            </a:rPr>
+                            <m:t>𝑘</m:t>
+                          </m:r>
+                        </m:sub>
+                      </m:sSub>
+                      <m:r>
+                        <m:rPr>
+                          <m:lit/>
+                        </m:rPr>
+                        <a:rPr lang="en-US" i="1">
+                          <a:solidFill>
+                            <a:srgbClr val="1F2D29"/>
+                          </a:solidFill>
+                          <a:latin typeface="Cambria Math" panose="02040503050406030204" pitchFamily="18" charset="0"/>
+                        </a:rPr>
+                        <m:t>)</m:t>
+                      </m:r>
+                      <m:r>
+                        <a:rPr lang="en-US" i="1">
+                          <a:solidFill>
+                            <a:srgbClr val="1F2D29"/>
+                          </a:solidFill>
+                          <a:latin typeface="Cambria Math" panose="02040503050406030204" pitchFamily="18" charset="0"/>
+                        </a:rPr>
+                        <m:t> </m:t>
+                      </m:r>
+                    </m:oMath>
+                  </m:oMathPara>
+                </a14:m>
+                <a:endParaRPr lang="en-US" dirty="0">
+                  <a:solidFill>
+                    <a:srgbClr val="1F2D29"/>
+                  </a:solidFill>
+                </a:endParaRPr>
+              </a:p>
+              <a:p>
+                <a:pPr marL="0" indent="0">
+                  <a:buNone/>
+                </a:pPr>
+                <a:r>
+                  <a:rPr lang="en-US" dirty="0"/>
+                  <a:t>This minimizer, </a:t>
+                </a:r>
+                <a14:m>
+                  <m:oMath xmlns:m="http://schemas.openxmlformats.org/officeDocument/2006/math">
+                    <m:sSub>
+                      <m:sSubPr>
+                        <m:ctrlPr>
+                          <a:rPr lang="en-US" b="0" i="1" smtClean="0">
+                            <a:latin typeface="Cambria Math" panose="02040503050406030204" pitchFamily="18" charset="0"/>
+                          </a:rPr>
+                        </m:ctrlPr>
+                      </m:sSubPr>
+                      <m:e>
+                        <m:r>
+                          <a:rPr lang="en-US" b="0" i="1" smtClean="0">
+                            <a:latin typeface="Cambria Math" panose="02040503050406030204" pitchFamily="18" charset="0"/>
+                          </a:rPr>
+                          <m:t>𝑝</m:t>
+                        </m:r>
+                      </m:e>
+                      <m:sub>
+                        <m:r>
+                          <a:rPr lang="en-US" b="0" i="1" smtClean="0">
+                            <a:latin typeface="Cambria Math" panose="02040503050406030204" pitchFamily="18" charset="0"/>
+                          </a:rPr>
+                          <m:t>𝑘</m:t>
+                        </m:r>
+                      </m:sub>
+                    </m:sSub>
+                  </m:oMath>
+                </a14:m>
+                <a:r>
+                  <a:rPr lang="en-US" dirty="0"/>
+                  <a:t>  is used as the new search direction.</a:t>
+                </a:r>
+              </a:p>
+              <a:p>
+                <a:pPr marL="0" indent="0">
+                  <a:buNone/>
+                </a:pPr>
+                <a:r>
+                  <a:rPr lang="en-US" dirty="0"/>
+                  <a:t>The new iterate is </a:t>
+                </a:r>
+                <a14:m>
+                  <m:oMath xmlns:m="http://schemas.openxmlformats.org/officeDocument/2006/math">
+                    <m:sSub>
+                      <m:sSubPr>
+                        <m:ctrlPr>
+                          <a:rPr lang="en-US" b="0" i="1" dirty="0" smtClean="0">
+                            <a:latin typeface="Cambria Math" panose="02040503050406030204" pitchFamily="18" charset="0"/>
+                          </a:rPr>
+                        </m:ctrlPr>
+                      </m:sSubPr>
+                      <m:e>
+                        <m:r>
+                          <a:rPr lang="en-US" i="1" dirty="0" smtClean="0">
+                            <a:latin typeface="Cambria Math" panose="02040503050406030204" pitchFamily="18" charset="0"/>
+                          </a:rPr>
+                          <m:t>𝑥</m:t>
+                        </m:r>
+                      </m:e>
+                      <m:sub>
+                        <m:r>
+                          <a:rPr lang="en-US" b="0" i="1" dirty="0" smtClean="0">
+                            <a:latin typeface="Cambria Math" panose="02040503050406030204" pitchFamily="18" charset="0"/>
+                          </a:rPr>
+                          <m:t>𝑘</m:t>
+                        </m:r>
+                        <m:r>
+                          <a:rPr lang="en-US" b="0" i="1" dirty="0" smtClean="0">
+                            <a:latin typeface="Cambria Math" panose="02040503050406030204" pitchFamily="18" charset="0"/>
+                          </a:rPr>
+                          <m:t>+1</m:t>
+                        </m:r>
+                      </m:sub>
+                    </m:sSub>
+                    <m:r>
+                      <a:rPr lang="en-US" i="1" dirty="0" smtClean="0">
+                        <a:latin typeface="Cambria Math" panose="02040503050406030204" pitchFamily="18" charset="0"/>
+                      </a:rPr>
+                      <m:t> = </m:t>
+                    </m:r>
+                    <m:sSub>
+                      <m:sSubPr>
+                        <m:ctrlPr>
+                          <a:rPr lang="en-US" b="0" i="1" dirty="0" smtClean="0">
+                            <a:latin typeface="Cambria Math" panose="02040503050406030204" pitchFamily="18" charset="0"/>
+                          </a:rPr>
+                        </m:ctrlPr>
+                      </m:sSubPr>
+                      <m:e>
+                        <m:r>
+                          <a:rPr lang="en-US" b="0" i="1" dirty="0" smtClean="0">
+                            <a:latin typeface="Cambria Math" panose="02040503050406030204" pitchFamily="18" charset="0"/>
+                          </a:rPr>
+                          <m:t>𝑥</m:t>
+                        </m:r>
+                      </m:e>
+                      <m:sub>
+                        <m:r>
+                          <a:rPr lang="en-US" b="0" i="1" dirty="0" smtClean="0">
+                            <a:latin typeface="Cambria Math" panose="02040503050406030204" pitchFamily="18" charset="0"/>
+                          </a:rPr>
+                          <m:t>𝑘</m:t>
+                        </m:r>
+                      </m:sub>
+                    </m:sSub>
+                    <m:r>
+                      <a:rPr lang="en-US" i="1" dirty="0">
+                        <a:latin typeface="Cambria Math" panose="02040503050406030204" pitchFamily="18" charset="0"/>
+                      </a:rPr>
+                      <m:t> +</m:t>
+                    </m:r>
+                    <m:sSub>
+                      <m:sSubPr>
+                        <m:ctrlPr>
+                          <a:rPr lang="en-US" b="0" i="1" dirty="0" smtClean="0">
+                            <a:latin typeface="Cambria Math" panose="02040503050406030204" pitchFamily="18" charset="0"/>
+                          </a:rPr>
+                        </m:ctrlPr>
+                      </m:sSubPr>
+                      <m:e>
+                        <m:r>
+                          <a:rPr lang="en-US" b="0" i="1" dirty="0" smtClean="0">
+                            <a:latin typeface="Cambria Math" panose="02040503050406030204" pitchFamily="18" charset="0"/>
+                          </a:rPr>
+                          <m:t>𝛼</m:t>
+                        </m:r>
+                      </m:e>
+                      <m:sub>
+                        <m:r>
+                          <a:rPr lang="en-US" b="0" i="1" dirty="0" smtClean="0">
+                            <a:latin typeface="Cambria Math" panose="02040503050406030204" pitchFamily="18" charset="0"/>
+                          </a:rPr>
+                          <m:t>𝑘</m:t>
+                        </m:r>
+                      </m:sub>
+                    </m:sSub>
+                    <m:sSub>
+                      <m:sSubPr>
+                        <m:ctrlPr>
+                          <a:rPr lang="en-US" b="0" i="1" dirty="0" smtClean="0">
+                            <a:latin typeface="Cambria Math" panose="02040503050406030204" pitchFamily="18" charset="0"/>
+                          </a:rPr>
+                        </m:ctrlPr>
+                      </m:sSubPr>
+                      <m:e>
+                        <m:r>
+                          <a:rPr lang="en-US" i="1" dirty="0">
+                            <a:latin typeface="Cambria Math" panose="02040503050406030204" pitchFamily="18" charset="0"/>
+                          </a:rPr>
+                          <m:t>𝑝</m:t>
+                        </m:r>
+                      </m:e>
+                      <m:sub>
+                        <m:r>
+                          <a:rPr lang="en-US" b="0" i="1" dirty="0" smtClean="0">
+                            <a:latin typeface="Cambria Math" panose="02040503050406030204" pitchFamily="18" charset="0"/>
+                          </a:rPr>
+                          <m:t>𝑘</m:t>
+                        </m:r>
+                      </m:sub>
+                    </m:sSub>
+                  </m:oMath>
+                </a14:m>
+                <a:r>
+                  <a:rPr lang="en-US" dirty="0"/>
+                  <a:t>, where the step length </a:t>
+                </a:r>
+                <a14:m>
+                  <m:oMath xmlns:m="http://schemas.openxmlformats.org/officeDocument/2006/math">
+                    <m:sSub>
+                      <m:sSubPr>
+                        <m:ctrlPr>
+                          <a:rPr lang="en-US" b="0" i="1" smtClean="0">
+                            <a:latin typeface="Cambria Math" panose="02040503050406030204" pitchFamily="18" charset="0"/>
+                          </a:rPr>
+                        </m:ctrlPr>
+                      </m:sSubPr>
+                      <m:e>
+                        <m:r>
+                          <a:rPr lang="en-US" b="0" i="1" smtClean="0">
+                            <a:latin typeface="Cambria Math" panose="02040503050406030204" pitchFamily="18" charset="0"/>
+                          </a:rPr>
+                          <m:t>𝛼</m:t>
+                        </m:r>
+                      </m:e>
+                      <m:sub>
+                        <m:r>
+                          <a:rPr lang="en-US" b="0" i="1" smtClean="0">
+                            <a:latin typeface="Cambria Math" panose="02040503050406030204" pitchFamily="18" charset="0"/>
+                          </a:rPr>
+                          <m:t>𝑘</m:t>
+                        </m:r>
+                      </m:sub>
+                    </m:sSub>
+                  </m:oMath>
+                </a14:m>
+                <a:r>
+                  <a:rPr lang="en-US" dirty="0"/>
+                  <a:t> is chosen to satisfy the Wolfe conditions. </a:t>
+                </a:r>
+              </a:p>
+              <a:p>
+                <a:pPr marL="0" indent="0">
+                  <a:buNone/>
+                </a:pPr>
+                <a:endParaRPr lang="en-US" b="0" dirty="0">
+                  <a:solidFill>
+                    <a:srgbClr val="1F2D29"/>
+                  </a:solidFill>
+                </a:endParaRPr>
+              </a:p>
+            </p:txBody>
+          </p:sp>
+        </mc:Choice>
+        <mc:Fallback xmlns="">
+          <p:sp>
+            <p:nvSpPr>
+              <p:cNvPr id="3" name="Content Placeholder 2">
+                <a:extLst>
+                  <a:ext uri="{FF2B5EF4-FFF2-40B4-BE49-F238E27FC236}">
+                    <a16:creationId xmlns:a16="http://schemas.microsoft.com/office/drawing/2014/main" id="{ECC5CEA5-34A6-FB08-4686-EB905E2EE3C7}"/>
+                  </a:ext>
+                </a:extLst>
+              </p:cNvPr>
+              <p:cNvSpPr>
+                <a:spLocks noGrp="1" noRot="1" noChangeAspect="1" noMove="1" noResize="1" noEditPoints="1" noAdjustHandles="1" noChangeArrowheads="1" noChangeShapeType="1" noTextEdit="1"/>
+              </p:cNvSpPr>
+              <p:nvPr>
+                <p:ph idx="1"/>
+              </p:nvPr>
+            </p:nvSpPr>
+            <p:spPr>
+              <a:xfrm>
+                <a:off x="2302933" y="2641604"/>
+                <a:ext cx="7621606" cy="3874943"/>
+              </a:xfrm>
+              <a:blipFill>
+                <a:blip r:embed="rId4"/>
+                <a:stretch>
+                  <a:fillRect l="-832" r="-666"/>
+                </a:stretch>
+              </a:blipFill>
+            </p:spPr>
+            <p:txBody>
+              <a:bodyPr/>
+              <a:lstStyle/>
+              <a:p>
+                <a:r>
+                  <a:rPr lang="en-IL">
+                    <a:noFill/>
+                  </a:rPr>
+                  <a:t> </a:t>
+                </a:r>
+              </a:p>
+            </p:txBody>
+          </p:sp>
+        </mc:Fallback>
+      </mc:AlternateContent>
+    </p:spTree>
+    <p:extLst>
+      <p:ext uri="{BB962C8B-B14F-4D97-AF65-F5344CB8AC3E}">
+        <p14:creationId xmlns:p14="http://schemas.microsoft.com/office/powerpoint/2010/main" val="4232583844"/>
       </p:ext>
     </p:extLst>
   </p:cSld>

</xml_diff>

<commit_message>
update final proj presentation
</commit_message>
<xml_diff>
--- a/final_proj/final proj presentation.pptx
+++ b/final_proj/final proj presentation.pptx
@@ -1309,7 +1309,7 @@
           <a:p>
             <a:fld id="{9AB3A824-1A51-4B26-AD58-A6D8E14F6C04}" type="datetimeFigureOut">
               <a:rPr lang="en-US" smtClean="0"/>
-              <a:t>6/5/22</a:t>
+              <a:t>6/5/2022</a:t>
             </a:fld>
             <a:endParaRPr lang="en-US" dirty="0"/>
           </a:p>
@@ -1649,7 +1649,7 @@
           <a:p>
             <a:fld id="{D857E33E-8B18-4087-B112-809917729534}" type="datetimeFigureOut">
               <a:rPr lang="en-US" smtClean="0"/>
-              <a:t>6/5/22</a:t>
+              <a:t>6/5/2022</a:t>
             </a:fld>
             <a:endParaRPr lang="en-US" dirty="0"/>
           </a:p>
@@ -1957,7 +1957,7 @@
           <a:p>
             <a:fld id="{D3FFE419-2371-464F-8239-3959401C3561}" type="datetimeFigureOut">
               <a:rPr lang="en-US" smtClean="0"/>
-              <a:t>6/5/22</a:t>
+              <a:t>6/5/2022</a:t>
             </a:fld>
             <a:endParaRPr lang="en-US" dirty="0"/>
           </a:p>
@@ -2210,7 +2210,7 @@
           <a:p>
             <a:fld id="{97D162C4-EDD9-4389-A98B-B87ECEA2A816}" type="datetimeFigureOut">
               <a:rPr lang="en-US" smtClean="0"/>
-              <a:t>6/5/22</a:t>
+              <a:t>6/5/2022</a:t>
             </a:fld>
             <a:endParaRPr lang="en-US" dirty="0"/>
           </a:p>
@@ -2623,7 +2623,7 @@
           <a:p>
             <a:fld id="{3E5059C3-6A89-4494-99FF-5A4D6FFD50EB}" type="datetimeFigureOut">
               <a:rPr lang="en-US" smtClean="0"/>
-              <a:t>6/5/22</a:t>
+              <a:t>6/5/2022</a:t>
             </a:fld>
             <a:endParaRPr lang="en-US" dirty="0"/>
           </a:p>
@@ -2943,7 +2943,7 @@
           <a:p>
             <a:fld id="{CA954B2F-12DE-47F5-8894-472B206D2E1E}" type="datetimeFigureOut">
               <a:rPr lang="en-US" smtClean="0"/>
-              <a:t>6/5/22</a:t>
+              <a:t>6/5/2022</a:t>
             </a:fld>
             <a:endParaRPr lang="en-US" dirty="0"/>
           </a:p>
@@ -3493,7 +3493,7 @@
           <a:p>
             <a:fld id="{3F30E46F-7819-4ACF-B48B-48222C2ACC88}" type="datetimeFigureOut">
               <a:rPr lang="en-US" smtClean="0"/>
-              <a:t>6/5/22</a:t>
+              <a:t>6/5/2022</a:t>
             </a:fld>
             <a:endParaRPr lang="en-US" dirty="0"/>
           </a:p>
@@ -3694,7 +3694,7 @@
           <a:p>
             <a:fld id="{1FAF3416-4057-4DAA-829D-4CA07428D088}" type="datetimeFigureOut">
               <a:rPr lang="en-US" smtClean="0"/>
-              <a:t>6/5/22</a:t>
+              <a:t>6/5/2022</a:t>
             </a:fld>
             <a:endParaRPr lang="en-US" dirty="0"/>
           </a:p>
@@ -3913,7 +3913,7 @@
           <a:p>
             <a:fld id="{921D9284-D300-4297-87F7-E791DCC15DB1}" type="datetimeFigureOut">
               <a:rPr lang="en-US" smtClean="0"/>
-              <a:t>6/5/22</a:t>
+              <a:t>6/5/2022</a:t>
             </a:fld>
             <a:endParaRPr lang="en-US" dirty="0"/>
           </a:p>
@@ -4288,7 +4288,7 @@
           <a:p>
             <a:fld id="{37D525BB-DA17-4BA0-B3C8-3AC3ABC827E6}" type="datetimeFigureOut">
               <a:rPr lang="en-US" smtClean="0"/>
-              <a:t>6/5/22</a:t>
+              <a:t>6/5/2022</a:t>
             </a:fld>
             <a:endParaRPr lang="en-US" dirty="0"/>
           </a:p>
@@ -4697,7 +4697,7 @@
           <a:p>
             <a:fld id="{B16C4C9A-3960-41CF-A4E9-2A8FB932454B}" type="datetimeFigureOut">
               <a:rPr lang="en-US" smtClean="0"/>
-              <a:t>6/5/22</a:t>
+              <a:t>6/5/2022</a:t>
             </a:fld>
             <a:endParaRPr lang="en-US" dirty="0"/>
           </a:p>
@@ -5014,7 +5014,7 @@
           <a:p>
             <a:fld id="{3CBC1C18-307B-4F68-A007-B5B542270E8D}" type="datetimeFigureOut">
               <a:rPr lang="en-US" smtClean="0"/>
-              <a:t>6/5/22</a:t>
+              <a:t>6/5/2022</a:t>
             </a:fld>
             <a:endParaRPr lang="en-US" dirty="0"/>
           </a:p>
@@ -6283,7 +6283,13 @@
                           <a:rPr lang="en-US" b="0" i="1" smtClean="0">
                             <a:latin typeface="Cambria Math" panose="02040503050406030204" pitchFamily="18" charset="0"/>
                           </a:rPr>
-                          <m:t>+1</m:t>
+                          <m:t>+</m:t>
+                        </m:r>
+                        <m:r>
+                          <a:rPr lang="en-US" b="0" i="1" smtClean="0">
+                            <a:latin typeface="Cambria Math" panose="02040503050406030204" pitchFamily="18" charset="0"/>
+                          </a:rPr>
+                          <m:t>1</m:t>
                         </m:r>
                       </m:sub>
                     </m:sSub>
@@ -6363,7 +6369,16 @@
                             </a:solidFill>
                             <a:latin typeface="Cambria Math" panose="02040503050406030204" pitchFamily="18" charset="0"/>
                           </a:rPr>
-                          <m:t>+1</m:t>
+                          <m:t>+</m:t>
+                        </m:r>
+                        <m:r>
+                          <a:rPr lang="en-US" b="0" i="1" smtClean="0">
+                            <a:solidFill>
+                              <a:srgbClr val="1F2D29"/>
+                            </a:solidFill>
+                            <a:latin typeface="Cambria Math" panose="02040503050406030204" pitchFamily="18" charset="0"/>
+                          </a:rPr>
+                          <m:t>1</m:t>
                         </m:r>
                       </m:sub>
                     </m:sSub>
@@ -6459,7 +6474,16 @@
                             </a:solidFill>
                             <a:latin typeface="Cambria Math" panose="02040503050406030204" pitchFamily="18" charset="0"/>
                           </a:rPr>
-                          <m:t>+1</m:t>
+                          <m:t>+</m:t>
+                        </m:r>
+                        <m:r>
+                          <a:rPr lang="en-US" b="0" i="1" smtClean="0">
+                            <a:solidFill>
+                              <a:srgbClr val="1F2D29"/>
+                            </a:solidFill>
+                            <a:latin typeface="Cambria Math" panose="02040503050406030204" pitchFamily="18" charset="0"/>
+                          </a:rPr>
+                          <m:t>1</m:t>
                         </m:r>
                       </m:sub>
                     </m:sSub>
@@ -6553,7 +6577,16 @@
                             </a:solidFill>
                             <a:latin typeface="Cambria Math" panose="02040503050406030204" pitchFamily="18" charset="0"/>
                           </a:rPr>
-                          <m:t>+1</m:t>
+                          <m:t>+</m:t>
+                        </m:r>
+                        <m:r>
+                          <a:rPr lang="en-US" b="0" i="1" smtClean="0">
+                            <a:solidFill>
+                              <a:srgbClr val="1F2D29"/>
+                            </a:solidFill>
+                            <a:latin typeface="Cambria Math" panose="02040503050406030204" pitchFamily="18" charset="0"/>
+                          </a:rPr>
+                          <m:t>1</m:t>
                         </m:r>
                       </m:sub>
                     </m:sSub>
@@ -6719,7 +6752,16 @@
                             </a:solidFill>
                             <a:latin typeface="Cambria Math" panose="02040503050406030204" pitchFamily="18" charset="0"/>
                           </a:rPr>
-                          <m:t>+1</m:t>
+                          <m:t>+</m:t>
+                        </m:r>
+                        <m:r>
+                          <a:rPr lang="en-US" b="0" i="1" smtClean="0">
+                            <a:solidFill>
+                              <a:srgbClr val="1F2D29"/>
+                            </a:solidFill>
+                            <a:latin typeface="Cambria Math" panose="02040503050406030204" pitchFamily="18" charset="0"/>
+                          </a:rPr>
+                          <m:t>1</m:t>
                         </m:r>
                       </m:sub>
                     </m:sSub>
@@ -6808,7 +6850,16 @@
                             </a:solidFill>
                             <a:latin typeface="Cambria Math" panose="02040503050406030204" pitchFamily="18" charset="0"/>
                           </a:rPr>
-                          <m:t>+1</m:t>
+                          <m:t>+</m:t>
+                        </m:r>
+                        <m:r>
+                          <a:rPr lang="en-US" b="0" i="1" smtClean="0">
+                            <a:solidFill>
+                              <a:srgbClr val="1F2D29"/>
+                            </a:solidFill>
+                            <a:latin typeface="Cambria Math" panose="02040503050406030204" pitchFamily="18" charset="0"/>
+                          </a:rPr>
+                          <m:t>1</m:t>
                         </m:r>
                       </m:sub>
                     </m:sSub>
@@ -6916,7 +6967,16 @@
                             </a:solidFill>
                             <a:latin typeface="Cambria Math" panose="02040503050406030204" pitchFamily="18" charset="0"/>
                           </a:rPr>
-                          <m:t>+1</m:t>
+                          <m:t>+</m:t>
+                        </m:r>
+                        <m:r>
+                          <a:rPr lang="en-US" b="0" i="1" smtClean="0">
+                            <a:solidFill>
+                              <a:srgbClr val="1F2D29"/>
+                            </a:solidFill>
+                            <a:latin typeface="Cambria Math" panose="02040503050406030204" pitchFamily="18" charset="0"/>
+                          </a:rPr>
+                          <m:t>1</m:t>
                         </m:r>
                       </m:sub>
                     </m:sSub>
@@ -6996,7 +7056,16 @@
                             </a:solidFill>
                             <a:latin typeface="Cambria Math" panose="02040503050406030204" pitchFamily="18" charset="0"/>
                           </a:rPr>
-                          <m:t>+1</m:t>
+                          <m:t>+</m:t>
+                        </m:r>
+                        <m:r>
+                          <a:rPr lang="en-US" b="0" i="1" smtClean="0">
+                            <a:solidFill>
+                              <a:srgbClr val="1F2D29"/>
+                            </a:solidFill>
+                            <a:latin typeface="Cambria Math" panose="02040503050406030204" pitchFamily="18" charset="0"/>
+                          </a:rPr>
+                          <m:t>1</m:t>
                         </m:r>
                       </m:sub>
                     </m:sSub>
@@ -7620,7 +7689,16 @@
                               </a:solidFill>
                               <a:latin typeface="Cambria Math" panose="02040503050406030204" pitchFamily="18" charset="0"/>
                             </a:rPr>
-                            <m:t>+1</m:t>
+                            <m:t>+</m:t>
+                          </m:r>
+                          <m:r>
+                            <a:rPr lang="en-US" b="0" i="1" smtClean="0">
+                              <a:solidFill>
+                                <a:srgbClr val="1F2D29"/>
+                              </a:solidFill>
+                              <a:latin typeface="Cambria Math" panose="02040503050406030204" pitchFamily="18" charset="0"/>
+                            </a:rPr>
+                            <m:t>1</m:t>
                           </m:r>
                         </m:sub>
                       </m:sSub>
@@ -7864,7 +7942,16 @@
                               </a:solidFill>
                               <a:latin typeface="Cambria Math" panose="02040503050406030204" pitchFamily="18" charset="0"/>
                             </a:rPr>
-                            <m:t>+1</m:t>
+                            <m:t>+</m:t>
+                          </m:r>
+                          <m:r>
+                            <a:rPr lang="en-US" b="0" i="1" smtClean="0">
+                              <a:solidFill>
+                                <a:srgbClr val="1F2D29"/>
+                              </a:solidFill>
+                              <a:latin typeface="Cambria Math" panose="02040503050406030204" pitchFamily="18" charset="0"/>
+                            </a:rPr>
+                            <m:t>1</m:t>
                           </m:r>
                         </m:sub>
                       </m:sSub>
@@ -7987,7 +8074,16 @@
                                       </a:solidFill>
                                       <a:latin typeface="Cambria Math" panose="02040503050406030204" pitchFamily="18" charset="0"/>
                                     </a:rPr>
-                                    <m:t>+1</m:t>
+                                    <m:t>+</m:t>
+                                  </m:r>
+                                  <m:r>
+                                    <a:rPr lang="en-US" b="0" i="1" smtClean="0">
+                                      <a:solidFill>
+                                        <a:srgbClr val="1F2D29"/>
+                                      </a:solidFill>
+                                      <a:latin typeface="Cambria Math" panose="02040503050406030204" pitchFamily="18" charset="0"/>
+                                    </a:rPr>
+                                    <m:t>1</m:t>
                                   </m:r>
                                 </m:sub>
                               </m:sSub>
@@ -8166,7 +8262,16 @@
                               </a:solidFill>
                               <a:latin typeface="Cambria Math" panose="02040503050406030204" pitchFamily="18" charset="0"/>
                             </a:rPr>
-                            <m:t>+1</m:t>
+                            <m:t>+</m:t>
+                          </m:r>
+                          <m:r>
+                            <a:rPr lang="en-US" b="0" i="1" smtClean="0">
+                              <a:solidFill>
+                                <a:srgbClr val="1F2D29"/>
+                              </a:solidFill>
+                              <a:latin typeface="Cambria Math" panose="02040503050406030204" pitchFamily="18" charset="0"/>
+                            </a:rPr>
+                            <m:t>1</m:t>
                           </m:r>
                         </m:sub>
                       </m:sSub>
@@ -8252,7 +8357,16 @@
                               </a:solidFill>
                               <a:latin typeface="Cambria Math" panose="02040503050406030204" pitchFamily="18" charset="0"/>
                             </a:rPr>
-                            <m:t>+1</m:t>
+                            <m:t>+</m:t>
+                          </m:r>
+                          <m:r>
+                            <a:rPr lang="en-US" b="0" i="1" smtClean="0">
+                              <a:solidFill>
+                                <a:srgbClr val="1F2D29"/>
+                              </a:solidFill>
+                              <a:latin typeface="Cambria Math" panose="02040503050406030204" pitchFamily="18" charset="0"/>
+                            </a:rPr>
+                            <m:t>1</m:t>
                           </m:r>
                         </m:sub>
                       </m:sSub>
@@ -8461,7 +8575,16 @@
                               </a:solidFill>
                               <a:latin typeface="Cambria Math" panose="02040503050406030204" pitchFamily="18" charset="0"/>
                             </a:rPr>
-                            <m:t>+1</m:t>
+                            <m:t>+</m:t>
+                          </m:r>
+                          <m:r>
+                            <a:rPr lang="en-US" i="1">
+                              <a:solidFill>
+                                <a:srgbClr val="1F2D29"/>
+                              </a:solidFill>
+                              <a:latin typeface="Cambria Math" panose="02040503050406030204" pitchFamily="18" charset="0"/>
+                            </a:rPr>
+                            <m:t>1</m:t>
                           </m:r>
                         </m:sub>
                       </m:sSub>
@@ -8619,7 +8742,16 @@
                               </a:solidFill>
                               <a:latin typeface="Cambria Math" panose="02040503050406030204" pitchFamily="18" charset="0"/>
                             </a:rPr>
-                            <m:t>+1</m:t>
+                            <m:t>+</m:t>
+                          </m:r>
+                          <m:r>
+                            <a:rPr lang="en-US" i="1">
+                              <a:solidFill>
+                                <a:srgbClr val="1F2D29"/>
+                              </a:solidFill>
+                              <a:latin typeface="Cambria Math" panose="02040503050406030204" pitchFamily="18" charset="0"/>
+                            </a:rPr>
+                            <m:t>1</m:t>
                           </m:r>
                         </m:sub>
                       </m:sSub>
@@ -8799,7 +8931,16 @@
                             </a:solidFill>
                             <a:latin typeface="Cambria Math" panose="02040503050406030204" pitchFamily="18" charset="0"/>
                           </a:rPr>
-                          <m:t>+1</m:t>
+                          <m:t>+</m:t>
+                        </m:r>
+                        <m:r>
+                          <a:rPr lang="en-US" b="0" i="1" smtClean="0">
+                            <a:solidFill>
+                              <a:srgbClr val="1F2D29"/>
+                            </a:solidFill>
+                            <a:latin typeface="Cambria Math" panose="02040503050406030204" pitchFamily="18" charset="0"/>
+                          </a:rPr>
+                          <m:t>1</m:t>
                         </m:r>
                       </m:sub>
                     </m:sSub>
@@ -9050,7 +9191,16 @@
                             </a:solidFill>
                             <a:latin typeface="Cambria Math" panose="02040503050406030204" pitchFamily="18" charset="0"/>
                           </a:rPr>
-                          <m:t>+1</m:t>
+                          <m:t>+</m:t>
+                        </m:r>
+                        <m:r>
+                          <a:rPr lang="en-US" i="1">
+                            <a:solidFill>
+                              <a:srgbClr val="1F2D29"/>
+                            </a:solidFill>
+                            <a:latin typeface="Cambria Math" panose="02040503050406030204" pitchFamily="18" charset="0"/>
+                          </a:rPr>
+                          <m:t>1</m:t>
                         </m:r>
                       </m:sub>
                     </m:sSub>
@@ -9655,7 +9805,25 @@
                               </a:solidFill>
                               <a:latin typeface="Cambria Math" panose="02040503050406030204" pitchFamily="18" charset="0"/>
                             </a:rPr>
-                            <m:t>+1 </m:t>
+                            <m:t>+</m:t>
+                          </m:r>
+                          <m:r>
+                            <a:rPr lang="en-US" b="0" i="1" smtClean="0">
+                              <a:solidFill>
+                                <a:srgbClr val="1F2D29"/>
+                              </a:solidFill>
+                              <a:latin typeface="Cambria Math" panose="02040503050406030204" pitchFamily="18" charset="0"/>
+                            </a:rPr>
+                            <m:t>1</m:t>
+                          </m:r>
+                          <m:r>
+                            <a:rPr lang="en-US" b="0" i="1" smtClean="0">
+                              <a:solidFill>
+                                <a:srgbClr val="1F2D29"/>
+                              </a:solidFill>
+                              <a:latin typeface="Cambria Math" panose="02040503050406030204" pitchFamily="18" charset="0"/>
+                            </a:rPr>
+                            <m:t> </m:t>
                           </m:r>
                         </m:sub>
                       </m:sSub>
@@ -13656,7 +13824,16 @@
                                   </a:solidFill>
                                   <a:latin typeface="Cambria Math" panose="02040503050406030204" pitchFamily="18" charset="0"/>
                                 </a:rPr>
-                                <m:t>−3</m:t>
+                                <m:t>−</m:t>
+                              </m:r>
+                              <m:r>
+                                <a:rPr lang="en-GB" sz="1900" i="1" smtClean="0">
+                                  <a:solidFill>
+                                    <a:srgbClr val="1F2D29"/>
+                                  </a:solidFill>
+                                  <a:latin typeface="Cambria Math" panose="02040503050406030204" pitchFamily="18" charset="0"/>
+                                </a:rPr>
+                                <m:t>3</m:t>
                               </m:r>
                             </m:e>
                             <m:e>
@@ -13989,7 +14166,16 @@
                                     </a:solidFill>
                                     <a:latin typeface="Cambria Math" panose="02040503050406030204" pitchFamily="18" charset="0"/>
                                   </a:rPr>
-                                  <m:t>−1</m:t>
+                                  <m:t>−</m:t>
+                                </m:r>
+                                <m:r>
+                                  <a:rPr lang="en-GB" sz="1900" i="1" smtClean="0">
+                                    <a:solidFill>
+                                      <a:srgbClr val="1F2D29"/>
+                                    </a:solidFill>
+                                    <a:latin typeface="Cambria Math" panose="02040503050406030204" pitchFamily="18" charset="0"/>
+                                  </a:rPr>
+                                  <m:t>1</m:t>
                                 </m:r>
                               </m:e>
                               <m:e>
@@ -14466,7 +14652,16 @@
                               </a:solidFill>
                               <a:latin typeface="Cambria Math" panose="02040503050406030204" pitchFamily="18" charset="0"/>
                             </a:rPr>
-                            <m:t>−1</m:t>
+                            <m:t>−</m:t>
+                          </m:r>
+                          <m:r>
+                            <a:rPr lang="en-GB" sz="1900" i="1" smtClean="0">
+                              <a:solidFill>
+                                <a:srgbClr val="1F2D29"/>
+                              </a:solidFill>
+                              <a:latin typeface="Cambria Math" panose="02040503050406030204" pitchFamily="18" charset="0"/>
+                            </a:rPr>
+                            <m:t>1</m:t>
                           </m:r>
                         </m:sup>
                       </m:sSup>
@@ -15265,7 +15460,16 @@
                                     </a:solidFill>
                                     <a:latin typeface="Cambria Math" panose="02040503050406030204" pitchFamily="18" charset="0"/>
                                   </a:rPr>
-                                  <m:t>−1</m:t>
+                                  <m:t>−</m:t>
+                                </m:r>
+                                <m:r>
+                                  <a:rPr lang="en-GB" i="1">
+                                    <a:solidFill>
+                                      <a:srgbClr val="1F2D29"/>
+                                    </a:solidFill>
+                                    <a:latin typeface="Cambria Math" panose="02040503050406030204" pitchFamily="18" charset="0"/>
+                                  </a:rPr>
+                                  <m:t>1</m:t>
                                 </m:r>
                               </m:e>
                               <m:e>
@@ -17523,8 +17727,8 @@
           </a:p>
         </p:txBody>
       </p:sp>
-      <mc:AlternateContent xmlns:mc="http://schemas.openxmlformats.org/markup-compatibility/2006" xmlns:a14="http://schemas.microsoft.com/office/drawing/2010/main">
-        <mc:Choice Requires="a14">
+      <mc:AlternateContent xmlns:mc="http://schemas.openxmlformats.org/markup-compatibility/2006">
+        <mc:Choice xmlns:a14="http://schemas.microsoft.com/office/drawing/2010/main" Requires="a14">
           <p:sp>
             <p:nvSpPr>
               <p:cNvPr id="15" name="Content Placeholder 2">
@@ -17542,7 +17746,7 @@
             <p:spPr>
               <a:xfrm>
                 <a:off x="2302933" y="2641604"/>
-                <a:ext cx="7621606" cy="3443107"/>
+                <a:ext cx="7621606" cy="3973509"/>
               </a:xfrm>
               <a:prstGeom prst="rect">
                 <a:avLst/>
@@ -17550,7 +17754,7 @@
             </p:spPr>
             <p:txBody>
               <a:bodyPr vert="horz" lIns="91440" tIns="45720" rIns="91440" bIns="45720" rtlCol="0" anchor="t">
-                <a:normAutofit/>
+                <a:normAutofit fontScale="85000" lnSpcReduction="10000"/>
               </a:bodyPr>
               <a:lstStyle>
                 <a:lvl1pPr marL="344488" indent="-338328" algn="l" defTabSz="914400" rtl="0" eaLnBrk="1" latinLnBrk="0" hangingPunct="1">
@@ -17791,17 +17995,16 @@
               <a:p>
                 <a:pPr marL="285750" indent="-285750"/>
                 <a:r>
-                  <a:rPr lang="en-GB" sz="1600" dirty="0">
+                  <a:rPr lang="en-GB" sz="1800" dirty="0">
                     <a:solidFill>
                       <a:srgbClr val="1F2D29"/>
                     </a:solidFill>
                   </a:rPr>
-                  <a:t>We perform SVD on the covariance matrix of our dataset:</a:t>
+                  <a:t>We perform SVD on the standardized covariance matrix of our dataset:</a:t>
                 </a:r>
               </a:p>
               <a:p>
                 <a:pPr marL="0" indent="0">
-                  <a:buFont typeface="Wingdings" panose="05000000000000000000" pitchFamily="2" charset="2"/>
                   <a:buNone/>
                 </a:pPr>
                 <a14:m>
@@ -17814,7 +18017,7 @@
                         <m:rPr>
                           <m:sty m:val="p"/>
                         </m:rPr>
-                        <a:rPr lang="en-GB" sz="1600" smtClean="0">
+                        <a:rPr lang="en-GB" sz="1800" smtClean="0">
                           <a:solidFill>
                             <a:srgbClr val="1F2D29"/>
                           </a:solidFill>
@@ -17823,7 +18026,7 @@
                         <m:t>Σ</m:t>
                       </m:r>
                       <m:r>
-                        <a:rPr lang="en-GB" sz="1600" i="1" smtClean="0">
+                        <a:rPr lang="en-GB" sz="1800" i="1" smtClean="0">
                           <a:solidFill>
                             <a:srgbClr val="1F2D29"/>
                           </a:solidFill>
@@ -17834,7 +18037,7 @@
                       <m:f>
                         <m:fPr>
                           <m:ctrlPr>
-                            <a:rPr lang="en-GB" sz="1600" i="1" smtClean="0">
+                            <a:rPr lang="en-GB" sz="1800" i="1" smtClean="0">
                               <a:solidFill>
                                 <a:srgbClr val="1F2D29"/>
                               </a:solidFill>
@@ -17844,7 +18047,7 @@
                         </m:fPr>
                         <m:num>
                           <m:r>
-                            <a:rPr lang="en-GB" sz="1600" i="1" smtClean="0">
+                            <a:rPr lang="en-GB" sz="1800" i="1" smtClean="0">
                               <a:solidFill>
                                 <a:srgbClr val="1F2D29"/>
                               </a:solidFill>
@@ -17855,7 +18058,7 @@
                         </m:num>
                         <m:den>
                           <m:r>
-                            <a:rPr lang="en-GB" sz="1600" i="1" smtClean="0">
+                            <a:rPr lang="en-GB" sz="1800" i="1" smtClean="0">
                               <a:solidFill>
                                 <a:srgbClr val="1F2D29"/>
                               </a:solidFill>
@@ -17868,7 +18071,7 @@
                       <m:sSup>
                         <m:sSupPr>
                           <m:ctrlPr>
-                            <a:rPr lang="en-GB" sz="1600" i="1" smtClean="0">
+                            <a:rPr lang="en-GB" sz="1800" i="1" smtClean="0">
                               <a:solidFill>
                                 <a:srgbClr val="1F2D29"/>
                               </a:solidFill>
@@ -17877,19 +18080,34 @@
                           </m:ctrlPr>
                         </m:sSupPr>
                         <m:e>
-                          <m:r>
-                            <a:rPr lang="en-GB" sz="1600" i="1" smtClean="0">
-                              <a:solidFill>
-                                <a:srgbClr val="1F2D29"/>
-                              </a:solidFill>
-                              <a:latin typeface="Cambria Math" panose="02040503050406030204" pitchFamily="18" charset="0"/>
-                            </a:rPr>
-                            <m:t>𝑋</m:t>
-                          </m:r>
+                          <m:acc>
+                            <m:accPr>
+                              <m:chr m:val="̅"/>
+                              <m:ctrlPr>
+                                <a:rPr lang="en-GB" sz="1800" i="1" smtClean="0">
+                                  <a:solidFill>
+                                    <a:srgbClr val="1F2D29"/>
+                                  </a:solidFill>
+                                  <a:latin typeface="Cambria Math" panose="02040503050406030204" pitchFamily="18" charset="0"/>
+                                </a:rPr>
+                              </m:ctrlPr>
+                            </m:accPr>
+                            <m:e>
+                              <m:r>
+                                <a:rPr lang="en-GB" sz="1800" i="1">
+                                  <a:solidFill>
+                                    <a:srgbClr val="1F2D29"/>
+                                  </a:solidFill>
+                                  <a:latin typeface="Cambria Math" panose="02040503050406030204" pitchFamily="18" charset="0"/>
+                                </a:rPr>
+                                <m:t>𝑋</m:t>
+                              </m:r>
+                            </m:e>
+                          </m:acc>
                         </m:e>
                         <m:sup>
                           <m:r>
-                            <a:rPr lang="en-GB" sz="1600" i="1" smtClean="0">
+                            <a:rPr lang="en-GB" sz="1800" i="1" smtClean="0">
                               <a:solidFill>
                                 <a:srgbClr val="1F2D29"/>
                               </a:solidFill>
@@ -17899,19 +18117,34 @@
                           </m:r>
                         </m:sup>
                       </m:sSup>
-                      <m:r>
-                        <a:rPr lang="en-GB" sz="1600" i="1" smtClean="0">
-                          <a:solidFill>
-                            <a:srgbClr val="1F2D29"/>
-                          </a:solidFill>
-                          <a:latin typeface="Cambria Math" panose="02040503050406030204" pitchFamily="18" charset="0"/>
-                        </a:rPr>
-                        <m:t>𝑋</m:t>
-                      </m:r>
+                      <m:acc>
+                        <m:accPr>
+                          <m:chr m:val="̅"/>
+                          <m:ctrlPr>
+                            <a:rPr lang="en-GB" sz="1800" i="1">
+                              <a:solidFill>
+                                <a:srgbClr val="1F2D29"/>
+                              </a:solidFill>
+                              <a:latin typeface="Cambria Math" panose="02040503050406030204" pitchFamily="18" charset="0"/>
+                            </a:rPr>
+                          </m:ctrlPr>
+                        </m:accPr>
+                        <m:e>
+                          <m:r>
+                            <a:rPr lang="en-GB" sz="1800" i="1">
+                              <a:solidFill>
+                                <a:srgbClr val="1F2D29"/>
+                              </a:solidFill>
+                              <a:latin typeface="Cambria Math" panose="02040503050406030204" pitchFamily="18" charset="0"/>
+                            </a:rPr>
+                            <m:t>𝑋</m:t>
+                          </m:r>
+                        </m:e>
+                      </m:acc>
                     </m:oMath>
                   </m:oMathPara>
                 </a14:m>
-                <a:endParaRPr lang="en-GB" sz="1600" dirty="0">
+                <a:endParaRPr lang="en-GB" sz="1800" dirty="0">
                   <a:solidFill>
                     <a:srgbClr val="1F2D29"/>
                   </a:solidFill>
@@ -17921,7 +18154,7 @@
               <a:p>
                 <a:pPr marL="285750" indent="-285750"/>
                 <a:r>
-                  <a:rPr lang="en-GB" sz="1600" dirty="0">
+                  <a:rPr lang="en-GB" sz="1800" dirty="0">
                     <a:solidFill>
                       <a:srgbClr val="1F2D29"/>
                     </a:solidFill>
@@ -17934,7 +18167,7 @@
                       <m:rPr>
                         <m:sty m:val="p"/>
                       </m:rPr>
-                      <a:rPr lang="en-GB" sz="1600" smtClean="0">
+                      <a:rPr lang="en-GB" sz="1800" smtClean="0">
                         <a:solidFill>
                           <a:srgbClr val="1F2D29"/>
                         </a:solidFill>
@@ -17945,7 +18178,7 @@
                   </m:oMath>
                 </a14:m>
                 <a:r>
-                  <a:rPr lang="en-GB" sz="1600" dirty="0">
+                  <a:rPr lang="en-GB" sz="1800" dirty="0">
                     <a:solidFill>
                       <a:srgbClr val="1F2D29"/>
                     </a:solidFill>
@@ -17956,7 +18189,7 @@
               <a:p>
                 <a:pPr marL="285750" indent="-285750"/>
                 <a:r>
-                  <a:rPr lang="en-GB" sz="1600" dirty="0">
+                  <a:rPr lang="en-GB" sz="1800" dirty="0">
                     <a:solidFill>
                       <a:srgbClr val="1F2D29"/>
                     </a:solidFill>
@@ -17967,12 +18200,74 @@
               <a:p>
                 <a:pPr marL="285750" indent="-285750"/>
                 <a:r>
-                  <a:rPr lang="en-GB" sz="1600" dirty="0">
+                  <a:rPr lang="en-GB" sz="1800" dirty="0">
                     <a:solidFill>
                       <a:srgbClr val="1F2D29"/>
                     </a:solidFill>
                   </a:rPr>
-                  <a:t>We drop features with low eigenvalue\variance to reduce computation and storage efforts</a:t>
+                  <a:t>We sort the eigenvalues and their matching eigenvectors in </a:t>
+                </a:r>
+                <a:r>
+                  <a:rPr lang="en-GB" sz="1800">
+                    <a:solidFill>
+                      <a:srgbClr val="1F2D29"/>
+                    </a:solidFill>
+                  </a:rPr>
+                  <a:t>descending </a:t>
+                </a:r>
+                <a:r>
+                  <a:rPr lang="en-GB" sz="1800" dirty="0">
+                    <a:solidFill>
+                      <a:srgbClr val="1F2D29"/>
+                    </a:solidFill>
+                  </a:rPr>
+                  <a:t>o</a:t>
+                </a:r>
+                <a:r>
+                  <a:rPr lang="en-GB" sz="1800">
+                    <a:solidFill>
+                      <a:srgbClr val="1F2D29"/>
+                    </a:solidFill>
+                  </a:rPr>
+                  <a:t>rder</a:t>
+                </a:r>
+                <a:endParaRPr lang="en-GB" sz="1800" dirty="0">
+                  <a:solidFill>
+                    <a:srgbClr val="1F2D29"/>
+                  </a:solidFill>
+                </a:endParaRPr>
+              </a:p>
+              <a:p>
+                <a:pPr marL="285750" indent="-285750"/>
+                <a:r>
+                  <a:rPr lang="en-GB" sz="1800" dirty="0">
+                    <a:solidFill>
+                      <a:srgbClr val="1F2D29"/>
+                    </a:solidFill>
+                  </a:rPr>
+                  <a:t>Than we drop features with low eigenvalue\variance</a:t>
+                </a:r>
+              </a:p>
+              <a:p>
+                <a:pPr marL="285750" indent="-285750"/>
+                <a:r>
+                  <a:rPr lang="en-GB" sz="1800" dirty="0">
+                    <a:solidFill>
+                      <a:srgbClr val="1F2D29"/>
+                    </a:solidFill>
+                  </a:rPr>
+                  <a:t>By removing low-variance features we project the dt into lower dimensional space called the Principal Component Space</a:t>
+                </a:r>
+              </a:p>
+              <a:p>
+                <a:pPr marL="285750" indent="-285750"/>
+                <a:r>
+                  <a:rPr lang="en-GB" sz="1800" dirty="0">
+                    <a:solidFill>
+                      <a:srgbClr val="1F2D29"/>
+                    </a:solidFill>
+                  </a:rPr>
+                  <a:t>We reduce computation efforts and storage</a:t>
                 </a:r>
               </a:p>
               <a:p>
@@ -17986,7 +18281,7 @@
             </p:txBody>
           </p:sp>
         </mc:Choice>
-        <mc:Fallback xmlns="">
+        <mc:Fallback>
           <p:sp>
             <p:nvSpPr>
               <p:cNvPr id="15" name="Content Placeholder 2">
@@ -18004,7 +18299,7 @@
             <p:spPr>
               <a:xfrm>
                 <a:off x="2302933" y="2641604"/>
-                <a:ext cx="7621606" cy="3443107"/>
+                <a:ext cx="7621606" cy="3973509"/>
               </a:xfrm>
               <a:prstGeom prst="rect">
                 <a:avLst/>
@@ -18012,7 +18307,7 @@
               <a:blipFill>
                 <a:blip r:embed="rId3"/>
                 <a:stretch>
-                  <a:fillRect l="-166"/>
+                  <a:fillRect l="-80" t="-153"/>
                 </a:stretch>
               </a:blipFill>
             </p:spPr>
@@ -19110,7 +19405,25 @@
                                         </a:solidFill>
                                         <a:latin typeface="Cambria Math" panose="02040503050406030204" pitchFamily="18" charset="0"/>
                                       </a:rPr>
-                                      <m:t>1, 1</m:t>
+                                      <m:t>1</m:t>
+                                    </m:r>
+                                    <m:r>
+                                      <a:rPr lang="en-US" b="0" i="1">
+                                        <a:solidFill>
+                                          <a:srgbClr val="1F2D29"/>
+                                        </a:solidFill>
+                                        <a:latin typeface="Cambria Math" panose="02040503050406030204" pitchFamily="18" charset="0"/>
+                                      </a:rPr>
+                                      <m:t>, </m:t>
+                                    </m:r>
+                                    <m:r>
+                                      <a:rPr lang="en-US" b="0" i="1">
+                                        <a:solidFill>
+                                          <a:srgbClr val="1F2D29"/>
+                                        </a:solidFill>
+                                        <a:latin typeface="Cambria Math" panose="02040503050406030204" pitchFamily="18" charset="0"/>
+                                      </a:rPr>
+                                      <m:t>1</m:t>
                                     </m:r>
                                   </m:sub>
                                 </m:sSub>
@@ -19146,7 +19459,25 @@
                                         </a:solidFill>
                                         <a:latin typeface="Cambria Math" panose="02040503050406030204" pitchFamily="18" charset="0"/>
                                       </a:rPr>
-                                      <m:t>1, 2</m:t>
+                                      <m:t>1</m:t>
+                                    </m:r>
+                                    <m:r>
+                                      <a:rPr lang="en-US" b="0" i="1">
+                                        <a:solidFill>
+                                          <a:srgbClr val="1F2D29"/>
+                                        </a:solidFill>
+                                        <a:latin typeface="Cambria Math" panose="02040503050406030204" pitchFamily="18" charset="0"/>
+                                      </a:rPr>
+                                      <m:t>, </m:t>
+                                    </m:r>
+                                    <m:r>
+                                      <a:rPr lang="en-US" b="0" i="1">
+                                        <a:solidFill>
+                                          <a:srgbClr val="1F2D29"/>
+                                        </a:solidFill>
+                                        <a:latin typeface="Cambria Math" panose="02040503050406030204" pitchFamily="18" charset="0"/>
+                                      </a:rPr>
+                                      <m:t>2</m:t>
                                     </m:r>
                                   </m:sub>
                                 </m:sSub>
@@ -19184,7 +19515,25 @@
                                         </a:solidFill>
                                         <a:latin typeface="Cambria Math" panose="02040503050406030204" pitchFamily="18" charset="0"/>
                                       </a:rPr>
-                                      <m:t>2,1</m:t>
+                                      <m:t>2</m:t>
+                                    </m:r>
+                                    <m:r>
+                                      <a:rPr lang="en-US" b="0" i="1">
+                                        <a:solidFill>
+                                          <a:srgbClr val="1F2D29"/>
+                                        </a:solidFill>
+                                        <a:latin typeface="Cambria Math" panose="02040503050406030204" pitchFamily="18" charset="0"/>
+                                      </a:rPr>
+                                      <m:t>,</m:t>
+                                    </m:r>
+                                    <m:r>
+                                      <a:rPr lang="en-US" b="0" i="1">
+                                        <a:solidFill>
+                                          <a:srgbClr val="1F2D29"/>
+                                        </a:solidFill>
+                                        <a:latin typeface="Cambria Math" panose="02040503050406030204" pitchFamily="18" charset="0"/>
+                                      </a:rPr>
+                                      <m:t>1</m:t>
                                     </m:r>
                                   </m:sub>
                                 </m:sSub>
@@ -19220,7 +19569,25 @@
                                         </a:solidFill>
                                         <a:latin typeface="Cambria Math" panose="02040503050406030204" pitchFamily="18" charset="0"/>
                                       </a:rPr>
-                                      <m:t>2, 2</m:t>
+                                      <m:t>2</m:t>
+                                    </m:r>
+                                    <m:r>
+                                      <a:rPr lang="en-US" b="0" i="1">
+                                        <a:solidFill>
+                                          <a:srgbClr val="1F2D29"/>
+                                        </a:solidFill>
+                                        <a:latin typeface="Cambria Math" panose="02040503050406030204" pitchFamily="18" charset="0"/>
+                                      </a:rPr>
+                                      <m:t>, </m:t>
+                                    </m:r>
+                                    <m:r>
+                                      <a:rPr lang="en-US" b="0" i="1">
+                                        <a:solidFill>
+                                          <a:srgbClr val="1F2D29"/>
+                                        </a:solidFill>
+                                        <a:latin typeface="Cambria Math" panose="02040503050406030204" pitchFamily="18" charset="0"/>
+                                      </a:rPr>
+                                      <m:t>2</m:t>
                                     </m:r>
                                   </m:sub>
                                 </m:sSub>
@@ -19301,7 +19668,25 @@
                                         </a:solidFill>
                                         <a:latin typeface="Cambria Math" panose="02040503050406030204" pitchFamily="18" charset="0"/>
                                       </a:rPr>
-                                      <m:t>1,1</m:t>
+                                      <m:t>1</m:t>
+                                    </m:r>
+                                    <m:r>
+                                      <a:rPr lang="en-US" b="0" i="1">
+                                        <a:solidFill>
+                                          <a:srgbClr val="1F2D29"/>
+                                        </a:solidFill>
+                                        <a:latin typeface="Cambria Math" panose="02040503050406030204" pitchFamily="18" charset="0"/>
+                                      </a:rPr>
+                                      <m:t>,</m:t>
+                                    </m:r>
+                                    <m:r>
+                                      <a:rPr lang="en-US" b="0" i="1">
+                                        <a:solidFill>
+                                          <a:srgbClr val="1F2D29"/>
+                                        </a:solidFill>
+                                        <a:latin typeface="Cambria Math" panose="02040503050406030204" pitchFamily="18" charset="0"/>
+                                      </a:rPr>
+                                      <m:t>1</m:t>
                                     </m:r>
                                   </m:sub>
                                 </m:sSub>
@@ -19350,7 +19735,25 @@
                                         </a:solidFill>
                                         <a:latin typeface="Cambria Math" panose="02040503050406030204" pitchFamily="18" charset="0"/>
                                       </a:rPr>
-                                      <m:t>2,1</m:t>
+                                      <m:t>2</m:t>
+                                    </m:r>
+                                    <m:r>
+                                      <a:rPr lang="en-US" b="0" i="1">
+                                        <a:solidFill>
+                                          <a:srgbClr val="1F2D29"/>
+                                        </a:solidFill>
+                                        <a:latin typeface="Cambria Math" panose="02040503050406030204" pitchFamily="18" charset="0"/>
+                                      </a:rPr>
+                                      <m:t>,</m:t>
+                                    </m:r>
+                                    <m:r>
+                                      <a:rPr lang="en-US" b="0" i="1">
+                                        <a:solidFill>
+                                          <a:srgbClr val="1F2D29"/>
+                                        </a:solidFill>
+                                        <a:latin typeface="Cambria Math" panose="02040503050406030204" pitchFamily="18" charset="0"/>
+                                      </a:rPr>
+                                      <m:t>1</m:t>
                                     </m:r>
                                   </m:sub>
                                 </m:sSub>
@@ -19386,7 +19789,25 @@
                                         </a:solidFill>
                                         <a:latin typeface="Cambria Math" panose="02040503050406030204" pitchFamily="18" charset="0"/>
                                       </a:rPr>
-                                      <m:t>2,2</m:t>
+                                      <m:t>2</m:t>
+                                    </m:r>
+                                    <m:r>
+                                      <a:rPr lang="en-US" b="0" i="1">
+                                        <a:solidFill>
+                                          <a:srgbClr val="1F2D29"/>
+                                        </a:solidFill>
+                                        <a:latin typeface="Cambria Math" panose="02040503050406030204" pitchFamily="18" charset="0"/>
+                                      </a:rPr>
+                                      <m:t>,</m:t>
+                                    </m:r>
+                                    <m:r>
+                                      <a:rPr lang="en-US" b="0" i="1">
+                                        <a:solidFill>
+                                          <a:srgbClr val="1F2D29"/>
+                                        </a:solidFill>
+                                        <a:latin typeface="Cambria Math" panose="02040503050406030204" pitchFamily="18" charset="0"/>
+                                      </a:rPr>
+                                      <m:t>2</m:t>
                                     </m:r>
                                   </m:sub>
                                 </m:sSub>
@@ -19467,7 +19888,25 @@
                                         </a:solidFill>
                                         <a:latin typeface="Cambria Math" panose="02040503050406030204" pitchFamily="18" charset="0"/>
                                       </a:rPr>
-                                      <m:t>1,1</m:t>
+                                      <m:t>1</m:t>
+                                    </m:r>
+                                    <m:r>
+                                      <a:rPr lang="en-US" i="1">
+                                        <a:solidFill>
+                                          <a:srgbClr val="1F2D29"/>
+                                        </a:solidFill>
+                                        <a:latin typeface="Cambria Math" panose="02040503050406030204" pitchFamily="18" charset="0"/>
+                                      </a:rPr>
+                                      <m:t>,</m:t>
+                                    </m:r>
+                                    <m:r>
+                                      <a:rPr lang="en-US" i="1">
+                                        <a:solidFill>
+                                          <a:srgbClr val="1F2D29"/>
+                                        </a:solidFill>
+                                        <a:latin typeface="Cambria Math" panose="02040503050406030204" pitchFamily="18" charset="0"/>
+                                      </a:rPr>
+                                      <m:t>1</m:t>
                                     </m:r>
                                   </m:sub>
                                 </m:sSub>
@@ -19503,7 +19942,25 @@
                                         </a:solidFill>
                                         <a:latin typeface="Cambria Math" panose="02040503050406030204" pitchFamily="18" charset="0"/>
                                       </a:rPr>
-                                      <m:t>2, 1</m:t>
+                                      <m:t>2</m:t>
+                                    </m:r>
+                                    <m:r>
+                                      <a:rPr lang="en-US" b="0" i="1">
+                                        <a:solidFill>
+                                          <a:srgbClr val="1F2D29"/>
+                                        </a:solidFill>
+                                        <a:latin typeface="Cambria Math" panose="02040503050406030204" pitchFamily="18" charset="0"/>
+                                      </a:rPr>
+                                      <m:t>, </m:t>
+                                    </m:r>
+                                    <m:r>
+                                      <a:rPr lang="en-US" b="0" i="1">
+                                        <a:solidFill>
+                                          <a:srgbClr val="1F2D29"/>
+                                        </a:solidFill>
+                                        <a:latin typeface="Cambria Math" panose="02040503050406030204" pitchFamily="18" charset="0"/>
+                                      </a:rPr>
+                                      <m:t>1</m:t>
                                     </m:r>
                                   </m:sub>
                                 </m:sSub>
@@ -19552,7 +20009,25 @@
                                         </a:solidFill>
                                         <a:latin typeface="Cambria Math" panose="02040503050406030204" pitchFamily="18" charset="0"/>
                                       </a:rPr>
-                                      <m:t>2,2</m:t>
+                                      <m:t>2</m:t>
+                                    </m:r>
+                                    <m:r>
+                                      <a:rPr lang="en-US" i="1">
+                                        <a:solidFill>
+                                          <a:srgbClr val="1F2D29"/>
+                                        </a:solidFill>
+                                        <a:latin typeface="Cambria Math" panose="02040503050406030204" pitchFamily="18" charset="0"/>
+                                      </a:rPr>
+                                      <m:t>,</m:t>
+                                    </m:r>
+                                    <m:r>
+                                      <a:rPr lang="en-US" i="1">
+                                        <a:solidFill>
+                                          <a:srgbClr val="1F2D29"/>
+                                        </a:solidFill>
+                                        <a:latin typeface="Cambria Math" panose="02040503050406030204" pitchFamily="18" charset="0"/>
+                                      </a:rPr>
+                                      <m:t>2</m:t>
                                     </m:r>
                                   </m:sub>
                                 </m:sSub>
@@ -20026,7 +20501,25 @@
                                         </a:solidFill>
                                         <a:latin typeface="Cambria Math" panose="02040503050406030204" pitchFamily="18" charset="0"/>
                                       </a:rPr>
-                                      <m:t>1, 1</m:t>
+                                      <m:t>1</m:t>
+                                    </m:r>
+                                    <m:r>
+                                      <a:rPr lang="en-US" sz="1600" i="1">
+                                        <a:solidFill>
+                                          <a:srgbClr val="1F2D29"/>
+                                        </a:solidFill>
+                                        <a:latin typeface="Cambria Math" panose="02040503050406030204" pitchFamily="18" charset="0"/>
+                                      </a:rPr>
+                                      <m:t>, </m:t>
+                                    </m:r>
+                                    <m:r>
+                                      <a:rPr lang="en-US" sz="1600" i="1">
+                                        <a:solidFill>
+                                          <a:srgbClr val="1F2D29"/>
+                                        </a:solidFill>
+                                        <a:latin typeface="Cambria Math" panose="02040503050406030204" pitchFamily="18" charset="0"/>
+                                      </a:rPr>
+                                      <m:t>1</m:t>
                                     </m:r>
                                   </m:sub>
                                 </m:sSub>
@@ -20062,7 +20555,25 @@
                                         </a:solidFill>
                                         <a:latin typeface="Cambria Math" panose="02040503050406030204" pitchFamily="18" charset="0"/>
                                       </a:rPr>
-                                      <m:t>1, 2</m:t>
+                                      <m:t>1</m:t>
+                                    </m:r>
+                                    <m:r>
+                                      <a:rPr lang="en-US" sz="1600" i="1">
+                                        <a:solidFill>
+                                          <a:srgbClr val="1F2D29"/>
+                                        </a:solidFill>
+                                        <a:latin typeface="Cambria Math" panose="02040503050406030204" pitchFamily="18" charset="0"/>
+                                      </a:rPr>
+                                      <m:t>, </m:t>
+                                    </m:r>
+                                    <m:r>
+                                      <a:rPr lang="en-US" sz="1600" i="1">
+                                        <a:solidFill>
+                                          <a:srgbClr val="1F2D29"/>
+                                        </a:solidFill>
+                                        <a:latin typeface="Cambria Math" panose="02040503050406030204" pitchFamily="18" charset="0"/>
+                                      </a:rPr>
+                                      <m:t>2</m:t>
                                     </m:r>
                                   </m:sub>
                                 </m:sSub>
@@ -20100,7 +20611,25 @@
                                         </a:solidFill>
                                         <a:latin typeface="Cambria Math" panose="02040503050406030204" pitchFamily="18" charset="0"/>
                                       </a:rPr>
-                                      <m:t>2,1</m:t>
+                                      <m:t>2</m:t>
+                                    </m:r>
+                                    <m:r>
+                                      <a:rPr lang="en-US" sz="1600" i="1">
+                                        <a:solidFill>
+                                          <a:srgbClr val="1F2D29"/>
+                                        </a:solidFill>
+                                        <a:latin typeface="Cambria Math" panose="02040503050406030204" pitchFamily="18" charset="0"/>
+                                      </a:rPr>
+                                      <m:t>,</m:t>
+                                    </m:r>
+                                    <m:r>
+                                      <a:rPr lang="en-US" sz="1600" i="1">
+                                        <a:solidFill>
+                                          <a:srgbClr val="1F2D29"/>
+                                        </a:solidFill>
+                                        <a:latin typeface="Cambria Math" panose="02040503050406030204" pitchFamily="18" charset="0"/>
+                                      </a:rPr>
+                                      <m:t>1</m:t>
                                     </m:r>
                                   </m:sub>
                                 </m:sSub>
@@ -20136,7 +20665,25 @@
                                         </a:solidFill>
                                         <a:latin typeface="Cambria Math" panose="02040503050406030204" pitchFamily="18" charset="0"/>
                                       </a:rPr>
-                                      <m:t>2, 2</m:t>
+                                      <m:t>2</m:t>
+                                    </m:r>
+                                    <m:r>
+                                      <a:rPr lang="en-US" sz="1600" i="1">
+                                        <a:solidFill>
+                                          <a:srgbClr val="1F2D29"/>
+                                        </a:solidFill>
+                                        <a:latin typeface="Cambria Math" panose="02040503050406030204" pitchFamily="18" charset="0"/>
+                                      </a:rPr>
+                                      <m:t>, </m:t>
+                                    </m:r>
+                                    <m:r>
+                                      <a:rPr lang="en-US" sz="1600" i="1">
+                                        <a:solidFill>
+                                          <a:srgbClr val="1F2D29"/>
+                                        </a:solidFill>
+                                        <a:latin typeface="Cambria Math" panose="02040503050406030204" pitchFamily="18" charset="0"/>
+                                      </a:rPr>
+                                      <m:t>2</m:t>
                                     </m:r>
                                   </m:sub>
                                 </m:sSub>
@@ -20217,7 +20764,25 @@
                                         </a:solidFill>
                                         <a:latin typeface="Cambria Math" panose="02040503050406030204" pitchFamily="18" charset="0"/>
                                       </a:rPr>
-                                      <m:t>1,1</m:t>
+                                      <m:t>1</m:t>
+                                    </m:r>
+                                    <m:r>
+                                      <a:rPr lang="en-US" sz="1600" i="1">
+                                        <a:solidFill>
+                                          <a:srgbClr val="1F2D29"/>
+                                        </a:solidFill>
+                                        <a:latin typeface="Cambria Math" panose="02040503050406030204" pitchFamily="18" charset="0"/>
+                                      </a:rPr>
+                                      <m:t>,</m:t>
+                                    </m:r>
+                                    <m:r>
+                                      <a:rPr lang="en-US" sz="1600" i="1">
+                                        <a:solidFill>
+                                          <a:srgbClr val="1F2D29"/>
+                                        </a:solidFill>
+                                        <a:latin typeface="Cambria Math" panose="02040503050406030204" pitchFamily="18" charset="0"/>
+                                      </a:rPr>
+                                      <m:t>1</m:t>
                                     </m:r>
                                   </m:sub>
                                 </m:sSub>
@@ -20266,7 +20831,25 @@
                                         </a:solidFill>
                                         <a:latin typeface="Cambria Math" panose="02040503050406030204" pitchFamily="18" charset="0"/>
                                       </a:rPr>
-                                      <m:t>2,1</m:t>
+                                      <m:t>2</m:t>
+                                    </m:r>
+                                    <m:r>
+                                      <a:rPr lang="en-US" sz="1600" i="1">
+                                        <a:solidFill>
+                                          <a:srgbClr val="1F2D29"/>
+                                        </a:solidFill>
+                                        <a:latin typeface="Cambria Math" panose="02040503050406030204" pitchFamily="18" charset="0"/>
+                                      </a:rPr>
+                                      <m:t>,</m:t>
+                                    </m:r>
+                                    <m:r>
+                                      <a:rPr lang="en-US" sz="1600" i="1">
+                                        <a:solidFill>
+                                          <a:srgbClr val="1F2D29"/>
+                                        </a:solidFill>
+                                        <a:latin typeface="Cambria Math" panose="02040503050406030204" pitchFamily="18" charset="0"/>
+                                      </a:rPr>
+                                      <m:t>1</m:t>
                                     </m:r>
                                   </m:sub>
                                 </m:sSub>
@@ -20302,7 +20885,25 @@
                                         </a:solidFill>
                                         <a:latin typeface="Cambria Math" panose="02040503050406030204" pitchFamily="18" charset="0"/>
                                       </a:rPr>
-                                      <m:t>2,2</m:t>
+                                      <m:t>2</m:t>
+                                    </m:r>
+                                    <m:r>
+                                      <a:rPr lang="en-US" sz="1600" i="1">
+                                        <a:solidFill>
+                                          <a:srgbClr val="1F2D29"/>
+                                        </a:solidFill>
+                                        <a:latin typeface="Cambria Math" panose="02040503050406030204" pitchFamily="18" charset="0"/>
+                                      </a:rPr>
+                                      <m:t>,</m:t>
+                                    </m:r>
+                                    <m:r>
+                                      <a:rPr lang="en-US" sz="1600" i="1">
+                                        <a:solidFill>
+                                          <a:srgbClr val="1F2D29"/>
+                                        </a:solidFill>
+                                        <a:latin typeface="Cambria Math" panose="02040503050406030204" pitchFamily="18" charset="0"/>
+                                      </a:rPr>
+                                      <m:t>2</m:t>
                                     </m:r>
                                   </m:sub>
                                 </m:sSub>
@@ -20383,7 +20984,25 @@
                                         </a:solidFill>
                                         <a:latin typeface="Cambria Math" panose="02040503050406030204" pitchFamily="18" charset="0"/>
                                       </a:rPr>
-                                      <m:t>1,1</m:t>
+                                      <m:t>1</m:t>
+                                    </m:r>
+                                    <m:r>
+                                      <a:rPr lang="en-US" sz="1600" i="1">
+                                        <a:solidFill>
+                                          <a:srgbClr val="1F2D29"/>
+                                        </a:solidFill>
+                                        <a:latin typeface="Cambria Math" panose="02040503050406030204" pitchFamily="18" charset="0"/>
+                                      </a:rPr>
+                                      <m:t>,</m:t>
+                                    </m:r>
+                                    <m:r>
+                                      <a:rPr lang="en-US" sz="1600" i="1">
+                                        <a:solidFill>
+                                          <a:srgbClr val="1F2D29"/>
+                                        </a:solidFill>
+                                        <a:latin typeface="Cambria Math" panose="02040503050406030204" pitchFamily="18" charset="0"/>
+                                      </a:rPr>
+                                      <m:t>1</m:t>
                                     </m:r>
                                   </m:sub>
                                 </m:sSub>
@@ -20419,7 +21038,25 @@
                                         </a:solidFill>
                                         <a:latin typeface="Cambria Math" panose="02040503050406030204" pitchFamily="18" charset="0"/>
                                       </a:rPr>
-                                      <m:t>2, 1</m:t>
+                                      <m:t>2</m:t>
+                                    </m:r>
+                                    <m:r>
+                                      <a:rPr lang="en-US" sz="1600" i="1">
+                                        <a:solidFill>
+                                          <a:srgbClr val="1F2D29"/>
+                                        </a:solidFill>
+                                        <a:latin typeface="Cambria Math" panose="02040503050406030204" pitchFamily="18" charset="0"/>
+                                      </a:rPr>
+                                      <m:t>, </m:t>
+                                    </m:r>
+                                    <m:r>
+                                      <a:rPr lang="en-US" sz="1600" i="1">
+                                        <a:solidFill>
+                                          <a:srgbClr val="1F2D29"/>
+                                        </a:solidFill>
+                                        <a:latin typeface="Cambria Math" panose="02040503050406030204" pitchFamily="18" charset="0"/>
+                                      </a:rPr>
+                                      <m:t>1</m:t>
                                     </m:r>
                                   </m:sub>
                                 </m:sSub>
@@ -20468,7 +21105,25 @@
                                         </a:solidFill>
                                         <a:latin typeface="Cambria Math" panose="02040503050406030204" pitchFamily="18" charset="0"/>
                                       </a:rPr>
-                                      <m:t>2,2</m:t>
+                                      <m:t>2</m:t>
+                                    </m:r>
+                                    <m:r>
+                                      <a:rPr lang="en-US" sz="1600" i="1">
+                                        <a:solidFill>
+                                          <a:srgbClr val="1F2D29"/>
+                                        </a:solidFill>
+                                        <a:latin typeface="Cambria Math" panose="02040503050406030204" pitchFamily="18" charset="0"/>
+                                      </a:rPr>
+                                      <m:t>,</m:t>
+                                    </m:r>
+                                    <m:r>
+                                      <a:rPr lang="en-US" sz="1600" i="1">
+                                        <a:solidFill>
+                                          <a:srgbClr val="1F2D29"/>
+                                        </a:solidFill>
+                                        <a:latin typeface="Cambria Math" panose="02040503050406030204" pitchFamily="18" charset="0"/>
+                                      </a:rPr>
+                                      <m:t>2</m:t>
                                     </m:r>
                                   </m:sub>
                                 </m:sSub>
@@ -20549,7 +21204,25 @@
                                         </a:solidFill>
                                         <a:latin typeface="Cambria Math" panose="02040503050406030204" pitchFamily="18" charset="0"/>
                                       </a:rPr>
-                                      <m:t>1,1</m:t>
+                                      <m:t>1</m:t>
+                                    </m:r>
+                                    <m:r>
+                                      <a:rPr lang="en-US" sz="1600" b="0" i="1" smtClean="0">
+                                        <a:solidFill>
+                                          <a:srgbClr val="1F2D29"/>
+                                        </a:solidFill>
+                                        <a:latin typeface="Cambria Math" panose="02040503050406030204" pitchFamily="18" charset="0"/>
+                                      </a:rPr>
+                                      <m:t>,</m:t>
+                                    </m:r>
+                                    <m:r>
+                                      <a:rPr lang="en-US" sz="1600" b="0" i="1" smtClean="0">
+                                        <a:solidFill>
+                                          <a:srgbClr val="1F2D29"/>
+                                        </a:solidFill>
+                                        <a:latin typeface="Cambria Math" panose="02040503050406030204" pitchFamily="18" charset="0"/>
+                                      </a:rPr>
+                                      <m:t>1</m:t>
                                     </m:r>
                                   </m:sub>
                                   <m:sup>
@@ -20596,7 +21269,25 @@
                                         </a:solidFill>
                                         <a:latin typeface="Cambria Math" panose="02040503050406030204" pitchFamily="18" charset="0"/>
                                       </a:rPr>
-                                      <m:t>2,1</m:t>
+                                      <m:t>2</m:t>
+                                    </m:r>
+                                    <m:r>
+                                      <a:rPr lang="en-US" sz="1600" i="1">
+                                        <a:solidFill>
+                                          <a:srgbClr val="1F2D29"/>
+                                        </a:solidFill>
+                                        <a:latin typeface="Cambria Math" panose="02040503050406030204" pitchFamily="18" charset="0"/>
+                                      </a:rPr>
+                                      <m:t>,</m:t>
+                                    </m:r>
+                                    <m:r>
+                                      <a:rPr lang="en-US" sz="1600" i="1">
+                                        <a:solidFill>
+                                          <a:srgbClr val="1F2D29"/>
+                                        </a:solidFill>
+                                        <a:latin typeface="Cambria Math" panose="02040503050406030204" pitchFamily="18" charset="0"/>
+                                      </a:rPr>
+                                      <m:t>1</m:t>
                                     </m:r>
                                   </m:sub>
                                 </m:sSub>
@@ -20630,7 +21321,25 @@
                                         </a:solidFill>
                                         <a:latin typeface="Cambria Math" panose="02040503050406030204" pitchFamily="18" charset="0"/>
                                       </a:rPr>
-                                      <m:t>1,1</m:t>
+                                      <m:t>1</m:t>
+                                    </m:r>
+                                    <m:r>
+                                      <a:rPr lang="en-US" sz="1600" i="1">
+                                        <a:solidFill>
+                                          <a:srgbClr val="1F2D29"/>
+                                        </a:solidFill>
+                                        <a:latin typeface="Cambria Math" panose="02040503050406030204" pitchFamily="18" charset="0"/>
+                                      </a:rPr>
+                                      <m:t>,</m:t>
+                                    </m:r>
+                                    <m:r>
+                                      <a:rPr lang="en-US" sz="1600" i="1">
+                                        <a:solidFill>
+                                          <a:srgbClr val="1F2D29"/>
+                                        </a:solidFill>
+                                        <a:latin typeface="Cambria Math" panose="02040503050406030204" pitchFamily="18" charset="0"/>
+                                      </a:rPr>
+                                      <m:t>1</m:t>
                                     </m:r>
                                   </m:sub>
                                 </m:sSub>
@@ -20668,7 +21377,25 @@
                                         </a:solidFill>
                                         <a:latin typeface="Cambria Math" panose="02040503050406030204" pitchFamily="18" charset="0"/>
                                       </a:rPr>
-                                      <m:t>2,1</m:t>
+                                      <m:t>2</m:t>
+                                    </m:r>
+                                    <m:r>
+                                      <a:rPr lang="en-US" sz="1600" b="0" i="1" smtClean="0">
+                                        <a:solidFill>
+                                          <a:srgbClr val="1F2D29"/>
+                                        </a:solidFill>
+                                        <a:latin typeface="Cambria Math" panose="02040503050406030204" pitchFamily="18" charset="0"/>
+                                      </a:rPr>
+                                      <m:t>,</m:t>
+                                    </m:r>
+                                    <m:r>
+                                      <a:rPr lang="en-US" sz="1600" b="0" i="1" smtClean="0">
+                                        <a:solidFill>
+                                          <a:srgbClr val="1F2D29"/>
+                                        </a:solidFill>
+                                        <a:latin typeface="Cambria Math" panose="02040503050406030204" pitchFamily="18" charset="0"/>
+                                      </a:rPr>
+                                      <m:t>1</m:t>
                                     </m:r>
                                   </m:sub>
                                 </m:sSub>
@@ -20702,7 +21429,25 @@
                                         </a:solidFill>
                                         <a:latin typeface="Cambria Math" panose="02040503050406030204" pitchFamily="18" charset="0"/>
                                       </a:rPr>
-                                      <m:t>1,1</m:t>
+                                      <m:t>1</m:t>
+                                    </m:r>
+                                    <m:r>
+                                      <a:rPr lang="en-US" sz="1600" b="0" i="1" smtClean="0">
+                                        <a:solidFill>
+                                          <a:srgbClr val="1F2D29"/>
+                                        </a:solidFill>
+                                        <a:latin typeface="Cambria Math" panose="02040503050406030204" pitchFamily="18" charset="0"/>
+                                      </a:rPr>
+                                      <m:t>,</m:t>
+                                    </m:r>
+                                    <m:r>
+                                      <a:rPr lang="en-US" sz="1600" b="0" i="1" smtClean="0">
+                                        <a:solidFill>
+                                          <a:srgbClr val="1F2D29"/>
+                                        </a:solidFill>
+                                        <a:latin typeface="Cambria Math" panose="02040503050406030204" pitchFamily="18" charset="0"/>
+                                      </a:rPr>
+                                      <m:t>1</m:t>
                                     </m:r>
                                   </m:sub>
                                 </m:sSub>
@@ -20738,7 +21483,25 @@
                                         </a:solidFill>
                                         <a:latin typeface="Cambria Math" panose="02040503050406030204" pitchFamily="18" charset="0"/>
                                       </a:rPr>
-                                      <m:t>2,1</m:t>
+                                      <m:t>2</m:t>
+                                    </m:r>
+                                    <m:r>
+                                      <a:rPr lang="en-US" sz="1600" i="1">
+                                        <a:solidFill>
+                                          <a:srgbClr val="1F2D29"/>
+                                        </a:solidFill>
+                                        <a:latin typeface="Cambria Math" panose="02040503050406030204" pitchFamily="18" charset="0"/>
+                                      </a:rPr>
+                                      <m:t>,</m:t>
+                                    </m:r>
+                                    <m:r>
+                                      <a:rPr lang="en-US" sz="1600" i="1">
+                                        <a:solidFill>
+                                          <a:srgbClr val="1F2D29"/>
+                                        </a:solidFill>
+                                        <a:latin typeface="Cambria Math" panose="02040503050406030204" pitchFamily="18" charset="0"/>
+                                      </a:rPr>
+                                      <m:t>1</m:t>
                                     </m:r>
                                   </m:sub>
                                   <m:sup>
@@ -20792,7 +21555,16 @@
                                         </a:solidFill>
                                         <a:latin typeface="Cambria Math" panose="02040503050406030204" pitchFamily="18" charset="0"/>
                                       </a:rPr>
-                                      <m:t>2,</m:t>
+                                      <m:t>2</m:t>
+                                    </m:r>
+                                    <m:r>
+                                      <a:rPr lang="en-US" sz="1600" i="1">
+                                        <a:solidFill>
+                                          <a:srgbClr val="1F2D29"/>
+                                        </a:solidFill>
+                                        <a:latin typeface="Cambria Math" panose="02040503050406030204" pitchFamily="18" charset="0"/>
+                                      </a:rPr>
+                                      <m:t>,</m:t>
                                     </m:r>
                                     <m:r>
                                       <a:rPr lang="en-US" sz="1600" b="0" i="1" smtClean="0">
@@ -21006,7 +21778,25 @@
                               </a:solidFill>
                               <a:latin typeface="Cambria Math" panose="02040503050406030204" pitchFamily="18" charset="0"/>
                             </a:rPr>
-                            <m:t>1,1</m:t>
+                            <m:t>1</m:t>
+                          </m:r>
+                          <m:r>
+                            <a:rPr lang="en-US" sz="1800" b="0" i="1" smtClean="0">
+                              <a:solidFill>
+                                <a:srgbClr val="1F2D29"/>
+                              </a:solidFill>
+                              <a:latin typeface="Cambria Math" panose="02040503050406030204" pitchFamily="18" charset="0"/>
+                            </a:rPr>
+                            <m:t>,</m:t>
+                          </m:r>
+                          <m:r>
+                            <a:rPr lang="en-US" sz="1800" b="0" i="1" smtClean="0">
+                              <a:solidFill>
+                                <a:srgbClr val="1F2D29"/>
+                              </a:solidFill>
+                              <a:latin typeface="Cambria Math" panose="02040503050406030204" pitchFamily="18" charset="0"/>
+                            </a:rPr>
+                            <m:t>1</m:t>
                           </m:r>
                         </m:sub>
                       </m:sSub>
@@ -21049,7 +21839,25 @@
                               </a:solidFill>
                               <a:latin typeface="Cambria Math" panose="02040503050406030204" pitchFamily="18" charset="0"/>
                             </a:rPr>
-                            <m:t>1,1</m:t>
+                            <m:t>1</m:t>
+                          </m:r>
+                          <m:r>
+                            <a:rPr lang="en-US" sz="1800" b="0" i="1" smtClean="0">
+                              <a:solidFill>
+                                <a:srgbClr val="1F2D29"/>
+                              </a:solidFill>
+                              <a:latin typeface="Cambria Math" panose="02040503050406030204" pitchFamily="18" charset="0"/>
+                            </a:rPr>
+                            <m:t>,</m:t>
+                          </m:r>
+                          <m:r>
+                            <a:rPr lang="en-US" sz="1800" b="0" i="1" smtClean="0">
+                              <a:solidFill>
+                                <a:srgbClr val="1F2D29"/>
+                              </a:solidFill>
+                              <a:latin typeface="Cambria Math" panose="02040503050406030204" pitchFamily="18" charset="0"/>
+                            </a:rPr>
+                            <m:t>1</m:t>
                           </m:r>
                         </m:sub>
                         <m:sup>
@@ -21103,7 +21911,25 @@
                               </a:solidFill>
                               <a:latin typeface="Cambria Math" panose="02040503050406030204" pitchFamily="18" charset="0"/>
                             </a:rPr>
-                            <m:t>1,1</m:t>
+                            <m:t>1</m:t>
+                          </m:r>
+                          <m:r>
+                            <a:rPr lang="en-US" sz="1800" b="0" i="1" smtClean="0">
+                              <a:solidFill>
+                                <a:srgbClr val="1F2D29"/>
+                              </a:solidFill>
+                              <a:latin typeface="Cambria Math" panose="02040503050406030204" pitchFamily="18" charset="0"/>
+                            </a:rPr>
+                            <m:t>,</m:t>
+                          </m:r>
+                          <m:r>
+                            <a:rPr lang="en-US" sz="1800" b="0" i="1" smtClean="0">
+                              <a:solidFill>
+                                <a:srgbClr val="1F2D29"/>
+                              </a:solidFill>
+                              <a:latin typeface="Cambria Math" panose="02040503050406030204" pitchFamily="18" charset="0"/>
+                            </a:rPr>
+                            <m:t>1</m:t>
                           </m:r>
                         </m:sub>
                       </m:sSub>
@@ -21160,7 +21986,25 @@
                                   </a:solidFill>
                                   <a:latin typeface="Cambria Math" panose="02040503050406030204" pitchFamily="18" charset="0"/>
                                 </a:rPr>
-                                <m:t>1,1</m:t>
+                                <m:t>1</m:t>
+                              </m:r>
+                              <m:r>
+                                <a:rPr lang="en-US" sz="1800" b="0" i="1" smtClean="0">
+                                  <a:solidFill>
+                                    <a:srgbClr val="1F2D29"/>
+                                  </a:solidFill>
+                                  <a:latin typeface="Cambria Math" panose="02040503050406030204" pitchFamily="18" charset="0"/>
+                                </a:rPr>
+                                <m:t>,</m:t>
+                              </m:r>
+                              <m:r>
+                                <a:rPr lang="en-US" sz="1800" b="0" i="1" smtClean="0">
+                                  <a:solidFill>
+                                    <a:srgbClr val="1F2D29"/>
+                                  </a:solidFill>
+                                  <a:latin typeface="Cambria Math" panose="02040503050406030204" pitchFamily="18" charset="0"/>
+                                </a:rPr>
+                                <m:t>1</m:t>
                               </m:r>
                             </m:sub>
                           </m:sSub>
@@ -21222,7 +22066,16 @@
                               </a:solidFill>
                               <a:latin typeface="Cambria Math" panose="02040503050406030204" pitchFamily="18" charset="0"/>
                             </a:rPr>
-                            <m:t>,1</m:t>
+                            <m:t>,</m:t>
+                          </m:r>
+                          <m:r>
+                            <a:rPr lang="en-US" i="1">
+                              <a:solidFill>
+                                <a:srgbClr val="1F2D29"/>
+                              </a:solidFill>
+                              <a:latin typeface="Cambria Math" panose="02040503050406030204" pitchFamily="18" charset="0"/>
+                            </a:rPr>
+                            <m:t>1</m:t>
                           </m:r>
                         </m:sub>
                       </m:sSub>
@@ -21265,7 +22118,25 @@
                               </a:solidFill>
                               <a:latin typeface="Cambria Math" panose="02040503050406030204" pitchFamily="18" charset="0"/>
                             </a:rPr>
-                            <m:t>1,2</m:t>
+                            <m:t>1</m:t>
+                          </m:r>
+                          <m:r>
+                            <a:rPr lang="en-US" b="0" i="1" smtClean="0">
+                              <a:solidFill>
+                                <a:srgbClr val="1F2D29"/>
+                              </a:solidFill>
+                              <a:latin typeface="Cambria Math" panose="02040503050406030204" pitchFamily="18" charset="0"/>
+                            </a:rPr>
+                            <m:t>,</m:t>
+                          </m:r>
+                          <m:r>
+                            <a:rPr lang="en-US" b="0" i="1" smtClean="0">
+                              <a:solidFill>
+                                <a:srgbClr val="1F2D29"/>
+                              </a:solidFill>
+                              <a:latin typeface="Cambria Math" panose="02040503050406030204" pitchFamily="18" charset="0"/>
+                            </a:rPr>
+                            <m:t>2</m:t>
                           </m:r>
                         </m:sub>
                       </m:sSub>
@@ -21308,7 +22179,25 @@
                               </a:solidFill>
                               <a:latin typeface="Cambria Math" panose="02040503050406030204" pitchFamily="18" charset="0"/>
                             </a:rPr>
-                            <m:t>1,1</m:t>
+                            <m:t>1</m:t>
+                          </m:r>
+                          <m:r>
+                            <a:rPr lang="en-US" b="0" i="1" smtClean="0">
+                              <a:solidFill>
+                                <a:srgbClr val="1F2D29"/>
+                              </a:solidFill>
+                              <a:latin typeface="Cambria Math" panose="02040503050406030204" pitchFamily="18" charset="0"/>
+                            </a:rPr>
+                            <m:t>,</m:t>
+                          </m:r>
+                          <m:r>
+                            <a:rPr lang="en-US" b="0" i="1" smtClean="0">
+                              <a:solidFill>
+                                <a:srgbClr val="1F2D29"/>
+                              </a:solidFill>
+                              <a:latin typeface="Cambria Math" panose="02040503050406030204" pitchFamily="18" charset="0"/>
+                            </a:rPr>
+                            <m:t>1</m:t>
                           </m:r>
                         </m:sub>
                       </m:sSub>
@@ -21342,7 +22231,25 @@
                               </a:solidFill>
                               <a:latin typeface="Cambria Math" panose="02040503050406030204" pitchFamily="18" charset="0"/>
                             </a:rPr>
-                            <m:t>2,1</m:t>
+                            <m:t>2</m:t>
+                          </m:r>
+                          <m:r>
+                            <a:rPr lang="en-US" b="0" i="1" smtClean="0">
+                              <a:solidFill>
+                                <a:srgbClr val="1F2D29"/>
+                              </a:solidFill>
+                              <a:latin typeface="Cambria Math" panose="02040503050406030204" pitchFamily="18" charset="0"/>
+                            </a:rPr>
+                            <m:t>,</m:t>
+                          </m:r>
+                          <m:r>
+                            <a:rPr lang="en-US" b="0" i="1" smtClean="0">
+                              <a:solidFill>
+                                <a:srgbClr val="1F2D29"/>
+                              </a:solidFill>
+                              <a:latin typeface="Cambria Math" panose="02040503050406030204" pitchFamily="18" charset="0"/>
+                            </a:rPr>
+                            <m:t>1</m:t>
                           </m:r>
                         </m:sub>
                       </m:sSub>
@@ -21394,7 +22301,16 @@
                               </a:solidFill>
                               <a:latin typeface="Cambria Math" panose="02040503050406030204" pitchFamily="18" charset="0"/>
                             </a:rPr>
-                            <m:t>,1</m:t>
+                            <m:t>,</m:t>
+                          </m:r>
+                          <m:r>
+                            <a:rPr lang="en-US" i="1">
+                              <a:solidFill>
+                                <a:srgbClr val="1F2D29"/>
+                              </a:solidFill>
+                              <a:latin typeface="Cambria Math" panose="02040503050406030204" pitchFamily="18" charset="0"/>
+                            </a:rPr>
+                            <m:t>1</m:t>
                           </m:r>
                         </m:sub>
                       </m:sSub>
@@ -21449,7 +22365,25 @@
                                   </a:solidFill>
                                   <a:latin typeface="Cambria Math" panose="02040503050406030204" pitchFamily="18" charset="0"/>
                                 </a:rPr>
-                                <m:t>2,1</m:t>
+                                <m:t>2</m:t>
+                              </m:r>
+                              <m:r>
+                                <a:rPr lang="en-US" b="0" i="1" smtClean="0">
+                                  <a:solidFill>
+                                    <a:srgbClr val="1F2D29"/>
+                                  </a:solidFill>
+                                  <a:latin typeface="Cambria Math" panose="02040503050406030204" pitchFamily="18" charset="0"/>
+                                </a:rPr>
+                                <m:t>,</m:t>
+                              </m:r>
+                              <m:r>
+                                <a:rPr lang="en-US" b="0" i="1" smtClean="0">
+                                  <a:solidFill>
+                                    <a:srgbClr val="1F2D29"/>
+                                  </a:solidFill>
+                                  <a:latin typeface="Cambria Math" panose="02040503050406030204" pitchFamily="18" charset="0"/>
+                                </a:rPr>
+                                <m:t>1</m:t>
                               </m:r>
                             </m:sub>
                           </m:sSub>
@@ -21485,7 +22419,25 @@
                                   </a:solidFill>
                                   <a:latin typeface="Cambria Math" panose="02040503050406030204" pitchFamily="18" charset="0"/>
                                 </a:rPr>
-                                <m:t>1,1</m:t>
+                                <m:t>1</m:t>
+                              </m:r>
+                              <m:r>
+                                <a:rPr lang="en-US" b="0" i="1" smtClean="0">
+                                  <a:solidFill>
+                                    <a:srgbClr val="1F2D29"/>
+                                  </a:solidFill>
+                                  <a:latin typeface="Cambria Math" panose="02040503050406030204" pitchFamily="18" charset="0"/>
+                                </a:rPr>
+                                <m:t>,</m:t>
+                              </m:r>
+                              <m:r>
+                                <a:rPr lang="en-US" b="0" i="1" smtClean="0">
+                                  <a:solidFill>
+                                    <a:srgbClr val="1F2D29"/>
+                                  </a:solidFill>
+                                  <a:latin typeface="Cambria Math" panose="02040503050406030204" pitchFamily="18" charset="0"/>
+                                </a:rPr>
+                                <m:t>1</m:t>
                               </m:r>
                             </m:sub>
                           </m:sSub>
@@ -21538,7 +22490,25 @@
                               </a:solidFill>
                               <a:latin typeface="Cambria Math" panose="02040503050406030204" pitchFamily="18" charset="0"/>
                             </a:rPr>
-                            <m:t>2,2</m:t>
+                            <m:t>2</m:t>
+                          </m:r>
+                          <m:r>
+                            <a:rPr lang="en-US" b="0" i="1" smtClean="0">
+                              <a:solidFill>
+                                <a:srgbClr val="1F2D29"/>
+                              </a:solidFill>
+                              <a:latin typeface="Cambria Math" panose="02040503050406030204" pitchFamily="18" charset="0"/>
+                            </a:rPr>
+                            <m:t>,</m:t>
+                          </m:r>
+                          <m:r>
+                            <a:rPr lang="en-US" b="0" i="1" smtClean="0">
+                              <a:solidFill>
+                                <a:srgbClr val="1F2D29"/>
+                              </a:solidFill>
+                              <a:latin typeface="Cambria Math" panose="02040503050406030204" pitchFamily="18" charset="0"/>
+                            </a:rPr>
+                            <m:t>2</m:t>
                           </m:r>
                         </m:sub>
                       </m:sSub>
@@ -21590,7 +22560,16 @@
                               </a:solidFill>
                               <a:latin typeface="Cambria Math" panose="02040503050406030204" pitchFamily="18" charset="0"/>
                             </a:rPr>
-                            <m:t>,1</m:t>
+                            <m:t>,</m:t>
+                          </m:r>
+                          <m:r>
+                            <a:rPr lang="en-US" i="1">
+                              <a:solidFill>
+                                <a:srgbClr val="1F2D29"/>
+                              </a:solidFill>
+                              <a:latin typeface="Cambria Math" panose="02040503050406030204" pitchFamily="18" charset="0"/>
+                            </a:rPr>
+                            <m:t>1</m:t>
                           </m:r>
                         </m:sub>
                         <m:sup>
@@ -21644,7 +22623,16 @@
                               </a:solidFill>
                               <a:latin typeface="Cambria Math" panose="02040503050406030204" pitchFamily="18" charset="0"/>
                             </a:rPr>
-                            <m:t>2,</m:t>
+                            <m:t>2</m:t>
+                          </m:r>
+                          <m:r>
+                            <a:rPr lang="en-US" i="1">
+                              <a:solidFill>
+                                <a:srgbClr val="1F2D29"/>
+                              </a:solidFill>
+                              <a:latin typeface="Cambria Math" panose="02040503050406030204" pitchFamily="18" charset="0"/>
+                            </a:rPr>
+                            <m:t>,</m:t>
                           </m:r>
                           <m:r>
                             <a:rPr lang="en-US" b="0" i="1" smtClean="0">
@@ -21707,7 +22695,25 @@
                               </a:solidFill>
                               <a:latin typeface="Cambria Math" panose="02040503050406030204" pitchFamily="18" charset="0"/>
                             </a:rPr>
-                            <m:t>2,2</m:t>
+                            <m:t>2</m:t>
+                          </m:r>
+                          <m:r>
+                            <a:rPr lang="en-US" b="0" i="1" smtClean="0">
+                              <a:solidFill>
+                                <a:srgbClr val="1F2D29"/>
+                              </a:solidFill>
+                              <a:latin typeface="Cambria Math" panose="02040503050406030204" pitchFamily="18" charset="0"/>
+                            </a:rPr>
+                            <m:t>,</m:t>
+                          </m:r>
+                          <m:r>
+                            <a:rPr lang="en-US" b="0" i="1" smtClean="0">
+                              <a:solidFill>
+                                <a:srgbClr val="1F2D29"/>
+                              </a:solidFill>
+                              <a:latin typeface="Cambria Math" panose="02040503050406030204" pitchFamily="18" charset="0"/>
+                            </a:rPr>
+                            <m:t>2</m:t>
                           </m:r>
                         </m:sub>
                       </m:sSub>
@@ -21825,7 +22831,25 @@
                                   </a:solidFill>
                                   <a:latin typeface="Cambria Math" panose="02040503050406030204" pitchFamily="18" charset="0"/>
                                 </a:rPr>
-                                <m:t>2,1</m:t>
+                                <m:t>2</m:t>
+                              </m:r>
+                              <m:r>
+                                <a:rPr lang="en-US" b="0" i="1" smtClean="0">
+                                  <a:solidFill>
+                                    <a:srgbClr val="1F2D29"/>
+                                  </a:solidFill>
+                                  <a:latin typeface="Cambria Math" panose="02040503050406030204" pitchFamily="18" charset="0"/>
+                                </a:rPr>
+                                <m:t>,</m:t>
+                              </m:r>
+                              <m:r>
+                                <a:rPr lang="en-US" b="0" i="1" smtClean="0">
+                                  <a:solidFill>
+                                    <a:srgbClr val="1F2D29"/>
+                                  </a:solidFill>
+                                  <a:latin typeface="Cambria Math" panose="02040503050406030204" pitchFamily="18" charset="0"/>
+                                </a:rPr>
+                                <m:t>1</m:t>
                               </m:r>
                             </m:sub>
                             <m:sup>
@@ -22501,7 +23525,16 @@
                                   </a:solidFill>
                                   <a:latin typeface="Cambria Math" panose="02040503050406030204" pitchFamily="18" charset="0"/>
                                 </a:rPr>
-                                <m:t>=1</m:t>
+                                <m:t>=</m:t>
+                              </m:r>
+                              <m:r>
+                                <a:rPr lang="en-US" sz="1600" b="0" i="1" smtClean="0">
+                                  <a:solidFill>
+                                    <a:srgbClr val="1F2D29"/>
+                                  </a:solidFill>
+                                  <a:latin typeface="Cambria Math" panose="02040503050406030204" pitchFamily="18" charset="0"/>
+                                </a:rPr>
+                                <m:t>1</m:t>
                               </m:r>
                             </m:sub>
                             <m:sup>
@@ -22521,7 +23554,16 @@
                                   </a:solidFill>
                                   <a:latin typeface="Cambria Math" panose="02040503050406030204" pitchFamily="18" charset="0"/>
                                 </a:rPr>
-                                <m:t>−1</m:t>
+                                <m:t>−</m:t>
+                              </m:r>
+                              <m:r>
+                                <a:rPr lang="en-US" sz="1600" b="0" i="1" smtClean="0">
+                                  <a:solidFill>
+                                    <a:srgbClr val="1F2D29"/>
+                                  </a:solidFill>
+                                  <a:latin typeface="Cambria Math" panose="02040503050406030204" pitchFamily="18" charset="0"/>
+                                </a:rPr>
+                                <m:t>1</m:t>
                               </m:r>
                             </m:sup>
                             <m:e>
@@ -22782,7 +23824,16 @@
                               </a:solidFill>
                               <a:latin typeface="Cambria Math" panose="02040503050406030204" pitchFamily="18" charset="0"/>
                             </a:rPr>
-                            <m:t>=1</m:t>
+                            <m:t>=</m:t>
+                          </m:r>
+                          <m:r>
+                            <a:rPr lang="en-US" sz="1600" b="0" i="1" smtClean="0">
+                              <a:solidFill>
+                                <a:srgbClr val="1F2D29"/>
+                              </a:solidFill>
+                              <a:latin typeface="Cambria Math" panose="02040503050406030204" pitchFamily="18" charset="0"/>
+                            </a:rPr>
+                            <m:t>1</m:t>
                           </m:r>
                         </m:sub>
                         <m:sup>
@@ -22802,7 +23853,16 @@
                               </a:solidFill>
                               <a:latin typeface="Cambria Math" panose="02040503050406030204" pitchFamily="18" charset="0"/>
                             </a:rPr>
-                            <m:t>−1</m:t>
+                            <m:t>−</m:t>
+                          </m:r>
+                          <m:r>
+                            <a:rPr lang="en-US" sz="1600" b="0" i="1" smtClean="0">
+                              <a:solidFill>
+                                <a:srgbClr val="1F2D29"/>
+                              </a:solidFill>
+                              <a:latin typeface="Cambria Math" panose="02040503050406030204" pitchFamily="18" charset="0"/>
+                            </a:rPr>
+                            <m:t>1</m:t>
                           </m:r>
                         </m:sup>
                         <m:e>
@@ -23924,7 +24984,13 @@
                           <a:rPr lang="en-US" i="1">
                             <a:latin typeface="Cambria Math" panose="02040503050406030204" pitchFamily="18" charset="0"/>
                           </a:rPr>
-                          <m:t>+1</m:t>
+                          <m:t>+</m:t>
+                        </m:r>
+                        <m:r>
+                          <a:rPr lang="en-US" i="1">
+                            <a:latin typeface="Cambria Math" panose="02040503050406030204" pitchFamily="18" charset="0"/>
+                          </a:rPr>
+                          <m:t>1</m:t>
                         </m:r>
                       </m:sub>
                     </m:sSub>
@@ -24022,7 +25088,13 @@
                           <a:rPr lang="en-US" i="1">
                             <a:latin typeface="Cambria Math" panose="02040503050406030204" pitchFamily="18" charset="0"/>
                           </a:rPr>
-                          <m:t>−1</m:t>
+                          <m:t>−</m:t>
+                        </m:r>
+                        <m:r>
+                          <a:rPr lang="en-US" i="1">
+                            <a:latin typeface="Cambria Math" panose="02040503050406030204" pitchFamily="18" charset="0"/>
+                          </a:rPr>
+                          <m:t>1</m:t>
                         </m:r>
                       </m:sup>
                     </m:sSup>

</xml_diff>